<commit_message>
First plots with garsoft v3
</commit_message>
<xml_diff>
--- a/Simulation Exercise.pptx
+++ b/Simulation Exercise.pptx
@@ -5,16 +5,25 @@
     <p:sldMasterId id="2147483648" r:id="rId3"/>
   </p:sldMasterIdLst>
   <p:notesMasterIdLst>
-    <p:notesMasterId r:id="rId8"/>
+    <p:notesMasterId r:id="rId17"/>
   </p:notesMasterIdLst>
   <p:handoutMasterIdLst>
-    <p:handoutMasterId r:id="rId9"/>
+    <p:handoutMasterId r:id="rId18"/>
   </p:handoutMasterIdLst>
   <p:sldIdLst>
     <p:sldId id="356" r:id="rId4"/>
     <p:sldId id="369" r:id="rId5"/>
     <p:sldId id="370" r:id="rId6"/>
     <p:sldId id="371" r:id="rId7"/>
+    <p:sldId id="372" r:id="rId8"/>
+    <p:sldId id="373" r:id="rId9"/>
+    <p:sldId id="374" r:id="rId10"/>
+    <p:sldId id="376" r:id="rId11"/>
+    <p:sldId id="375" r:id="rId12"/>
+    <p:sldId id="378" r:id="rId13"/>
+    <p:sldId id="379" r:id="rId14"/>
+    <p:sldId id="380" r:id="rId15"/>
+    <p:sldId id="381" r:id="rId16"/>
   </p:sldIdLst>
   <p:sldSz cx="12192000" cy="6858000"/>
   <p:notesSz cx="6858000" cy="9144000"/>
@@ -237,7 +246,7 @@
             <a:pPr rtl="0"/>
             <a:fld id="{444DDF42-EA81-4D58-9E48-71D338B26FAC}" type="datetime1">
               <a:rPr lang="it-IT" smtClean="0"/>
-              <a:t>30/08/2020</a:t>
+              <a:t>06/09/2020</a:t>
             </a:fld>
             <a:endParaRPr lang="it-IT" dirty="0"/>
           </a:p>
@@ -418,7 +427,7 @@
             <a:fld id="{FABFCAD0-C8D4-46EE-8714-3DAE081602B2}" type="datetime1">
               <a:rPr lang="it-IT" smtClean="0"/>
               <a:pPr/>
-              <a:t>30/08/2020</a:t>
+              <a:t>06/09/2020</a:t>
             </a:fld>
             <a:endParaRPr lang="it-IT" dirty="0"/>
           </a:p>
@@ -6752,10 +6761,1325 @@
           </a:p>
         </p:txBody>
       </p:sp>
+      <p:sp>
+        <p:nvSpPr>
+          <p:cNvPr id="9" name="TextBox 8">
+            <a:extLst>
+              <a:ext uri="{FF2B5EF4-FFF2-40B4-BE49-F238E27FC236}">
+                <a16:creationId xmlns:a16="http://schemas.microsoft.com/office/drawing/2014/main" id="{2F0E0252-1D23-4E1D-A160-66EB11BF2174}"/>
+              </a:ext>
+            </a:extLst>
+          </p:cNvPr>
+          <p:cNvSpPr txBox="1"/>
+          <p:nvPr/>
+        </p:nvSpPr>
+        <p:spPr>
+          <a:xfrm>
+            <a:off x="7123922" y="5191603"/>
+            <a:ext cx="3653570" cy="584775"/>
+          </a:xfrm>
+          <a:prstGeom prst="rect">
+            <a:avLst/>
+          </a:prstGeom>
+          <a:solidFill>
+            <a:schemeClr val="accent2">
+              <a:lumMod val="20000"/>
+              <a:lumOff val="80000"/>
+            </a:schemeClr>
+          </a:solidFill>
+        </p:spPr>
+        <p:txBody>
+          <a:bodyPr wrap="square" rtlCol="0">
+            <a:spAutoFit/>
+          </a:bodyPr>
+          <a:lstStyle/>
+          <a:p>
+            <a:r>
+              <a:rPr lang="it-IT" sz="1600" dirty="0"/>
+              <a:t>Graph produced with Tom’s original hemanatree.root file</a:t>
+            </a:r>
+            <a:endParaRPr lang="en-US" sz="1600" dirty="0"/>
+          </a:p>
+        </p:txBody>
+      </p:sp>
+      <p:cxnSp>
+        <p:nvCxnSpPr>
+          <p:cNvPr id="10" name="Straight Arrow Connector 9">
+            <a:extLst>
+              <a:ext uri="{FF2B5EF4-FFF2-40B4-BE49-F238E27FC236}">
+                <a16:creationId xmlns:a16="http://schemas.microsoft.com/office/drawing/2014/main" id="{356A360A-58BF-42C3-9CA8-DC67DEDC1087}"/>
+              </a:ext>
+            </a:extLst>
+          </p:cNvPr>
+          <p:cNvCxnSpPr>
+            <a:cxnSpLocks/>
+          </p:cNvCxnSpPr>
+          <p:nvPr/>
+        </p:nvCxnSpPr>
+        <p:spPr>
+          <a:xfrm flipH="1" flipV="1">
+            <a:off x="6096000" y="5083530"/>
+            <a:ext cx="1027921" cy="400461"/>
+          </a:xfrm>
+          <a:prstGeom prst="straightConnector1">
+            <a:avLst/>
+          </a:prstGeom>
+          <a:ln>
+            <a:tailEnd type="triangle"/>
+          </a:ln>
+        </p:spPr>
+        <p:style>
+          <a:lnRef idx="1">
+            <a:schemeClr val="accent1"/>
+          </a:lnRef>
+          <a:fillRef idx="0">
+            <a:schemeClr val="accent1"/>
+          </a:fillRef>
+          <a:effectRef idx="0">
+            <a:schemeClr val="accent1"/>
+          </a:effectRef>
+          <a:fontRef idx="minor">
+            <a:schemeClr val="tx1"/>
+          </a:fontRef>
+        </p:style>
+      </p:cxnSp>
     </p:spTree>
     <p:extLst>
       <p:ext uri="{BB962C8B-B14F-4D97-AF65-F5344CB8AC3E}">
         <p14:creationId xmlns:p14="http://schemas.microsoft.com/office/powerpoint/2010/main" val="2631776314"/>
+      </p:ext>
+    </p:extLst>
+  </p:cSld>
+  <p:clrMapOvr>
+    <a:masterClrMapping/>
+  </p:clrMapOvr>
+</p:sld>
+</file>
+
+<file path=ppt/slides/slide10.xml><?xml version="1.0" encoding="utf-8"?>
+<p:sld xmlns:a="http://schemas.openxmlformats.org/drawingml/2006/main" xmlns:r="http://schemas.openxmlformats.org/officeDocument/2006/relationships" xmlns:p="http://schemas.openxmlformats.org/presentationml/2006/main">
+  <p:cSld>
+    <p:spTree>
+      <p:nvGrpSpPr>
+        <p:cNvPr id="1" name=""/>
+        <p:cNvGrpSpPr/>
+        <p:nvPr/>
+      </p:nvGrpSpPr>
+      <p:grpSpPr>
+        <a:xfrm>
+          <a:off x="0" y="0"/>
+          <a:ext cx="0" cy="0"/>
+          <a:chOff x="0" y="0"/>
+          <a:chExt cx="0" cy="0"/>
+        </a:xfrm>
+      </p:grpSpPr>
+      <p:sp>
+        <p:nvSpPr>
+          <p:cNvPr id="2" name="Titolo 1">
+            <a:extLst>
+              <a:ext uri="{FF2B5EF4-FFF2-40B4-BE49-F238E27FC236}">
+                <a16:creationId xmlns:a16="http://schemas.microsoft.com/office/drawing/2014/main" id="{AEA5083B-CC27-4F1C-AD03-E3DBEC1C9E78}"/>
+              </a:ext>
+            </a:extLst>
+          </p:cNvPr>
+          <p:cNvSpPr>
+            <a:spLocks noGrp="1"/>
+          </p:cNvSpPr>
+          <p:nvPr>
+            <p:ph type="title"/>
+          </p:nvPr>
+        </p:nvSpPr>
+        <p:spPr>
+          <a:xfrm>
+            <a:off x="431999" y="413238"/>
+            <a:ext cx="9198117" cy="450762"/>
+          </a:xfrm>
+          <a:prstGeom prst="rect">
+            <a:avLst/>
+          </a:prstGeom>
+        </p:spPr>
+        <p:txBody>
+          <a:bodyPr rtlCol="0" anchor="ctr">
+            <a:normAutofit/>
+          </a:bodyPr>
+          <a:lstStyle/>
+          <a:p>
+            <a:pPr rtl="0"/>
+            <a:r>
+              <a:rPr lang="it-IT" dirty="0"/>
+              <a:t>PLOTS COMPARISON</a:t>
+            </a:r>
+          </a:p>
+        </p:txBody>
+      </p:sp>
+      <p:sp>
+        <p:nvSpPr>
+          <p:cNvPr id="6" name="Segnaposto numero diapositiva 5">
+            <a:extLst>
+              <a:ext uri="{FF2B5EF4-FFF2-40B4-BE49-F238E27FC236}">
+                <a16:creationId xmlns:a16="http://schemas.microsoft.com/office/drawing/2014/main" id="{46D051DA-5DAD-43A7-A238-51C63BA59FEC}"/>
+              </a:ext>
+            </a:extLst>
+          </p:cNvPr>
+          <p:cNvSpPr>
+            <a:spLocks noGrp="1"/>
+          </p:cNvSpPr>
+          <p:nvPr>
+            <p:ph type="sldNum" sz="quarter" idx="33"/>
+          </p:nvPr>
+        </p:nvSpPr>
+        <p:spPr>
+          <a:xfrm>
+            <a:off x="11772820" y="6401750"/>
+            <a:ext cx="278418" cy="274324"/>
+          </a:xfrm>
+          <a:prstGeom prst="rect">
+            <a:avLst/>
+          </a:prstGeom>
+        </p:spPr>
+        <p:txBody>
+          <a:bodyPr rtlCol="0" anchor="ctr">
+            <a:normAutofit/>
+          </a:bodyPr>
+          <a:lstStyle/>
+          <a:p>
+            <a:pPr rtl="0">
+              <a:spcAft>
+                <a:spcPts val="600"/>
+              </a:spcAft>
+            </a:pPr>
+            <a:fld id="{19B51A1E-902D-48AF-9020-955120F399B6}" type="slidenum">
+              <a:rPr lang="it-IT" smtClean="0"/>
+              <a:pPr rtl="0">
+                <a:spcAft>
+                  <a:spcPts val="600"/>
+                </a:spcAft>
+              </a:pPr>
+              <a:t>10</a:t>
+            </a:fld>
+            <a:endParaRPr lang="it-IT"/>
+          </a:p>
+        </p:txBody>
+      </p:sp>
+      <p:pic>
+        <p:nvPicPr>
+          <p:cNvPr id="9" name="Picture 8">
+            <a:extLst>
+              <a:ext uri="{FF2B5EF4-FFF2-40B4-BE49-F238E27FC236}">
+                <a16:creationId xmlns:a16="http://schemas.microsoft.com/office/drawing/2014/main" id="{7760DC59-4EC5-4056-97E5-6585B541BF8E}"/>
+              </a:ext>
+            </a:extLst>
+          </p:cNvPr>
+          <p:cNvPicPr>
+            <a:picLocks noChangeAspect="1"/>
+          </p:cNvPicPr>
+          <p:nvPr/>
+        </p:nvPicPr>
+        <p:blipFill>
+          <a:blip r:embed="rId2">
+            <a:extLst>
+              <a:ext uri="{28A0092B-C50C-407E-A947-70E740481C1C}">
+                <a14:useLocalDpi xmlns:a14="http://schemas.microsoft.com/office/drawing/2010/main" val="0"/>
+              </a:ext>
+            </a:extLst>
+          </a:blip>
+          <a:srcRect/>
+          <a:stretch/>
+        </p:blipFill>
+        <p:spPr>
+          <a:xfrm>
+            <a:off x="1354506" y="1554867"/>
+            <a:ext cx="4187279" cy="3247449"/>
+          </a:xfrm>
+          <a:prstGeom prst="rect">
+            <a:avLst/>
+          </a:prstGeom>
+        </p:spPr>
+      </p:pic>
+      <p:sp>
+        <p:nvSpPr>
+          <p:cNvPr id="14" name="TextBox 13">
+            <a:extLst>
+              <a:ext uri="{FF2B5EF4-FFF2-40B4-BE49-F238E27FC236}">
+                <a16:creationId xmlns:a16="http://schemas.microsoft.com/office/drawing/2014/main" id="{29458311-7E83-4F47-9F56-ADD75CE3FEE7}"/>
+              </a:ext>
+            </a:extLst>
+          </p:cNvPr>
+          <p:cNvSpPr txBox="1"/>
+          <p:nvPr/>
+        </p:nvSpPr>
+        <p:spPr>
+          <a:xfrm>
+            <a:off x="1774401" y="4869857"/>
+            <a:ext cx="3347490" cy="1077218"/>
+          </a:xfrm>
+          <a:prstGeom prst="rect">
+            <a:avLst/>
+          </a:prstGeom>
+          <a:solidFill>
+            <a:schemeClr val="accent2">
+              <a:lumMod val="20000"/>
+              <a:lumOff val="80000"/>
+            </a:schemeClr>
+          </a:solidFill>
+        </p:spPr>
+        <p:txBody>
+          <a:bodyPr wrap="square" rtlCol="0">
+            <a:spAutoFit/>
+          </a:bodyPr>
+          <a:lstStyle/>
+          <a:p>
+            <a:r>
+              <a:rPr lang="it-IT" sz="1600" dirty="0"/>
+              <a:t>Resolution plot produced on garsoft v3 with random low energy muon sample generated upstream outside the detector (z=-500)</a:t>
+            </a:r>
+            <a:endParaRPr lang="en-US" sz="1600" dirty="0"/>
+          </a:p>
+        </p:txBody>
+      </p:sp>
+      <p:sp>
+        <p:nvSpPr>
+          <p:cNvPr id="3" name="TextBox 2">
+            <a:extLst>
+              <a:ext uri="{FF2B5EF4-FFF2-40B4-BE49-F238E27FC236}">
+                <a16:creationId xmlns:a16="http://schemas.microsoft.com/office/drawing/2014/main" id="{EC437B08-CF6A-46CA-B5D9-F1267286FC73}"/>
+              </a:ext>
+            </a:extLst>
+          </p:cNvPr>
+          <p:cNvSpPr txBox="1"/>
+          <p:nvPr/>
+        </p:nvSpPr>
+        <p:spPr>
+          <a:xfrm>
+            <a:off x="727969" y="997762"/>
+            <a:ext cx="10422384" cy="369332"/>
+          </a:xfrm>
+          <a:prstGeom prst="rect">
+            <a:avLst/>
+          </a:prstGeom>
+          <a:noFill/>
+        </p:spPr>
+        <p:txBody>
+          <a:bodyPr wrap="square" rtlCol="0">
+            <a:spAutoFit/>
+          </a:bodyPr>
+          <a:lstStyle/>
+          <a:p>
+            <a:pPr marL="285750" indent="-285750">
+              <a:buFont typeface="Arial" panose="020B0604020202020204" pitchFamily="34" charset="0"/>
+              <a:buChar char="•"/>
+            </a:pPr>
+            <a:r>
+              <a:rPr lang="it-IT" dirty="0"/>
+              <a:t>Was finally able to install garsoft v3 successfully and to produce these resolution graphs</a:t>
+            </a:r>
+            <a:endParaRPr lang="en-US" dirty="0"/>
+          </a:p>
+        </p:txBody>
+      </p:sp>
+      <p:sp>
+        <p:nvSpPr>
+          <p:cNvPr id="10" name="TextBox 9">
+            <a:extLst>
+              <a:ext uri="{FF2B5EF4-FFF2-40B4-BE49-F238E27FC236}">
+                <a16:creationId xmlns:a16="http://schemas.microsoft.com/office/drawing/2014/main" id="{27C21526-8175-49B9-BEEE-F41DA26D6B66}"/>
+              </a:ext>
+            </a:extLst>
+          </p:cNvPr>
+          <p:cNvSpPr txBox="1"/>
+          <p:nvPr/>
+        </p:nvSpPr>
+        <p:spPr>
+          <a:xfrm>
+            <a:off x="6997116" y="4869857"/>
+            <a:ext cx="3347490" cy="1077218"/>
+          </a:xfrm>
+          <a:prstGeom prst="rect">
+            <a:avLst/>
+          </a:prstGeom>
+          <a:solidFill>
+            <a:schemeClr val="accent2">
+              <a:lumMod val="20000"/>
+              <a:lumOff val="80000"/>
+            </a:schemeClr>
+          </a:solidFill>
+        </p:spPr>
+        <p:txBody>
+          <a:bodyPr wrap="square" rtlCol="0">
+            <a:spAutoFit/>
+          </a:bodyPr>
+          <a:lstStyle/>
+          <a:p>
+            <a:r>
+              <a:rPr lang="it-IT" sz="1600" dirty="0"/>
+              <a:t>Resolution plot produced on garsoft v3 with random low energy muon sample generated upstream outside the detector (z=-500)</a:t>
+            </a:r>
+            <a:endParaRPr lang="en-US" sz="1600" dirty="0"/>
+          </a:p>
+        </p:txBody>
+      </p:sp>
+      <p:pic>
+        <p:nvPicPr>
+          <p:cNvPr id="7" name="Picture 6" descr="A screenshot of a cell phone&#10;&#10;Description automatically generated">
+            <a:extLst>
+              <a:ext uri="{FF2B5EF4-FFF2-40B4-BE49-F238E27FC236}">
+                <a16:creationId xmlns:a16="http://schemas.microsoft.com/office/drawing/2014/main" id="{2886EF44-2A48-437C-8737-8801A6148CFF}"/>
+              </a:ext>
+            </a:extLst>
+          </p:cNvPr>
+          <p:cNvPicPr>
+            <a:picLocks noChangeAspect="1"/>
+          </p:cNvPicPr>
+          <p:nvPr/>
+        </p:nvPicPr>
+        <p:blipFill>
+          <a:blip r:embed="rId3">
+            <a:extLst>
+              <a:ext uri="{28A0092B-C50C-407E-A947-70E740481C1C}">
+                <a14:useLocalDpi xmlns:a14="http://schemas.microsoft.com/office/drawing/2010/main" val="0"/>
+              </a:ext>
+            </a:extLst>
+          </a:blip>
+          <a:stretch>
+            <a:fillRect/>
+          </a:stretch>
+        </p:blipFill>
+        <p:spPr>
+          <a:xfrm>
+            <a:off x="6577221" y="1554867"/>
+            <a:ext cx="4187279" cy="3247449"/>
+          </a:xfrm>
+          <a:prstGeom prst="rect">
+            <a:avLst/>
+          </a:prstGeom>
+        </p:spPr>
+      </p:pic>
+    </p:spTree>
+    <p:extLst>
+      <p:ext uri="{BB962C8B-B14F-4D97-AF65-F5344CB8AC3E}">
+        <p14:creationId xmlns:p14="http://schemas.microsoft.com/office/powerpoint/2010/main" val="2499664456"/>
+      </p:ext>
+    </p:extLst>
+  </p:cSld>
+  <p:clrMapOvr>
+    <a:masterClrMapping/>
+  </p:clrMapOvr>
+</p:sld>
+</file>
+
+<file path=ppt/slides/slide11.xml><?xml version="1.0" encoding="utf-8"?>
+<p:sld xmlns:a="http://schemas.openxmlformats.org/drawingml/2006/main" xmlns:r="http://schemas.openxmlformats.org/officeDocument/2006/relationships" xmlns:p="http://schemas.openxmlformats.org/presentationml/2006/main">
+  <p:cSld>
+    <p:spTree>
+      <p:nvGrpSpPr>
+        <p:cNvPr id="1" name=""/>
+        <p:cNvGrpSpPr/>
+        <p:nvPr/>
+      </p:nvGrpSpPr>
+      <p:grpSpPr>
+        <a:xfrm>
+          <a:off x="0" y="0"/>
+          <a:ext cx="0" cy="0"/>
+          <a:chOff x="0" y="0"/>
+          <a:chExt cx="0" cy="0"/>
+        </a:xfrm>
+      </p:grpSpPr>
+      <p:sp>
+        <p:nvSpPr>
+          <p:cNvPr id="2" name="Titolo 1">
+            <a:extLst>
+              <a:ext uri="{FF2B5EF4-FFF2-40B4-BE49-F238E27FC236}">
+                <a16:creationId xmlns:a16="http://schemas.microsoft.com/office/drawing/2014/main" id="{AEA5083B-CC27-4F1C-AD03-E3DBEC1C9E78}"/>
+              </a:ext>
+            </a:extLst>
+          </p:cNvPr>
+          <p:cNvSpPr>
+            <a:spLocks noGrp="1"/>
+          </p:cNvSpPr>
+          <p:nvPr>
+            <p:ph type="title"/>
+          </p:nvPr>
+        </p:nvSpPr>
+        <p:spPr>
+          <a:xfrm>
+            <a:off x="431999" y="413238"/>
+            <a:ext cx="9198117" cy="450762"/>
+          </a:xfrm>
+          <a:prstGeom prst="rect">
+            <a:avLst/>
+          </a:prstGeom>
+        </p:spPr>
+        <p:txBody>
+          <a:bodyPr rtlCol="0" anchor="ctr">
+            <a:normAutofit/>
+          </a:bodyPr>
+          <a:lstStyle/>
+          <a:p>
+            <a:pPr rtl="0"/>
+            <a:r>
+              <a:rPr lang="it-IT" dirty="0"/>
+              <a:t>PLOTS COMPARISON</a:t>
+            </a:r>
+          </a:p>
+        </p:txBody>
+      </p:sp>
+      <p:sp>
+        <p:nvSpPr>
+          <p:cNvPr id="6" name="Segnaposto numero diapositiva 5">
+            <a:extLst>
+              <a:ext uri="{FF2B5EF4-FFF2-40B4-BE49-F238E27FC236}">
+                <a16:creationId xmlns:a16="http://schemas.microsoft.com/office/drawing/2014/main" id="{46D051DA-5DAD-43A7-A238-51C63BA59FEC}"/>
+              </a:ext>
+            </a:extLst>
+          </p:cNvPr>
+          <p:cNvSpPr>
+            <a:spLocks noGrp="1"/>
+          </p:cNvSpPr>
+          <p:nvPr>
+            <p:ph type="sldNum" sz="quarter" idx="33"/>
+          </p:nvPr>
+        </p:nvSpPr>
+        <p:spPr>
+          <a:xfrm>
+            <a:off x="11772820" y="6401750"/>
+            <a:ext cx="278418" cy="274324"/>
+          </a:xfrm>
+          <a:prstGeom prst="rect">
+            <a:avLst/>
+          </a:prstGeom>
+        </p:spPr>
+        <p:txBody>
+          <a:bodyPr rtlCol="0" anchor="ctr">
+            <a:normAutofit/>
+          </a:bodyPr>
+          <a:lstStyle/>
+          <a:p>
+            <a:pPr rtl="0">
+              <a:spcAft>
+                <a:spcPts val="600"/>
+              </a:spcAft>
+            </a:pPr>
+            <a:fld id="{19B51A1E-902D-48AF-9020-955120F399B6}" type="slidenum">
+              <a:rPr lang="it-IT" smtClean="0"/>
+              <a:pPr rtl="0">
+                <a:spcAft>
+                  <a:spcPts val="600"/>
+                </a:spcAft>
+              </a:pPr>
+              <a:t>11</a:t>
+            </a:fld>
+            <a:endParaRPr lang="it-IT"/>
+          </a:p>
+        </p:txBody>
+      </p:sp>
+      <p:pic>
+        <p:nvPicPr>
+          <p:cNvPr id="9" name="Picture 8">
+            <a:extLst>
+              <a:ext uri="{FF2B5EF4-FFF2-40B4-BE49-F238E27FC236}">
+                <a16:creationId xmlns:a16="http://schemas.microsoft.com/office/drawing/2014/main" id="{7760DC59-4EC5-4056-97E5-6585B541BF8E}"/>
+              </a:ext>
+            </a:extLst>
+          </p:cNvPr>
+          <p:cNvPicPr>
+            <a:picLocks noChangeAspect="1"/>
+          </p:cNvPicPr>
+          <p:nvPr/>
+        </p:nvPicPr>
+        <p:blipFill>
+          <a:blip r:embed="rId2">
+            <a:extLst>
+              <a:ext uri="{28A0092B-C50C-407E-A947-70E740481C1C}">
+                <a14:useLocalDpi xmlns:a14="http://schemas.microsoft.com/office/drawing/2010/main" val="0"/>
+              </a:ext>
+            </a:extLst>
+          </a:blip>
+          <a:srcRect/>
+          <a:stretch/>
+        </p:blipFill>
+        <p:spPr>
+          <a:xfrm>
+            <a:off x="1354506" y="1554867"/>
+            <a:ext cx="4187279" cy="3247448"/>
+          </a:xfrm>
+          <a:prstGeom prst="rect">
+            <a:avLst/>
+          </a:prstGeom>
+        </p:spPr>
+      </p:pic>
+      <p:sp>
+        <p:nvSpPr>
+          <p:cNvPr id="14" name="TextBox 13">
+            <a:extLst>
+              <a:ext uri="{FF2B5EF4-FFF2-40B4-BE49-F238E27FC236}">
+                <a16:creationId xmlns:a16="http://schemas.microsoft.com/office/drawing/2014/main" id="{29458311-7E83-4F47-9F56-ADD75CE3FEE7}"/>
+              </a:ext>
+            </a:extLst>
+          </p:cNvPr>
+          <p:cNvSpPr txBox="1"/>
+          <p:nvPr/>
+        </p:nvSpPr>
+        <p:spPr>
+          <a:xfrm>
+            <a:off x="1774401" y="4869857"/>
+            <a:ext cx="3347490" cy="1077218"/>
+          </a:xfrm>
+          <a:prstGeom prst="rect">
+            <a:avLst/>
+          </a:prstGeom>
+          <a:solidFill>
+            <a:schemeClr val="accent2">
+              <a:lumMod val="20000"/>
+              <a:lumOff val="80000"/>
+            </a:schemeClr>
+          </a:solidFill>
+        </p:spPr>
+        <p:txBody>
+          <a:bodyPr wrap="square" rtlCol="0">
+            <a:spAutoFit/>
+          </a:bodyPr>
+          <a:lstStyle/>
+          <a:p>
+            <a:r>
+              <a:rPr lang="it-IT" sz="1600" dirty="0"/>
+              <a:t>Resolution plot produced on garsoft v3 with random low energy muon sample generated upstream inside the detector (z=-190)</a:t>
+            </a:r>
+            <a:endParaRPr lang="en-US" sz="1600" dirty="0"/>
+          </a:p>
+        </p:txBody>
+      </p:sp>
+      <p:sp>
+        <p:nvSpPr>
+          <p:cNvPr id="3" name="TextBox 2">
+            <a:extLst>
+              <a:ext uri="{FF2B5EF4-FFF2-40B4-BE49-F238E27FC236}">
+                <a16:creationId xmlns:a16="http://schemas.microsoft.com/office/drawing/2014/main" id="{EC437B08-CF6A-46CA-B5D9-F1267286FC73}"/>
+              </a:ext>
+            </a:extLst>
+          </p:cNvPr>
+          <p:cNvSpPr txBox="1"/>
+          <p:nvPr/>
+        </p:nvSpPr>
+        <p:spPr>
+          <a:xfrm>
+            <a:off x="727969" y="864000"/>
+            <a:ext cx="10422384" cy="646331"/>
+          </a:xfrm>
+          <a:prstGeom prst="rect">
+            <a:avLst/>
+          </a:prstGeom>
+          <a:noFill/>
+        </p:spPr>
+        <p:txBody>
+          <a:bodyPr wrap="square" rtlCol="0">
+            <a:spAutoFit/>
+          </a:bodyPr>
+          <a:lstStyle/>
+          <a:p>
+            <a:pPr marL="285750" indent="-285750">
+              <a:buFont typeface="Arial" panose="020B0604020202020204" pitchFamily="34" charset="0"/>
+              <a:buChar char="•"/>
+            </a:pPr>
+            <a:r>
+              <a:rPr lang="it-IT" dirty="0"/>
+              <a:t>To check if the resolution degradation was due to energy loss in calorimeter, I redid the simulation with a new muon sample generated inside the gas detector</a:t>
+            </a:r>
+            <a:endParaRPr lang="en-US" dirty="0"/>
+          </a:p>
+        </p:txBody>
+      </p:sp>
+      <p:sp>
+        <p:nvSpPr>
+          <p:cNvPr id="10" name="TextBox 9">
+            <a:extLst>
+              <a:ext uri="{FF2B5EF4-FFF2-40B4-BE49-F238E27FC236}">
+                <a16:creationId xmlns:a16="http://schemas.microsoft.com/office/drawing/2014/main" id="{27C21526-8175-49B9-BEEE-F41DA26D6B66}"/>
+              </a:ext>
+            </a:extLst>
+          </p:cNvPr>
+          <p:cNvSpPr txBox="1"/>
+          <p:nvPr/>
+        </p:nvSpPr>
+        <p:spPr>
+          <a:xfrm>
+            <a:off x="6997116" y="4869857"/>
+            <a:ext cx="3347490" cy="1077218"/>
+          </a:xfrm>
+          <a:prstGeom prst="rect">
+            <a:avLst/>
+          </a:prstGeom>
+          <a:solidFill>
+            <a:schemeClr val="accent2">
+              <a:lumMod val="20000"/>
+              <a:lumOff val="80000"/>
+            </a:schemeClr>
+          </a:solidFill>
+        </p:spPr>
+        <p:txBody>
+          <a:bodyPr wrap="square" rtlCol="0">
+            <a:spAutoFit/>
+          </a:bodyPr>
+          <a:lstStyle/>
+          <a:p>
+            <a:r>
+              <a:rPr lang="it-IT" sz="1600" dirty="0"/>
+              <a:t>Resolution plot produced on garsoft v3 with random low energy muon sample generated upstream inside the detector (z=-190)</a:t>
+            </a:r>
+            <a:endParaRPr lang="en-US" sz="1600" dirty="0"/>
+          </a:p>
+        </p:txBody>
+      </p:sp>
+      <p:pic>
+        <p:nvPicPr>
+          <p:cNvPr id="7" name="Picture 6">
+            <a:extLst>
+              <a:ext uri="{FF2B5EF4-FFF2-40B4-BE49-F238E27FC236}">
+                <a16:creationId xmlns:a16="http://schemas.microsoft.com/office/drawing/2014/main" id="{2886EF44-2A48-437C-8737-8801A6148CFF}"/>
+              </a:ext>
+            </a:extLst>
+          </p:cNvPr>
+          <p:cNvPicPr>
+            <a:picLocks noChangeAspect="1"/>
+          </p:cNvPicPr>
+          <p:nvPr/>
+        </p:nvPicPr>
+        <p:blipFill>
+          <a:blip r:embed="rId3">
+            <a:extLst>
+              <a:ext uri="{28A0092B-C50C-407E-A947-70E740481C1C}">
+                <a14:useLocalDpi xmlns:a14="http://schemas.microsoft.com/office/drawing/2010/main" val="0"/>
+              </a:ext>
+            </a:extLst>
+          </a:blip>
+          <a:srcRect/>
+          <a:stretch/>
+        </p:blipFill>
+        <p:spPr>
+          <a:xfrm>
+            <a:off x="6577221" y="1554867"/>
+            <a:ext cx="4187279" cy="3247448"/>
+          </a:xfrm>
+          <a:prstGeom prst="rect">
+            <a:avLst/>
+          </a:prstGeom>
+        </p:spPr>
+      </p:pic>
+    </p:spTree>
+    <p:extLst>
+      <p:ext uri="{BB962C8B-B14F-4D97-AF65-F5344CB8AC3E}">
+        <p14:creationId xmlns:p14="http://schemas.microsoft.com/office/powerpoint/2010/main" val="2284683645"/>
+      </p:ext>
+    </p:extLst>
+  </p:cSld>
+  <p:clrMapOvr>
+    <a:masterClrMapping/>
+  </p:clrMapOvr>
+</p:sld>
+</file>
+
+<file path=ppt/slides/slide12.xml><?xml version="1.0" encoding="utf-8"?>
+<p:sld xmlns:a="http://schemas.openxmlformats.org/drawingml/2006/main" xmlns:r="http://schemas.openxmlformats.org/officeDocument/2006/relationships" xmlns:p="http://schemas.openxmlformats.org/presentationml/2006/main">
+  <p:cSld>
+    <p:spTree>
+      <p:nvGrpSpPr>
+        <p:cNvPr id="1" name=""/>
+        <p:cNvGrpSpPr/>
+        <p:nvPr/>
+      </p:nvGrpSpPr>
+      <p:grpSpPr>
+        <a:xfrm>
+          <a:off x="0" y="0"/>
+          <a:ext cx="0" cy="0"/>
+          <a:chOff x="0" y="0"/>
+          <a:chExt cx="0" cy="0"/>
+        </a:xfrm>
+      </p:grpSpPr>
+      <p:sp>
+        <p:nvSpPr>
+          <p:cNvPr id="2" name="Titolo 1">
+            <a:extLst>
+              <a:ext uri="{FF2B5EF4-FFF2-40B4-BE49-F238E27FC236}">
+                <a16:creationId xmlns:a16="http://schemas.microsoft.com/office/drawing/2014/main" id="{AEA5083B-CC27-4F1C-AD03-E3DBEC1C9E78}"/>
+              </a:ext>
+            </a:extLst>
+          </p:cNvPr>
+          <p:cNvSpPr>
+            <a:spLocks noGrp="1"/>
+          </p:cNvSpPr>
+          <p:nvPr>
+            <p:ph type="title"/>
+          </p:nvPr>
+        </p:nvSpPr>
+        <p:spPr>
+          <a:xfrm>
+            <a:off x="431999" y="413238"/>
+            <a:ext cx="9198117" cy="450762"/>
+          </a:xfrm>
+          <a:prstGeom prst="rect">
+            <a:avLst/>
+          </a:prstGeom>
+        </p:spPr>
+        <p:txBody>
+          <a:bodyPr rtlCol="0" anchor="ctr">
+            <a:normAutofit/>
+          </a:bodyPr>
+          <a:lstStyle/>
+          <a:p>
+            <a:pPr rtl="0"/>
+            <a:r>
+              <a:rPr lang="it-IT" dirty="0"/>
+              <a:t>PLOTS COMPARISON</a:t>
+            </a:r>
+          </a:p>
+        </p:txBody>
+      </p:sp>
+      <p:sp>
+        <p:nvSpPr>
+          <p:cNvPr id="6" name="Segnaposto numero diapositiva 5">
+            <a:extLst>
+              <a:ext uri="{FF2B5EF4-FFF2-40B4-BE49-F238E27FC236}">
+                <a16:creationId xmlns:a16="http://schemas.microsoft.com/office/drawing/2014/main" id="{46D051DA-5DAD-43A7-A238-51C63BA59FEC}"/>
+              </a:ext>
+            </a:extLst>
+          </p:cNvPr>
+          <p:cNvSpPr>
+            <a:spLocks noGrp="1"/>
+          </p:cNvSpPr>
+          <p:nvPr>
+            <p:ph type="sldNum" sz="quarter" idx="33"/>
+          </p:nvPr>
+        </p:nvSpPr>
+        <p:spPr>
+          <a:xfrm>
+            <a:off x="11772820" y="6401750"/>
+            <a:ext cx="278418" cy="274324"/>
+          </a:xfrm>
+          <a:prstGeom prst="rect">
+            <a:avLst/>
+          </a:prstGeom>
+        </p:spPr>
+        <p:txBody>
+          <a:bodyPr rtlCol="0" anchor="ctr">
+            <a:normAutofit/>
+          </a:bodyPr>
+          <a:lstStyle/>
+          <a:p>
+            <a:pPr rtl="0">
+              <a:spcAft>
+                <a:spcPts val="600"/>
+              </a:spcAft>
+            </a:pPr>
+            <a:fld id="{19B51A1E-902D-48AF-9020-955120F399B6}" type="slidenum">
+              <a:rPr lang="it-IT" smtClean="0"/>
+              <a:pPr rtl="0">
+                <a:spcAft>
+                  <a:spcPts val="600"/>
+                </a:spcAft>
+              </a:pPr>
+              <a:t>12</a:t>
+            </a:fld>
+            <a:endParaRPr lang="it-IT"/>
+          </a:p>
+        </p:txBody>
+      </p:sp>
+      <p:pic>
+        <p:nvPicPr>
+          <p:cNvPr id="9" name="Picture 8">
+            <a:extLst>
+              <a:ext uri="{FF2B5EF4-FFF2-40B4-BE49-F238E27FC236}">
+                <a16:creationId xmlns:a16="http://schemas.microsoft.com/office/drawing/2014/main" id="{7760DC59-4EC5-4056-97E5-6585B541BF8E}"/>
+              </a:ext>
+            </a:extLst>
+          </p:cNvPr>
+          <p:cNvPicPr>
+            <a:picLocks noChangeAspect="1"/>
+          </p:cNvPicPr>
+          <p:nvPr/>
+        </p:nvPicPr>
+        <p:blipFill>
+          <a:blip r:embed="rId2">
+            <a:extLst>
+              <a:ext uri="{28A0092B-C50C-407E-A947-70E740481C1C}">
+                <a14:useLocalDpi xmlns:a14="http://schemas.microsoft.com/office/drawing/2010/main" val="0"/>
+              </a:ext>
+            </a:extLst>
+          </a:blip>
+          <a:srcRect/>
+          <a:stretch/>
+        </p:blipFill>
+        <p:spPr>
+          <a:xfrm>
+            <a:off x="1354507" y="1554867"/>
+            <a:ext cx="4187277" cy="3247448"/>
+          </a:xfrm>
+          <a:prstGeom prst="rect">
+            <a:avLst/>
+          </a:prstGeom>
+        </p:spPr>
+      </p:pic>
+      <p:sp>
+        <p:nvSpPr>
+          <p:cNvPr id="14" name="TextBox 13">
+            <a:extLst>
+              <a:ext uri="{FF2B5EF4-FFF2-40B4-BE49-F238E27FC236}">
+                <a16:creationId xmlns:a16="http://schemas.microsoft.com/office/drawing/2014/main" id="{29458311-7E83-4F47-9F56-ADD75CE3FEE7}"/>
+              </a:ext>
+            </a:extLst>
+          </p:cNvPr>
+          <p:cNvSpPr txBox="1"/>
+          <p:nvPr/>
+        </p:nvSpPr>
+        <p:spPr>
+          <a:xfrm>
+            <a:off x="1774401" y="4869857"/>
+            <a:ext cx="3347490" cy="1077218"/>
+          </a:xfrm>
+          <a:prstGeom prst="rect">
+            <a:avLst/>
+          </a:prstGeom>
+          <a:solidFill>
+            <a:schemeClr val="accent2">
+              <a:lumMod val="20000"/>
+              <a:lumOff val="80000"/>
+            </a:schemeClr>
+          </a:solidFill>
+        </p:spPr>
+        <p:txBody>
+          <a:bodyPr wrap="square" rtlCol="0">
+            <a:spAutoFit/>
+          </a:bodyPr>
+          <a:lstStyle/>
+          <a:p>
+            <a:r>
+              <a:rPr lang="it-IT" sz="1600" dirty="0"/>
+              <a:t>Resolution plot produced on garsoft v3 with random low energy muon sample generated upstream inside the detector (z=-190)</a:t>
+            </a:r>
+            <a:endParaRPr lang="en-US" sz="1600" dirty="0"/>
+          </a:p>
+        </p:txBody>
+      </p:sp>
+      <p:sp>
+        <p:nvSpPr>
+          <p:cNvPr id="3" name="TextBox 2">
+            <a:extLst>
+              <a:ext uri="{FF2B5EF4-FFF2-40B4-BE49-F238E27FC236}">
+                <a16:creationId xmlns:a16="http://schemas.microsoft.com/office/drawing/2014/main" id="{EC437B08-CF6A-46CA-B5D9-F1267286FC73}"/>
+              </a:ext>
+            </a:extLst>
+          </p:cNvPr>
+          <p:cNvSpPr txBox="1"/>
+          <p:nvPr/>
+        </p:nvSpPr>
+        <p:spPr>
+          <a:xfrm>
+            <a:off x="727969" y="864000"/>
+            <a:ext cx="10422384" cy="369332"/>
+          </a:xfrm>
+          <a:prstGeom prst="rect">
+            <a:avLst/>
+          </a:prstGeom>
+          <a:noFill/>
+        </p:spPr>
+        <p:txBody>
+          <a:bodyPr wrap="square" rtlCol="0">
+            <a:spAutoFit/>
+          </a:bodyPr>
+          <a:lstStyle/>
+          <a:p>
+            <a:pPr marL="285750" indent="-285750">
+              <a:buFont typeface="Arial" panose="020B0604020202020204" pitchFamily="34" charset="0"/>
+              <a:buChar char="•"/>
+            </a:pPr>
+            <a:r>
+              <a:rPr lang="it-IT" dirty="0"/>
+              <a:t>I also did graphs of MC momentum at the end of trajectory minus p at the end</a:t>
+            </a:r>
+            <a:endParaRPr lang="en-US" dirty="0"/>
+          </a:p>
+        </p:txBody>
+      </p:sp>
+      <p:sp>
+        <p:nvSpPr>
+          <p:cNvPr id="10" name="TextBox 9">
+            <a:extLst>
+              <a:ext uri="{FF2B5EF4-FFF2-40B4-BE49-F238E27FC236}">
+                <a16:creationId xmlns:a16="http://schemas.microsoft.com/office/drawing/2014/main" id="{27C21526-8175-49B9-BEEE-F41DA26D6B66}"/>
+              </a:ext>
+            </a:extLst>
+          </p:cNvPr>
+          <p:cNvSpPr txBox="1"/>
+          <p:nvPr/>
+        </p:nvSpPr>
+        <p:spPr>
+          <a:xfrm>
+            <a:off x="6997116" y="4869857"/>
+            <a:ext cx="3347490" cy="1077218"/>
+          </a:xfrm>
+          <a:prstGeom prst="rect">
+            <a:avLst/>
+          </a:prstGeom>
+          <a:solidFill>
+            <a:schemeClr val="accent2">
+              <a:lumMod val="20000"/>
+              <a:lumOff val="80000"/>
+            </a:schemeClr>
+          </a:solidFill>
+        </p:spPr>
+        <p:txBody>
+          <a:bodyPr wrap="square" rtlCol="0">
+            <a:spAutoFit/>
+          </a:bodyPr>
+          <a:lstStyle/>
+          <a:p>
+            <a:r>
+              <a:rPr lang="it-IT" sz="1600" dirty="0"/>
+              <a:t>Resolution plot produced on garsoft v3 with random low energy muon sample generated upstream inside the detector (z=-190)</a:t>
+            </a:r>
+            <a:endParaRPr lang="en-US" sz="1600" dirty="0"/>
+          </a:p>
+        </p:txBody>
+      </p:sp>
+      <p:pic>
+        <p:nvPicPr>
+          <p:cNvPr id="7" name="Picture 6">
+            <a:extLst>
+              <a:ext uri="{FF2B5EF4-FFF2-40B4-BE49-F238E27FC236}">
+                <a16:creationId xmlns:a16="http://schemas.microsoft.com/office/drawing/2014/main" id="{2886EF44-2A48-437C-8737-8801A6148CFF}"/>
+              </a:ext>
+            </a:extLst>
+          </p:cNvPr>
+          <p:cNvPicPr>
+            <a:picLocks noChangeAspect="1"/>
+          </p:cNvPicPr>
+          <p:nvPr/>
+        </p:nvPicPr>
+        <p:blipFill>
+          <a:blip r:embed="rId3">
+            <a:extLst>
+              <a:ext uri="{28A0092B-C50C-407E-A947-70E740481C1C}">
+                <a14:useLocalDpi xmlns:a14="http://schemas.microsoft.com/office/drawing/2010/main" val="0"/>
+              </a:ext>
+            </a:extLst>
+          </a:blip>
+          <a:srcRect/>
+          <a:stretch/>
+        </p:blipFill>
+        <p:spPr>
+          <a:xfrm>
+            <a:off x="6577222" y="1554867"/>
+            <a:ext cx="4187277" cy="3247448"/>
+          </a:xfrm>
+          <a:prstGeom prst="rect">
+            <a:avLst/>
+          </a:prstGeom>
+        </p:spPr>
+      </p:pic>
+    </p:spTree>
+    <p:extLst>
+      <p:ext uri="{BB962C8B-B14F-4D97-AF65-F5344CB8AC3E}">
+        <p14:creationId xmlns:p14="http://schemas.microsoft.com/office/powerpoint/2010/main" val="1742586818"/>
+      </p:ext>
+    </p:extLst>
+  </p:cSld>
+  <p:clrMapOvr>
+    <a:masterClrMapping/>
+  </p:clrMapOvr>
+</p:sld>
+</file>
+
+<file path=ppt/slides/slide13.xml><?xml version="1.0" encoding="utf-8"?>
+<p:sld xmlns:a="http://schemas.openxmlformats.org/drawingml/2006/main" xmlns:r="http://schemas.openxmlformats.org/officeDocument/2006/relationships" xmlns:p="http://schemas.openxmlformats.org/presentationml/2006/main">
+  <p:cSld>
+    <p:spTree>
+      <p:nvGrpSpPr>
+        <p:cNvPr id="1" name=""/>
+        <p:cNvGrpSpPr/>
+        <p:nvPr/>
+      </p:nvGrpSpPr>
+      <p:grpSpPr>
+        <a:xfrm>
+          <a:off x="0" y="0"/>
+          <a:ext cx="0" cy="0"/>
+          <a:chOff x="0" y="0"/>
+          <a:chExt cx="0" cy="0"/>
+        </a:xfrm>
+      </p:grpSpPr>
+      <p:sp>
+        <p:nvSpPr>
+          <p:cNvPr id="2" name="Titolo 1">
+            <a:extLst>
+              <a:ext uri="{FF2B5EF4-FFF2-40B4-BE49-F238E27FC236}">
+                <a16:creationId xmlns:a16="http://schemas.microsoft.com/office/drawing/2014/main" id="{AEA5083B-CC27-4F1C-AD03-E3DBEC1C9E78}"/>
+              </a:ext>
+            </a:extLst>
+          </p:cNvPr>
+          <p:cNvSpPr>
+            <a:spLocks noGrp="1"/>
+          </p:cNvSpPr>
+          <p:nvPr>
+            <p:ph type="title"/>
+          </p:nvPr>
+        </p:nvSpPr>
+        <p:spPr>
+          <a:xfrm>
+            <a:off x="431999" y="413238"/>
+            <a:ext cx="9198117" cy="450762"/>
+          </a:xfrm>
+          <a:prstGeom prst="rect">
+            <a:avLst/>
+          </a:prstGeom>
+        </p:spPr>
+        <p:txBody>
+          <a:bodyPr rtlCol="0" anchor="ctr">
+            <a:normAutofit/>
+          </a:bodyPr>
+          <a:lstStyle/>
+          <a:p>
+            <a:pPr rtl="0"/>
+            <a:r>
+              <a:rPr lang="it-IT" dirty="0"/>
+              <a:t>PLOTS COMPARISON</a:t>
+            </a:r>
+          </a:p>
+        </p:txBody>
+      </p:sp>
+      <p:sp>
+        <p:nvSpPr>
+          <p:cNvPr id="6" name="Segnaposto numero diapositiva 5">
+            <a:extLst>
+              <a:ext uri="{FF2B5EF4-FFF2-40B4-BE49-F238E27FC236}">
+                <a16:creationId xmlns:a16="http://schemas.microsoft.com/office/drawing/2014/main" id="{46D051DA-5DAD-43A7-A238-51C63BA59FEC}"/>
+              </a:ext>
+            </a:extLst>
+          </p:cNvPr>
+          <p:cNvSpPr>
+            <a:spLocks noGrp="1"/>
+          </p:cNvSpPr>
+          <p:nvPr>
+            <p:ph type="sldNum" sz="quarter" idx="33"/>
+          </p:nvPr>
+        </p:nvSpPr>
+        <p:spPr>
+          <a:xfrm>
+            <a:off x="11772820" y="6401750"/>
+            <a:ext cx="278418" cy="274324"/>
+          </a:xfrm>
+          <a:prstGeom prst="rect">
+            <a:avLst/>
+          </a:prstGeom>
+        </p:spPr>
+        <p:txBody>
+          <a:bodyPr rtlCol="0" anchor="ctr">
+            <a:normAutofit/>
+          </a:bodyPr>
+          <a:lstStyle/>
+          <a:p>
+            <a:pPr rtl="0">
+              <a:spcAft>
+                <a:spcPts val="600"/>
+              </a:spcAft>
+            </a:pPr>
+            <a:fld id="{19B51A1E-902D-48AF-9020-955120F399B6}" type="slidenum">
+              <a:rPr lang="it-IT" smtClean="0"/>
+              <a:pPr rtl="0">
+                <a:spcAft>
+                  <a:spcPts val="600"/>
+                </a:spcAft>
+              </a:pPr>
+              <a:t>13</a:t>
+            </a:fld>
+            <a:endParaRPr lang="it-IT"/>
+          </a:p>
+        </p:txBody>
+      </p:sp>
+      <p:sp>
+        <p:nvSpPr>
+          <p:cNvPr id="3" name="TextBox 2">
+            <a:extLst>
+              <a:ext uri="{FF2B5EF4-FFF2-40B4-BE49-F238E27FC236}">
+                <a16:creationId xmlns:a16="http://schemas.microsoft.com/office/drawing/2014/main" id="{EC437B08-CF6A-46CA-B5D9-F1267286FC73}"/>
+              </a:ext>
+            </a:extLst>
+          </p:cNvPr>
+          <p:cNvSpPr txBox="1"/>
+          <p:nvPr/>
+        </p:nvSpPr>
+        <p:spPr>
+          <a:xfrm>
+            <a:off x="4186142" y="217669"/>
+            <a:ext cx="7330624" cy="646331"/>
+          </a:xfrm>
+          <a:prstGeom prst="rect">
+            <a:avLst/>
+          </a:prstGeom>
+          <a:noFill/>
+        </p:spPr>
+        <p:txBody>
+          <a:bodyPr wrap="square" rtlCol="0">
+            <a:spAutoFit/>
+          </a:bodyPr>
+          <a:lstStyle/>
+          <a:p>
+            <a:pPr marL="285750" indent="-285750">
+              <a:buFont typeface="Arial" panose="020B0604020202020204" pitchFamily="34" charset="0"/>
+              <a:buChar char="•"/>
+            </a:pPr>
+            <a:r>
+              <a:rPr lang="it-IT" dirty="0"/>
+              <a:t>Finally I also checked both the resolution and the relative change in momentum as function of y</a:t>
+            </a:r>
+            <a:endParaRPr lang="en-US" dirty="0"/>
+          </a:p>
+        </p:txBody>
+      </p:sp>
+      <p:pic>
+        <p:nvPicPr>
+          <p:cNvPr id="5" name="Picture 4" descr="A screenshot of a cell phone&#10;&#10;Description automatically generated">
+            <a:extLst>
+              <a:ext uri="{FF2B5EF4-FFF2-40B4-BE49-F238E27FC236}">
+                <a16:creationId xmlns:a16="http://schemas.microsoft.com/office/drawing/2014/main" id="{CEBBE01D-4557-4279-9CFA-4383C287B57D}"/>
+              </a:ext>
+            </a:extLst>
+          </p:cNvPr>
+          <p:cNvPicPr>
+            <a:picLocks noChangeAspect="1"/>
+          </p:cNvPicPr>
+          <p:nvPr/>
+        </p:nvPicPr>
+        <p:blipFill>
+          <a:blip r:embed="rId2">
+            <a:extLst>
+              <a:ext uri="{28A0092B-C50C-407E-A947-70E740481C1C}">
+                <a14:useLocalDpi xmlns:a14="http://schemas.microsoft.com/office/drawing/2010/main" val="0"/>
+              </a:ext>
+            </a:extLst>
+          </a:blip>
+          <a:stretch>
+            <a:fillRect/>
+          </a:stretch>
+        </p:blipFill>
+        <p:spPr>
+          <a:xfrm>
+            <a:off x="6585656" y="3637083"/>
+            <a:ext cx="3620238" cy="2807679"/>
+          </a:xfrm>
+          <a:prstGeom prst="rect">
+            <a:avLst/>
+          </a:prstGeom>
+        </p:spPr>
+      </p:pic>
+      <p:pic>
+        <p:nvPicPr>
+          <p:cNvPr id="11" name="Picture 10" descr="A close up of text on a white background&#10;&#10;Description automatically generated">
+            <a:extLst>
+              <a:ext uri="{FF2B5EF4-FFF2-40B4-BE49-F238E27FC236}">
+                <a16:creationId xmlns:a16="http://schemas.microsoft.com/office/drawing/2014/main" id="{186647F3-FFA3-4F41-90F3-AA6285CA6E42}"/>
+              </a:ext>
+            </a:extLst>
+          </p:cNvPr>
+          <p:cNvPicPr>
+            <a:picLocks noChangeAspect="1"/>
+          </p:cNvPicPr>
+          <p:nvPr/>
+        </p:nvPicPr>
+        <p:blipFill>
+          <a:blip r:embed="rId3">
+            <a:extLst>
+              <a:ext uri="{28A0092B-C50C-407E-A947-70E740481C1C}">
+                <a14:useLocalDpi xmlns:a14="http://schemas.microsoft.com/office/drawing/2010/main" val="0"/>
+              </a:ext>
+            </a:extLst>
+          </a:blip>
+          <a:stretch>
+            <a:fillRect/>
+          </a:stretch>
+        </p:blipFill>
+        <p:spPr>
+          <a:xfrm>
+            <a:off x="6585656" y="981218"/>
+            <a:ext cx="3620238" cy="2807679"/>
+          </a:xfrm>
+          <a:prstGeom prst="rect">
+            <a:avLst/>
+          </a:prstGeom>
+        </p:spPr>
+      </p:pic>
+      <p:pic>
+        <p:nvPicPr>
+          <p:cNvPr id="13" name="Picture 12" descr="A screenshot of a cell phone&#10;&#10;Description automatically generated">
+            <a:extLst>
+              <a:ext uri="{FF2B5EF4-FFF2-40B4-BE49-F238E27FC236}">
+                <a16:creationId xmlns:a16="http://schemas.microsoft.com/office/drawing/2014/main" id="{96E3CB43-A591-49CD-B1F5-01ABE04A0D87}"/>
+              </a:ext>
+            </a:extLst>
+          </p:cNvPr>
+          <p:cNvPicPr>
+            <a:picLocks noChangeAspect="1"/>
+          </p:cNvPicPr>
+          <p:nvPr/>
+        </p:nvPicPr>
+        <p:blipFill>
+          <a:blip r:embed="rId4">
+            <a:extLst>
+              <a:ext uri="{28A0092B-C50C-407E-A947-70E740481C1C}">
+                <a14:useLocalDpi xmlns:a14="http://schemas.microsoft.com/office/drawing/2010/main" val="0"/>
+              </a:ext>
+            </a:extLst>
+          </a:blip>
+          <a:stretch>
+            <a:fillRect/>
+          </a:stretch>
+        </p:blipFill>
+        <p:spPr>
+          <a:xfrm>
+            <a:off x="1986106" y="3637082"/>
+            <a:ext cx="3620239" cy="2807680"/>
+          </a:xfrm>
+          <a:prstGeom prst="rect">
+            <a:avLst/>
+          </a:prstGeom>
+        </p:spPr>
+      </p:pic>
+      <p:pic>
+        <p:nvPicPr>
+          <p:cNvPr id="16" name="Picture 15" descr="A close up of a map&#10;&#10;Description automatically generated">
+            <a:extLst>
+              <a:ext uri="{FF2B5EF4-FFF2-40B4-BE49-F238E27FC236}">
+                <a16:creationId xmlns:a16="http://schemas.microsoft.com/office/drawing/2014/main" id="{B9197756-FF1A-41F1-99A9-A1D63191DA18}"/>
+              </a:ext>
+            </a:extLst>
+          </p:cNvPr>
+          <p:cNvPicPr>
+            <a:picLocks noChangeAspect="1"/>
+          </p:cNvPicPr>
+          <p:nvPr/>
+        </p:nvPicPr>
+        <p:blipFill>
+          <a:blip r:embed="rId5">
+            <a:extLst>
+              <a:ext uri="{28A0092B-C50C-407E-A947-70E740481C1C}">
+                <a14:useLocalDpi xmlns:a14="http://schemas.microsoft.com/office/drawing/2010/main" val="0"/>
+              </a:ext>
+            </a:extLst>
+          </a:blip>
+          <a:stretch>
+            <a:fillRect/>
+          </a:stretch>
+        </p:blipFill>
+        <p:spPr>
+          <a:xfrm>
+            <a:off x="1968801" y="981217"/>
+            <a:ext cx="3620238" cy="2807679"/>
+          </a:xfrm>
+          <a:prstGeom prst="rect">
+            <a:avLst/>
+          </a:prstGeom>
+        </p:spPr>
+      </p:pic>
+    </p:spTree>
+    <p:extLst>
+      <p:ext uri="{BB962C8B-B14F-4D97-AF65-F5344CB8AC3E}">
+        <p14:creationId xmlns:p14="http://schemas.microsoft.com/office/powerpoint/2010/main" val="2467546732"/>
       </p:ext>
     </p:extLst>
   </p:cSld>
@@ -7761,8 +9085,8 @@
         </p:blipFill>
         <p:spPr>
           <a:xfrm>
-            <a:off x="271956" y="1418207"/>
-            <a:ext cx="5185454" cy="4021585"/>
+            <a:off x="121035" y="1560318"/>
+            <a:ext cx="3871921" cy="3002873"/>
           </a:xfrm>
           <a:prstGeom prst="rect">
             <a:avLst/>
@@ -7796,20 +9120,56 @@
         </p:blipFill>
         <p:spPr>
           <a:xfrm>
-            <a:off x="6177086" y="1418207"/>
-            <a:ext cx="5185454" cy="4021584"/>
+            <a:off x="8179315" y="1419977"/>
+            <a:ext cx="3871922" cy="3002873"/>
           </a:xfrm>
           <a:prstGeom prst="rect">
             <a:avLst/>
           </a:prstGeom>
         </p:spPr>
       </p:pic>
-      <p:sp>
-        <p:nvSpPr>
-          <p:cNvPr id="4" name="TextBox 3">
-            <a:extLst>
-              <a:ext uri="{FF2B5EF4-FFF2-40B4-BE49-F238E27FC236}">
-                <a16:creationId xmlns:a16="http://schemas.microsoft.com/office/drawing/2014/main" id="{7D343A34-62A2-4AC3-8B18-7AE00A7304D4}"/>
+      <p:pic>
+        <p:nvPicPr>
+          <p:cNvPr id="10" name="Picture 9" descr="A close up of a piece of paper&#10;&#10;Description automatically generated">
+            <a:extLst>
+              <a:ext uri="{FF2B5EF4-FFF2-40B4-BE49-F238E27FC236}">
+                <a16:creationId xmlns:a16="http://schemas.microsoft.com/office/drawing/2014/main" id="{18F70B83-1294-4825-A306-5F21DFA542D7}"/>
+              </a:ext>
+            </a:extLst>
+          </p:cNvPr>
+          <p:cNvPicPr>
+            <a:picLocks noChangeAspect="1"/>
+          </p:cNvPicPr>
+          <p:nvPr/>
+        </p:nvPicPr>
+        <p:blipFill>
+          <a:blip r:embed="rId2">
+            <a:extLst>
+              <a:ext uri="{28A0092B-C50C-407E-A947-70E740481C1C}">
+                <a14:useLocalDpi xmlns:a14="http://schemas.microsoft.com/office/drawing/2010/main" val="0"/>
+              </a:ext>
+            </a:extLst>
+          </a:blip>
+          <a:stretch>
+            <a:fillRect/>
+          </a:stretch>
+        </p:blipFill>
+        <p:spPr>
+          <a:xfrm>
+            <a:off x="4150175" y="1481831"/>
+            <a:ext cx="3871921" cy="3002873"/>
+          </a:xfrm>
+          <a:prstGeom prst="rect">
+            <a:avLst/>
+          </a:prstGeom>
+        </p:spPr>
+      </p:pic>
+      <p:sp>
+        <p:nvSpPr>
+          <p:cNvPr id="12" name="TextBox 11">
+            <a:extLst>
+              <a:ext uri="{FF2B5EF4-FFF2-40B4-BE49-F238E27FC236}">
+                <a16:creationId xmlns:a16="http://schemas.microsoft.com/office/drawing/2014/main" id="{3B99DAD3-D34F-441A-8649-95C346EB6A4E}"/>
               </a:ext>
             </a:extLst>
           </p:cNvPr>
@@ -7818,13 +9178,18 @@
         </p:nvSpPr>
         <p:spPr>
           <a:xfrm>
-            <a:off x="2067819" y="5439791"/>
-            <a:ext cx="4109267" cy="369332"/>
+            <a:off x="383249" y="4768377"/>
+            <a:ext cx="3347490" cy="584775"/>
           </a:xfrm>
           <a:prstGeom prst="rect">
             <a:avLst/>
           </a:prstGeom>
-          <a:noFill/>
+          <a:solidFill>
+            <a:schemeClr val="accent2">
+              <a:lumMod val="20000"/>
+              <a:lumOff val="80000"/>
+            </a:schemeClr>
+          </a:solidFill>
         </p:spPr>
         <p:txBody>
           <a:bodyPr wrap="square" rtlCol="0">
@@ -7832,15 +9197,987 @@
           </a:bodyPr>
           <a:lstStyle/>
           <a:p>
+            <a:r>
+              <a:rPr lang="it-IT" sz="1600" dirty="0"/>
+              <a:t>Graph produced with Tom’s original hemanatree.root file</a:t>
+            </a:r>
+            <a:endParaRPr lang="en-US" sz="1600" dirty="0"/>
+          </a:p>
+        </p:txBody>
+      </p:sp>
+      <p:sp>
+        <p:nvSpPr>
+          <p:cNvPr id="13" name="TextBox 12">
+            <a:extLst>
+              <a:ext uri="{FF2B5EF4-FFF2-40B4-BE49-F238E27FC236}">
+                <a16:creationId xmlns:a16="http://schemas.microsoft.com/office/drawing/2014/main" id="{13331428-31B2-4695-9B1D-B3AF00CB6BB9}"/>
+              </a:ext>
+            </a:extLst>
+          </p:cNvPr>
+          <p:cNvSpPr txBox="1"/>
+          <p:nvPr/>
+        </p:nvSpPr>
+        <p:spPr>
+          <a:xfrm>
+            <a:off x="4422254" y="4768377"/>
+            <a:ext cx="3347490" cy="830997"/>
+          </a:xfrm>
+          <a:prstGeom prst="rect">
+            <a:avLst/>
+          </a:prstGeom>
+          <a:solidFill>
+            <a:schemeClr val="accent2">
+              <a:lumMod val="20000"/>
+              <a:lumOff val="80000"/>
+            </a:schemeClr>
+          </a:solidFill>
+        </p:spPr>
+        <p:txBody>
+          <a:bodyPr wrap="square" rtlCol="0">
+            <a:spAutoFit/>
+          </a:bodyPr>
+          <a:lstStyle/>
+          <a:p>
+            <a:r>
+              <a:rPr lang="it-IT" sz="1600" dirty="0"/>
+              <a:t>Graph produced rerunning Tom’s simulation on preinstalled garsoft v2_05 mantaining initial muon sample</a:t>
+            </a:r>
+            <a:endParaRPr lang="en-US" sz="1600" dirty="0"/>
+          </a:p>
+        </p:txBody>
+      </p:sp>
+      <p:sp>
+        <p:nvSpPr>
+          <p:cNvPr id="14" name="TextBox 13">
+            <a:extLst>
+              <a:ext uri="{FF2B5EF4-FFF2-40B4-BE49-F238E27FC236}">
+                <a16:creationId xmlns:a16="http://schemas.microsoft.com/office/drawing/2014/main" id="{29458311-7E83-4F47-9F56-ADD75CE3FEE7}"/>
+              </a:ext>
+            </a:extLst>
+          </p:cNvPr>
+          <p:cNvSpPr txBox="1"/>
+          <p:nvPr/>
+        </p:nvSpPr>
+        <p:spPr>
+          <a:xfrm>
+            <a:off x="8441531" y="4768377"/>
+            <a:ext cx="3347490" cy="1077218"/>
+          </a:xfrm>
+          <a:prstGeom prst="rect">
+            <a:avLst/>
+          </a:prstGeom>
+          <a:solidFill>
+            <a:schemeClr val="accent2">
+              <a:lumMod val="20000"/>
+              <a:lumOff val="80000"/>
+            </a:schemeClr>
+          </a:solidFill>
+        </p:spPr>
+        <p:txBody>
+          <a:bodyPr wrap="square" rtlCol="0">
+            <a:spAutoFit/>
+          </a:bodyPr>
+          <a:lstStyle/>
+          <a:p>
+            <a:r>
+              <a:rPr lang="it-IT" sz="1600" dirty="0"/>
+              <a:t>Graph produced rerunning Tom’s simulation on preinstalled garsoft v2_05 with different random muon sample</a:t>
+            </a:r>
+            <a:endParaRPr lang="en-US" sz="1600" dirty="0"/>
+          </a:p>
+        </p:txBody>
+      </p:sp>
+    </p:spTree>
+    <p:extLst>
+      <p:ext uri="{BB962C8B-B14F-4D97-AF65-F5344CB8AC3E}">
+        <p14:creationId xmlns:p14="http://schemas.microsoft.com/office/powerpoint/2010/main" val="3650376883"/>
+      </p:ext>
+    </p:extLst>
+  </p:cSld>
+  <p:clrMapOvr>
+    <a:masterClrMapping/>
+  </p:clrMapOvr>
+</p:sld>
+</file>
+
+<file path=ppt/slides/slide5.xml><?xml version="1.0" encoding="utf-8"?>
+<p:sld xmlns:a="http://schemas.openxmlformats.org/drawingml/2006/main" xmlns:r="http://schemas.openxmlformats.org/officeDocument/2006/relationships" xmlns:p="http://schemas.openxmlformats.org/presentationml/2006/main">
+  <p:cSld>
+    <p:spTree>
+      <p:nvGrpSpPr>
+        <p:cNvPr id="1" name=""/>
+        <p:cNvGrpSpPr/>
+        <p:nvPr/>
+      </p:nvGrpSpPr>
+      <p:grpSpPr>
+        <a:xfrm>
+          <a:off x="0" y="0"/>
+          <a:ext cx="0" cy="0"/>
+          <a:chOff x="0" y="0"/>
+          <a:chExt cx="0" cy="0"/>
+        </a:xfrm>
+      </p:grpSpPr>
+      <p:sp>
+        <p:nvSpPr>
+          <p:cNvPr id="2" name="Titolo 1">
+            <a:extLst>
+              <a:ext uri="{FF2B5EF4-FFF2-40B4-BE49-F238E27FC236}">
+                <a16:creationId xmlns:a16="http://schemas.microsoft.com/office/drawing/2014/main" id="{AEA5083B-CC27-4F1C-AD03-E3DBEC1C9E78}"/>
+              </a:ext>
+            </a:extLst>
+          </p:cNvPr>
+          <p:cNvSpPr>
+            <a:spLocks noGrp="1"/>
+          </p:cNvSpPr>
+          <p:nvPr>
+            <p:ph type="title"/>
+          </p:nvPr>
+        </p:nvSpPr>
+        <p:spPr>
+          <a:xfrm>
+            <a:off x="431999" y="413238"/>
+            <a:ext cx="9198117" cy="450762"/>
+          </a:xfrm>
+          <a:prstGeom prst="rect">
+            <a:avLst/>
+          </a:prstGeom>
+        </p:spPr>
+        <p:txBody>
+          <a:bodyPr rtlCol="0" anchor="ctr">
+            <a:normAutofit/>
+          </a:bodyPr>
+          <a:lstStyle/>
+          <a:p>
+            <a:pPr rtl="0"/>
+            <a:r>
+              <a:rPr lang="it-IT" dirty="0"/>
+              <a:t>BUILD UP TO DATE GARSOFT VERSION</a:t>
+            </a:r>
+          </a:p>
+        </p:txBody>
+      </p:sp>
+      <p:sp>
+        <p:nvSpPr>
+          <p:cNvPr id="6" name="Segnaposto numero diapositiva 5">
+            <a:extLst>
+              <a:ext uri="{FF2B5EF4-FFF2-40B4-BE49-F238E27FC236}">
+                <a16:creationId xmlns:a16="http://schemas.microsoft.com/office/drawing/2014/main" id="{46D051DA-5DAD-43A7-A238-51C63BA59FEC}"/>
+              </a:ext>
+            </a:extLst>
+          </p:cNvPr>
+          <p:cNvSpPr>
+            <a:spLocks noGrp="1"/>
+          </p:cNvSpPr>
+          <p:nvPr>
+            <p:ph type="sldNum" sz="quarter" idx="33"/>
+          </p:nvPr>
+        </p:nvSpPr>
+        <p:spPr>
+          <a:xfrm>
+            <a:off x="11772820" y="6401750"/>
+            <a:ext cx="278418" cy="274324"/>
+          </a:xfrm>
+          <a:prstGeom prst="rect">
+            <a:avLst/>
+          </a:prstGeom>
+        </p:spPr>
+        <p:txBody>
+          <a:bodyPr rtlCol="0" anchor="ctr">
+            <a:normAutofit/>
+          </a:bodyPr>
+          <a:lstStyle/>
+          <a:p>
+            <a:pPr rtl="0">
+              <a:spcAft>
+                <a:spcPts val="600"/>
+              </a:spcAft>
+            </a:pPr>
+            <a:fld id="{19B51A1E-902D-48AF-9020-955120F399B6}" type="slidenum">
+              <a:rPr lang="it-IT" smtClean="0"/>
+              <a:pPr rtl="0">
+                <a:spcAft>
+                  <a:spcPts val="600"/>
+                </a:spcAft>
+              </a:pPr>
+              <a:t>5</a:t>
+            </a:fld>
+            <a:endParaRPr lang="it-IT"/>
+          </a:p>
+        </p:txBody>
+      </p:sp>
+      <p:sp>
+        <p:nvSpPr>
+          <p:cNvPr id="5" name="Rectangle 4">
+            <a:extLst>
+              <a:ext uri="{FF2B5EF4-FFF2-40B4-BE49-F238E27FC236}">
+                <a16:creationId xmlns:a16="http://schemas.microsoft.com/office/drawing/2014/main" id="{5DD31A9C-65B4-4BDD-A397-60A6D76D7BF5}"/>
+              </a:ext>
+            </a:extLst>
+          </p:cNvPr>
+          <p:cNvSpPr/>
+          <p:nvPr/>
+        </p:nvSpPr>
+        <p:spPr>
+          <a:xfrm>
+            <a:off x="782329" y="1269851"/>
+            <a:ext cx="10627342" cy="830997"/>
+          </a:xfrm>
+          <a:prstGeom prst="rect">
+            <a:avLst/>
+          </a:prstGeom>
+        </p:spPr>
+        <p:txBody>
+          <a:bodyPr wrap="square">
+            <a:spAutoFit/>
+          </a:bodyPr>
+          <a:lstStyle/>
+          <a:p>
+            <a:pPr marL="285750" indent="-285750">
+              <a:buFont typeface="Arial" panose="020B0604020202020204" pitchFamily="34" charset="0"/>
+              <a:buChar char="•"/>
+            </a:pPr>
+            <a:r>
+              <a:rPr lang="it-IT" sz="2400" dirty="0"/>
+              <a:t>Tried building </a:t>
+            </a:r>
+            <a:r>
+              <a:rPr lang="it-IT" sz="2400" dirty="0">
+                <a:solidFill>
+                  <a:srgbClr val="FF0000"/>
+                </a:solidFill>
+              </a:rPr>
+              <a:t>garsoft v3_05_01 </a:t>
+            </a:r>
+            <a:r>
+              <a:rPr lang="it-IT" sz="2400" dirty="0"/>
+              <a:t>with compiler </a:t>
+            </a:r>
+            <a:r>
+              <a:rPr lang="it-IT" sz="2400" dirty="0">
+                <a:solidFill>
+                  <a:srgbClr val="FF0000"/>
+                </a:solidFill>
+              </a:rPr>
+              <a:t>e19</a:t>
+            </a:r>
+            <a:r>
+              <a:rPr lang="it-IT" sz="2400" dirty="0"/>
+              <a:t> in </a:t>
+            </a:r>
+            <a:r>
+              <a:rPr lang="it-IT" sz="2400" dirty="0">
+                <a:solidFill>
+                  <a:srgbClr val="FF0000"/>
+                </a:solidFill>
+              </a:rPr>
+              <a:t>debug</a:t>
+            </a:r>
+            <a:r>
+              <a:rPr lang="it-IT" sz="2400" dirty="0"/>
+              <a:t> mode following the garsoft getting started guide:</a:t>
+            </a:r>
+          </a:p>
+        </p:txBody>
+      </p:sp>
+      <p:pic>
+        <p:nvPicPr>
+          <p:cNvPr id="3" name="Picture 2">
+            <a:extLst>
+              <a:ext uri="{FF2B5EF4-FFF2-40B4-BE49-F238E27FC236}">
+                <a16:creationId xmlns:a16="http://schemas.microsoft.com/office/drawing/2014/main" id="{B0468822-C7BA-4D6E-B8AA-5EA54AFDFAF4}"/>
+              </a:ext>
+            </a:extLst>
+          </p:cNvPr>
+          <p:cNvPicPr>
+            <a:picLocks noChangeAspect="1"/>
+          </p:cNvPicPr>
+          <p:nvPr/>
+        </p:nvPicPr>
+        <p:blipFill>
+          <a:blip r:embed="rId2"/>
+          <a:stretch>
+            <a:fillRect/>
+          </a:stretch>
+        </p:blipFill>
+        <p:spPr>
+          <a:xfrm>
+            <a:off x="1921483" y="2180393"/>
+            <a:ext cx="8349030" cy="3203570"/>
+          </a:xfrm>
+          <a:prstGeom prst="rect">
+            <a:avLst/>
+          </a:prstGeom>
+        </p:spPr>
+      </p:pic>
+      <p:sp>
+        <p:nvSpPr>
+          <p:cNvPr id="4" name="Rectangle 3">
+            <a:extLst>
+              <a:ext uri="{FF2B5EF4-FFF2-40B4-BE49-F238E27FC236}">
+                <a16:creationId xmlns:a16="http://schemas.microsoft.com/office/drawing/2014/main" id="{4155A772-6D2F-424A-ACD4-B517AC9BBCED}"/>
+              </a:ext>
+            </a:extLst>
+          </p:cNvPr>
+          <p:cNvSpPr/>
+          <p:nvPr/>
+        </p:nvSpPr>
+        <p:spPr>
+          <a:xfrm>
+            <a:off x="4126634" y="5738715"/>
+            <a:ext cx="3938727" cy="369332"/>
+          </a:xfrm>
+          <a:prstGeom prst="rect">
+            <a:avLst/>
+          </a:prstGeom>
+          <a:solidFill>
+            <a:schemeClr val="accent2">
+              <a:lumMod val="20000"/>
+              <a:lumOff val="80000"/>
+            </a:schemeClr>
+          </a:solidFill>
+        </p:spPr>
+        <p:txBody>
+          <a:bodyPr wrap="square">
+            <a:spAutoFit/>
+          </a:bodyPr>
+          <a:lstStyle/>
+          <a:p>
+            <a:r>
+              <a:rPr lang="it-IT" dirty="0"/>
+              <a:t>Note: Compiled and built with no errors</a:t>
+            </a:r>
+          </a:p>
+        </p:txBody>
+      </p:sp>
+    </p:spTree>
+    <p:extLst>
+      <p:ext uri="{BB962C8B-B14F-4D97-AF65-F5344CB8AC3E}">
+        <p14:creationId xmlns:p14="http://schemas.microsoft.com/office/powerpoint/2010/main" val="1219983420"/>
+      </p:ext>
+    </p:extLst>
+  </p:cSld>
+  <p:clrMapOvr>
+    <a:masterClrMapping/>
+  </p:clrMapOvr>
+</p:sld>
+</file>
+
+<file path=ppt/slides/slide6.xml><?xml version="1.0" encoding="utf-8"?>
+<p:sld xmlns:a="http://schemas.openxmlformats.org/drawingml/2006/main" xmlns:r="http://schemas.openxmlformats.org/officeDocument/2006/relationships" xmlns:p="http://schemas.openxmlformats.org/presentationml/2006/main">
+  <p:cSld>
+    <p:spTree>
+      <p:nvGrpSpPr>
+        <p:cNvPr id="1" name=""/>
+        <p:cNvGrpSpPr/>
+        <p:nvPr/>
+      </p:nvGrpSpPr>
+      <p:grpSpPr>
+        <a:xfrm>
+          <a:off x="0" y="0"/>
+          <a:ext cx="0" cy="0"/>
+          <a:chOff x="0" y="0"/>
+          <a:chExt cx="0" cy="0"/>
+        </a:xfrm>
+      </p:grpSpPr>
+      <p:sp>
+        <p:nvSpPr>
+          <p:cNvPr id="2" name="Titolo 1">
+            <a:extLst>
+              <a:ext uri="{FF2B5EF4-FFF2-40B4-BE49-F238E27FC236}">
+                <a16:creationId xmlns:a16="http://schemas.microsoft.com/office/drawing/2014/main" id="{AEA5083B-CC27-4F1C-AD03-E3DBEC1C9E78}"/>
+              </a:ext>
+            </a:extLst>
+          </p:cNvPr>
+          <p:cNvSpPr>
+            <a:spLocks noGrp="1"/>
+          </p:cNvSpPr>
+          <p:nvPr>
+            <p:ph type="title"/>
+          </p:nvPr>
+        </p:nvSpPr>
+        <p:spPr>
+          <a:xfrm>
+            <a:off x="431999" y="413238"/>
+            <a:ext cx="9198117" cy="450762"/>
+          </a:xfrm>
+          <a:prstGeom prst="rect">
+            <a:avLst/>
+          </a:prstGeom>
+        </p:spPr>
+        <p:txBody>
+          <a:bodyPr rtlCol="0" anchor="ctr">
+            <a:normAutofit/>
+          </a:bodyPr>
+          <a:lstStyle/>
+          <a:p>
+            <a:pPr rtl="0"/>
+            <a:r>
+              <a:rPr lang="it-IT" dirty="0"/>
+              <a:t>BUILD UP TO DATE GARSOFT VERSION</a:t>
+            </a:r>
+          </a:p>
+        </p:txBody>
+      </p:sp>
+      <p:sp>
+        <p:nvSpPr>
+          <p:cNvPr id="6" name="Segnaposto numero diapositiva 5">
+            <a:extLst>
+              <a:ext uri="{FF2B5EF4-FFF2-40B4-BE49-F238E27FC236}">
+                <a16:creationId xmlns:a16="http://schemas.microsoft.com/office/drawing/2014/main" id="{46D051DA-5DAD-43A7-A238-51C63BA59FEC}"/>
+              </a:ext>
+            </a:extLst>
+          </p:cNvPr>
+          <p:cNvSpPr>
+            <a:spLocks noGrp="1"/>
+          </p:cNvSpPr>
+          <p:nvPr>
+            <p:ph type="sldNum" sz="quarter" idx="33"/>
+          </p:nvPr>
+        </p:nvSpPr>
+        <p:spPr>
+          <a:xfrm>
+            <a:off x="11772820" y="6401750"/>
+            <a:ext cx="278418" cy="274324"/>
+          </a:xfrm>
+          <a:prstGeom prst="rect">
+            <a:avLst/>
+          </a:prstGeom>
+        </p:spPr>
+        <p:txBody>
+          <a:bodyPr rtlCol="0" anchor="ctr">
+            <a:normAutofit/>
+          </a:bodyPr>
+          <a:lstStyle/>
+          <a:p>
+            <a:pPr rtl="0">
+              <a:spcAft>
+                <a:spcPts val="600"/>
+              </a:spcAft>
+            </a:pPr>
+            <a:fld id="{19B51A1E-902D-48AF-9020-955120F399B6}" type="slidenum">
+              <a:rPr lang="it-IT" smtClean="0"/>
+              <a:pPr rtl="0">
+                <a:spcAft>
+                  <a:spcPts val="600"/>
+                </a:spcAft>
+              </a:pPr>
+              <a:t>6</a:t>
+            </a:fld>
+            <a:endParaRPr lang="it-IT"/>
+          </a:p>
+        </p:txBody>
+      </p:sp>
+      <p:sp>
+        <p:nvSpPr>
+          <p:cNvPr id="7" name="Rectangle 6">
+            <a:extLst>
+              <a:ext uri="{FF2B5EF4-FFF2-40B4-BE49-F238E27FC236}">
+                <a16:creationId xmlns:a16="http://schemas.microsoft.com/office/drawing/2014/main" id="{F8FAEE90-1A39-4F59-9518-7F9257BAB01D}"/>
+              </a:ext>
+            </a:extLst>
+          </p:cNvPr>
+          <p:cNvSpPr/>
+          <p:nvPr/>
+        </p:nvSpPr>
+        <p:spPr>
+          <a:xfrm>
+            <a:off x="517864" y="1658775"/>
+            <a:ext cx="9826285" cy="369332"/>
+          </a:xfrm>
+          <a:prstGeom prst="rect">
+            <a:avLst/>
+          </a:prstGeom>
+        </p:spPr>
+        <p:txBody>
+          <a:bodyPr wrap="square">
+            <a:spAutoFit/>
+          </a:bodyPr>
+          <a:lstStyle/>
+          <a:p>
+            <a:pPr marL="285750" indent="-285750">
+              <a:buFont typeface="Arial" panose="020B0604020202020204" pitchFamily="34" charset="0"/>
+              <a:buChar char="•"/>
+            </a:pPr>
+            <a:r>
+              <a:rPr lang="it-IT" dirty="0"/>
+              <a:t>Repeated the simulation steps getting warning on readout simulation step:</a:t>
+            </a:r>
+          </a:p>
+        </p:txBody>
+      </p:sp>
+      <p:pic>
+        <p:nvPicPr>
+          <p:cNvPr id="9" name="Picture 8" descr="A picture containing sitting, holding, large, street&#10;&#10;Description automatically generated">
+            <a:extLst>
+              <a:ext uri="{FF2B5EF4-FFF2-40B4-BE49-F238E27FC236}">
+                <a16:creationId xmlns:a16="http://schemas.microsoft.com/office/drawing/2014/main" id="{AB17DE81-DAA9-4AAA-B17A-F00FC1F23347}"/>
+              </a:ext>
+            </a:extLst>
+          </p:cNvPr>
+          <p:cNvPicPr>
+            <a:picLocks noChangeAspect="1"/>
+          </p:cNvPicPr>
+          <p:nvPr/>
+        </p:nvPicPr>
+        <p:blipFill>
+          <a:blip r:embed="rId2">
+            <a:extLst>
+              <a:ext uri="{28A0092B-C50C-407E-A947-70E740481C1C}">
+                <a14:useLocalDpi xmlns:a14="http://schemas.microsoft.com/office/drawing/2010/main" val="0"/>
+              </a:ext>
+            </a:extLst>
+          </a:blip>
+          <a:stretch>
+            <a:fillRect/>
+          </a:stretch>
+        </p:blipFill>
+        <p:spPr>
+          <a:xfrm>
+            <a:off x="944433" y="2514494"/>
+            <a:ext cx="10303133" cy="2438611"/>
+          </a:xfrm>
+          <a:prstGeom prst="rect">
+            <a:avLst/>
+          </a:prstGeom>
+        </p:spPr>
+      </p:pic>
+    </p:spTree>
+    <p:extLst>
+      <p:ext uri="{BB962C8B-B14F-4D97-AF65-F5344CB8AC3E}">
+        <p14:creationId xmlns:p14="http://schemas.microsoft.com/office/powerpoint/2010/main" val="1264915630"/>
+      </p:ext>
+    </p:extLst>
+  </p:cSld>
+  <p:clrMapOvr>
+    <a:masterClrMapping/>
+  </p:clrMapOvr>
+</p:sld>
+</file>
+
+<file path=ppt/slides/slide7.xml><?xml version="1.0" encoding="utf-8"?>
+<p:sld xmlns:a="http://schemas.openxmlformats.org/drawingml/2006/main" xmlns:r="http://schemas.openxmlformats.org/officeDocument/2006/relationships" xmlns:p="http://schemas.openxmlformats.org/presentationml/2006/main">
+  <p:cSld>
+    <p:spTree>
+      <p:nvGrpSpPr>
+        <p:cNvPr id="1" name=""/>
+        <p:cNvGrpSpPr/>
+        <p:nvPr/>
+      </p:nvGrpSpPr>
+      <p:grpSpPr>
+        <a:xfrm>
+          <a:off x="0" y="0"/>
+          <a:ext cx="0" cy="0"/>
+          <a:chOff x="0" y="0"/>
+          <a:chExt cx="0" cy="0"/>
+        </a:xfrm>
+      </p:grpSpPr>
+      <p:sp>
+        <p:nvSpPr>
+          <p:cNvPr id="2" name="Titolo 1">
+            <a:extLst>
+              <a:ext uri="{FF2B5EF4-FFF2-40B4-BE49-F238E27FC236}">
+                <a16:creationId xmlns:a16="http://schemas.microsoft.com/office/drawing/2014/main" id="{AEA5083B-CC27-4F1C-AD03-E3DBEC1C9E78}"/>
+              </a:ext>
+            </a:extLst>
+          </p:cNvPr>
+          <p:cNvSpPr>
+            <a:spLocks noGrp="1"/>
+          </p:cNvSpPr>
+          <p:nvPr>
+            <p:ph type="title"/>
+          </p:nvPr>
+        </p:nvSpPr>
+        <p:spPr>
+          <a:xfrm>
+            <a:off x="431999" y="413238"/>
+            <a:ext cx="9198117" cy="450762"/>
+          </a:xfrm>
+          <a:prstGeom prst="rect">
+            <a:avLst/>
+          </a:prstGeom>
+        </p:spPr>
+        <p:txBody>
+          <a:bodyPr rtlCol="0" anchor="ctr">
+            <a:normAutofit/>
+          </a:bodyPr>
+          <a:lstStyle/>
+          <a:p>
+            <a:pPr rtl="0"/>
+            <a:r>
+              <a:rPr lang="it-IT" dirty="0"/>
+              <a:t>PLOTS COMPARISON</a:t>
+            </a:r>
+          </a:p>
+        </p:txBody>
+      </p:sp>
+      <p:sp>
+        <p:nvSpPr>
+          <p:cNvPr id="6" name="Segnaposto numero diapositiva 5">
+            <a:extLst>
+              <a:ext uri="{FF2B5EF4-FFF2-40B4-BE49-F238E27FC236}">
+                <a16:creationId xmlns:a16="http://schemas.microsoft.com/office/drawing/2014/main" id="{46D051DA-5DAD-43A7-A238-51C63BA59FEC}"/>
+              </a:ext>
+            </a:extLst>
+          </p:cNvPr>
+          <p:cNvSpPr>
+            <a:spLocks noGrp="1"/>
+          </p:cNvSpPr>
+          <p:nvPr>
+            <p:ph type="sldNum" sz="quarter" idx="33"/>
+          </p:nvPr>
+        </p:nvSpPr>
+        <p:spPr>
+          <a:xfrm>
+            <a:off x="11772820" y="6401750"/>
+            <a:ext cx="278418" cy="274324"/>
+          </a:xfrm>
+          <a:prstGeom prst="rect">
+            <a:avLst/>
+          </a:prstGeom>
+        </p:spPr>
+        <p:txBody>
+          <a:bodyPr rtlCol="0" anchor="ctr">
+            <a:normAutofit/>
+          </a:bodyPr>
+          <a:lstStyle/>
+          <a:p>
+            <a:pPr rtl="0">
+              <a:spcAft>
+                <a:spcPts val="600"/>
+              </a:spcAft>
+            </a:pPr>
+            <a:fld id="{19B51A1E-902D-48AF-9020-955120F399B6}" type="slidenum">
+              <a:rPr lang="it-IT" smtClean="0"/>
+              <a:pPr rtl="0">
+                <a:spcAft>
+                  <a:spcPts val="600"/>
+                </a:spcAft>
+              </a:pPr>
+              <a:t>7</a:t>
+            </a:fld>
+            <a:endParaRPr lang="it-IT"/>
+          </a:p>
+        </p:txBody>
+      </p:sp>
+      <p:pic>
+        <p:nvPicPr>
+          <p:cNvPr id="9" name="Picture 8">
+            <a:extLst>
+              <a:ext uri="{FF2B5EF4-FFF2-40B4-BE49-F238E27FC236}">
+                <a16:creationId xmlns:a16="http://schemas.microsoft.com/office/drawing/2014/main" id="{7760DC59-4EC5-4056-97E5-6585B541BF8E}"/>
+              </a:ext>
+            </a:extLst>
+          </p:cNvPr>
+          <p:cNvPicPr>
+            <a:picLocks noChangeAspect="1"/>
+          </p:cNvPicPr>
+          <p:nvPr/>
+        </p:nvPicPr>
+        <p:blipFill>
+          <a:blip r:embed="rId2">
+            <a:extLst>
+              <a:ext uri="{28A0092B-C50C-407E-A947-70E740481C1C}">
+                <a14:useLocalDpi xmlns:a14="http://schemas.microsoft.com/office/drawing/2010/main" val="0"/>
+              </a:ext>
+            </a:extLst>
+          </a:blip>
+          <a:srcRect/>
+          <a:stretch/>
+        </p:blipFill>
+        <p:spPr>
+          <a:xfrm>
+            <a:off x="1512185" y="1295689"/>
+            <a:ext cx="3871922" cy="3002873"/>
+          </a:xfrm>
+          <a:prstGeom prst="rect">
+            <a:avLst/>
+          </a:prstGeom>
+        </p:spPr>
+      </p:pic>
+      <p:sp>
+        <p:nvSpPr>
+          <p:cNvPr id="14" name="TextBox 13">
+            <a:extLst>
+              <a:ext uri="{FF2B5EF4-FFF2-40B4-BE49-F238E27FC236}">
+                <a16:creationId xmlns:a16="http://schemas.microsoft.com/office/drawing/2014/main" id="{29458311-7E83-4F47-9F56-ADD75CE3FEE7}"/>
+              </a:ext>
+            </a:extLst>
+          </p:cNvPr>
+          <p:cNvSpPr txBox="1"/>
+          <p:nvPr/>
+        </p:nvSpPr>
+        <p:spPr>
+          <a:xfrm>
+            <a:off x="1774401" y="4644089"/>
+            <a:ext cx="3347490" cy="830997"/>
+          </a:xfrm>
+          <a:prstGeom prst="rect">
+            <a:avLst/>
+          </a:prstGeom>
+          <a:solidFill>
+            <a:schemeClr val="accent2">
+              <a:lumMod val="20000"/>
+              <a:lumOff val="80000"/>
+            </a:schemeClr>
+          </a:solidFill>
+        </p:spPr>
+        <p:txBody>
+          <a:bodyPr wrap="square" rtlCol="0">
+            <a:spAutoFit/>
+          </a:bodyPr>
+          <a:lstStyle/>
+          <a:p>
+            <a:r>
+              <a:rPr lang="it-IT" sz="1600" dirty="0"/>
+              <a:t>Graph produced rerunning Tom’s simulation on preinstalled garsoft v2_05 with new random muon sample</a:t>
+            </a:r>
+            <a:endParaRPr lang="en-US" sz="1600" dirty="0"/>
+          </a:p>
+        </p:txBody>
+      </p:sp>
+      <p:pic>
+        <p:nvPicPr>
+          <p:cNvPr id="4" name="Picture 3" descr="A screenshot of a cell phone&#10;&#10;Description automatically generated">
+            <a:extLst>
+              <a:ext uri="{FF2B5EF4-FFF2-40B4-BE49-F238E27FC236}">
+                <a16:creationId xmlns:a16="http://schemas.microsoft.com/office/drawing/2014/main" id="{8FFFC2B3-3F43-4056-B0A8-E62C87E8C6F3}"/>
+              </a:ext>
+            </a:extLst>
+          </p:cNvPr>
+          <p:cNvPicPr>
+            <a:picLocks noChangeAspect="1"/>
+          </p:cNvPicPr>
+          <p:nvPr/>
+        </p:nvPicPr>
+        <p:blipFill>
+          <a:blip r:embed="rId3">
+            <a:extLst>
+              <a:ext uri="{28A0092B-C50C-407E-A947-70E740481C1C}">
+                <a14:useLocalDpi xmlns:a14="http://schemas.microsoft.com/office/drawing/2010/main" val="0"/>
+              </a:ext>
+            </a:extLst>
+          </a:blip>
+          <a:stretch>
+            <a:fillRect/>
+          </a:stretch>
+        </p:blipFill>
+        <p:spPr>
+          <a:xfrm>
+            <a:off x="6734900" y="1295689"/>
+            <a:ext cx="3871922" cy="3002874"/>
+          </a:xfrm>
+          <a:prstGeom prst="rect">
+            <a:avLst/>
+          </a:prstGeom>
+        </p:spPr>
+      </p:pic>
+      <p:sp>
+        <p:nvSpPr>
+          <p:cNvPr id="15" name="TextBox 14">
+            <a:extLst>
+              <a:ext uri="{FF2B5EF4-FFF2-40B4-BE49-F238E27FC236}">
+                <a16:creationId xmlns:a16="http://schemas.microsoft.com/office/drawing/2014/main" id="{9DC3295B-6818-46F9-A86D-F8C7F0FE46D1}"/>
+              </a:ext>
+            </a:extLst>
+          </p:cNvPr>
+          <p:cNvSpPr txBox="1"/>
+          <p:nvPr/>
+        </p:nvSpPr>
+        <p:spPr>
+          <a:xfrm>
+            <a:off x="6997116" y="4644089"/>
+            <a:ext cx="3347490" cy="1323439"/>
+          </a:xfrm>
+          <a:prstGeom prst="rect">
+            <a:avLst/>
+          </a:prstGeom>
+          <a:solidFill>
+            <a:schemeClr val="accent2">
+              <a:lumMod val="20000"/>
+              <a:lumOff val="80000"/>
+            </a:schemeClr>
+          </a:solidFill>
+        </p:spPr>
+        <p:txBody>
+          <a:bodyPr wrap="square" rtlCol="0">
+            <a:spAutoFit/>
+          </a:bodyPr>
+          <a:lstStyle/>
+          <a:p>
+            <a:r>
+              <a:rPr lang="it-IT" sz="1600" dirty="0"/>
+              <a:t>Graph produced rerunning Tom’s simulation on garsoft v3_05_01 with same new random muon sample (Many events missing and very small reconstructed momentum)</a:t>
+            </a:r>
+            <a:endParaRPr lang="en-US" sz="1600" dirty="0"/>
+          </a:p>
+        </p:txBody>
+      </p:sp>
+    </p:spTree>
+    <p:extLst>
+      <p:ext uri="{BB962C8B-B14F-4D97-AF65-F5344CB8AC3E}">
+        <p14:creationId xmlns:p14="http://schemas.microsoft.com/office/powerpoint/2010/main" val="10476087"/>
+      </p:ext>
+    </p:extLst>
+  </p:cSld>
+  <p:clrMapOvr>
+    <a:masterClrMapping/>
+  </p:clrMapOvr>
+</p:sld>
+</file>
+
+<file path=ppt/slides/slide8.xml><?xml version="1.0" encoding="utf-8"?>
+<p:sld xmlns:a="http://schemas.openxmlformats.org/drawingml/2006/main" xmlns:r="http://schemas.openxmlformats.org/officeDocument/2006/relationships" xmlns:p="http://schemas.openxmlformats.org/presentationml/2006/main">
+  <p:cSld>
+    <p:spTree>
+      <p:nvGrpSpPr>
+        <p:cNvPr id="1" name=""/>
+        <p:cNvGrpSpPr/>
+        <p:nvPr/>
+      </p:nvGrpSpPr>
+      <p:grpSpPr>
+        <a:xfrm>
+          <a:off x="0" y="0"/>
+          <a:ext cx="0" cy="0"/>
+          <a:chOff x="0" y="0"/>
+          <a:chExt cx="0" cy="0"/>
+        </a:xfrm>
+      </p:grpSpPr>
+      <p:sp>
+        <p:nvSpPr>
+          <p:cNvPr id="2" name="Titolo 1">
+            <a:extLst>
+              <a:ext uri="{FF2B5EF4-FFF2-40B4-BE49-F238E27FC236}">
+                <a16:creationId xmlns:a16="http://schemas.microsoft.com/office/drawing/2014/main" id="{AEA5083B-CC27-4F1C-AD03-E3DBEC1C9E78}"/>
+              </a:ext>
+            </a:extLst>
+          </p:cNvPr>
+          <p:cNvSpPr>
+            <a:spLocks noGrp="1"/>
+          </p:cNvSpPr>
+          <p:nvPr>
+            <p:ph type="title"/>
+          </p:nvPr>
+        </p:nvSpPr>
+        <p:spPr>
+          <a:xfrm>
+            <a:off x="431999" y="413238"/>
+            <a:ext cx="9198117" cy="450762"/>
+          </a:xfrm>
+          <a:prstGeom prst="rect">
+            <a:avLst/>
+          </a:prstGeom>
+        </p:spPr>
+        <p:txBody>
+          <a:bodyPr rtlCol="0" anchor="ctr">
+            <a:normAutofit/>
+          </a:bodyPr>
+          <a:lstStyle/>
+          <a:p>
+            <a:pPr rtl="0"/>
+            <a:r>
+              <a:rPr lang="it-IT" dirty="0"/>
+              <a:t>BUILD UP TO DATE GARSOFT VERSION</a:t>
+            </a:r>
+          </a:p>
+        </p:txBody>
+      </p:sp>
+      <p:sp>
+        <p:nvSpPr>
+          <p:cNvPr id="6" name="Segnaposto numero diapositiva 5">
+            <a:extLst>
+              <a:ext uri="{FF2B5EF4-FFF2-40B4-BE49-F238E27FC236}">
+                <a16:creationId xmlns:a16="http://schemas.microsoft.com/office/drawing/2014/main" id="{46D051DA-5DAD-43A7-A238-51C63BA59FEC}"/>
+              </a:ext>
+            </a:extLst>
+          </p:cNvPr>
+          <p:cNvSpPr>
+            <a:spLocks noGrp="1"/>
+          </p:cNvSpPr>
+          <p:nvPr>
+            <p:ph type="sldNum" sz="quarter" idx="33"/>
+          </p:nvPr>
+        </p:nvSpPr>
+        <p:spPr>
+          <a:xfrm>
+            <a:off x="11772820" y="6401750"/>
+            <a:ext cx="278418" cy="274324"/>
+          </a:xfrm>
+          <a:prstGeom prst="rect">
+            <a:avLst/>
+          </a:prstGeom>
+        </p:spPr>
+        <p:txBody>
+          <a:bodyPr rtlCol="0" anchor="ctr">
+            <a:normAutofit/>
+          </a:bodyPr>
+          <a:lstStyle/>
+          <a:p>
+            <a:pPr rtl="0">
+              <a:spcAft>
+                <a:spcPts val="600"/>
+              </a:spcAft>
+            </a:pPr>
+            <a:fld id="{19B51A1E-902D-48AF-9020-955120F399B6}" type="slidenum">
+              <a:rPr lang="it-IT" smtClean="0"/>
+              <a:pPr rtl="0">
+                <a:spcAft>
+                  <a:spcPts val="600"/>
+                </a:spcAft>
+              </a:pPr>
+              <a:t>8</a:t>
+            </a:fld>
+            <a:endParaRPr lang="it-IT"/>
+          </a:p>
+        </p:txBody>
+      </p:sp>
+      <p:sp>
+        <p:nvSpPr>
+          <p:cNvPr id="7" name="Rectangle 6">
+            <a:extLst>
+              <a:ext uri="{FF2B5EF4-FFF2-40B4-BE49-F238E27FC236}">
+                <a16:creationId xmlns:a16="http://schemas.microsoft.com/office/drawing/2014/main" id="{F8FAEE90-1A39-4F59-9518-7F9257BAB01D}"/>
+              </a:ext>
+            </a:extLst>
+          </p:cNvPr>
+          <p:cNvSpPr/>
+          <p:nvPr/>
+        </p:nvSpPr>
+        <p:spPr>
+          <a:xfrm>
+            <a:off x="431999" y="1280269"/>
+            <a:ext cx="9826285" cy="369332"/>
+          </a:xfrm>
+          <a:prstGeom prst="rect">
+            <a:avLst/>
+          </a:prstGeom>
+        </p:spPr>
+        <p:txBody>
+          <a:bodyPr wrap="square">
+            <a:spAutoFit/>
+          </a:bodyPr>
+          <a:lstStyle/>
+          <a:p>
+            <a:pPr marL="285750" indent="-285750">
+              <a:buFont typeface="Arial" panose="020B0604020202020204" pitchFamily="34" charset="0"/>
+              <a:buChar char="•"/>
+            </a:pPr>
+            <a:r>
+              <a:rPr lang="it-IT" dirty="0"/>
+              <a:t>Tried with </a:t>
+            </a:r>
             <a:r>
               <a:rPr lang="it-IT" dirty="0">
                 <a:solidFill>
                   <a:srgbClr val="FF0000"/>
                 </a:solidFill>
               </a:rPr>
-              <a:t>TOM’S PLOT</a:t>
-            </a:r>
-            <a:endParaRPr lang="en-US" dirty="0">
+              <a:t>prof</a:t>
+            </a:r>
+            <a:r>
+              <a:rPr lang="it-IT" dirty="0"/>
+              <a:t> version (1/09 morning) and got this error:</a:t>
+            </a:r>
+            <a:endParaRPr lang="it-IT" dirty="0">
               <a:solidFill>
                 <a:srgbClr val="FF0000"/>
               </a:solidFill>
@@ -7853,7 +10190,7 @@
           <p:cNvPr id="11" name="TextBox 10">
             <a:extLst>
               <a:ext uri="{FF2B5EF4-FFF2-40B4-BE49-F238E27FC236}">
-                <a16:creationId xmlns:a16="http://schemas.microsoft.com/office/drawing/2014/main" id="{14928FDC-50A1-402F-A33C-A53DA24ABE40}"/>
+                <a16:creationId xmlns:a16="http://schemas.microsoft.com/office/drawing/2014/main" id="{B8F2264F-8BDA-4F36-A9AA-8AB1FD7B10AF}"/>
               </a:ext>
             </a:extLst>
           </p:cNvPr>
@@ -7862,13 +10199,18 @@
         </p:nvSpPr>
         <p:spPr>
           <a:xfrm>
-            <a:off x="8178908" y="5439791"/>
-            <a:ext cx="4109267" cy="369332"/>
+            <a:off x="4746504" y="5034994"/>
+            <a:ext cx="2698992" cy="338554"/>
           </a:xfrm>
           <a:prstGeom prst="rect">
             <a:avLst/>
           </a:prstGeom>
-          <a:noFill/>
+          <a:solidFill>
+            <a:schemeClr val="accent2">
+              <a:lumMod val="20000"/>
+              <a:lumOff val="80000"/>
+            </a:schemeClr>
+          </a:solidFill>
         </p:spPr>
         <p:txBody>
           <a:bodyPr wrap="square" rtlCol="0">
@@ -7876,26 +10218,440 @@
           </a:bodyPr>
           <a:lstStyle/>
           <a:p>
+            <a:r>
+              <a:rPr lang="it-IT" sz="1600" dirty="0"/>
+              <a:t>Leo found the bug and fixed it</a:t>
+            </a:r>
+            <a:endParaRPr lang="en-US" sz="1600" dirty="0"/>
+          </a:p>
+        </p:txBody>
+      </p:sp>
+      <p:pic>
+        <p:nvPicPr>
+          <p:cNvPr id="9" name="Picture 8" descr="A close up of a keyboard&#10;&#10;Description automatically generated">
+            <a:extLst>
+              <a:ext uri="{FF2B5EF4-FFF2-40B4-BE49-F238E27FC236}">
+                <a16:creationId xmlns:a16="http://schemas.microsoft.com/office/drawing/2014/main" id="{551C963D-B30B-4371-A7A8-AE2369832442}"/>
+              </a:ext>
+            </a:extLst>
+          </p:cNvPr>
+          <p:cNvPicPr>
+            <a:picLocks noChangeAspect="1"/>
+          </p:cNvPicPr>
+          <p:nvPr/>
+        </p:nvPicPr>
+        <p:blipFill>
+          <a:blip r:embed="rId2">
+            <a:extLst>
+              <a:ext uri="{28A0092B-C50C-407E-A947-70E740481C1C}">
+                <a14:useLocalDpi xmlns:a14="http://schemas.microsoft.com/office/drawing/2010/main" val="0"/>
+              </a:ext>
+            </a:extLst>
+          </a:blip>
+          <a:stretch>
+            <a:fillRect/>
+          </a:stretch>
+        </p:blipFill>
+        <p:spPr>
+          <a:xfrm>
+            <a:off x="1771275" y="2009437"/>
+            <a:ext cx="8649450" cy="2560542"/>
+          </a:xfrm>
+          <a:prstGeom prst="rect">
+            <a:avLst/>
+          </a:prstGeom>
+        </p:spPr>
+      </p:pic>
+    </p:spTree>
+    <p:extLst>
+      <p:ext uri="{BB962C8B-B14F-4D97-AF65-F5344CB8AC3E}">
+        <p14:creationId xmlns:p14="http://schemas.microsoft.com/office/powerpoint/2010/main" val="384328300"/>
+      </p:ext>
+    </p:extLst>
+  </p:cSld>
+  <p:clrMapOvr>
+    <a:masterClrMapping/>
+  </p:clrMapOvr>
+</p:sld>
+</file>
+
+<file path=ppt/slides/slide9.xml><?xml version="1.0" encoding="utf-8"?>
+<p:sld xmlns:a="http://schemas.openxmlformats.org/drawingml/2006/main" xmlns:r="http://schemas.openxmlformats.org/officeDocument/2006/relationships" xmlns:p="http://schemas.openxmlformats.org/presentationml/2006/main">
+  <p:cSld>
+    <p:spTree>
+      <p:nvGrpSpPr>
+        <p:cNvPr id="1" name=""/>
+        <p:cNvGrpSpPr/>
+        <p:nvPr/>
+      </p:nvGrpSpPr>
+      <p:grpSpPr>
+        <a:xfrm>
+          <a:off x="0" y="0"/>
+          <a:ext cx="0" cy="0"/>
+          <a:chOff x="0" y="0"/>
+          <a:chExt cx="0" cy="0"/>
+        </a:xfrm>
+      </p:grpSpPr>
+      <p:sp>
+        <p:nvSpPr>
+          <p:cNvPr id="2" name="Titolo 1">
+            <a:extLst>
+              <a:ext uri="{FF2B5EF4-FFF2-40B4-BE49-F238E27FC236}">
+                <a16:creationId xmlns:a16="http://schemas.microsoft.com/office/drawing/2014/main" id="{AEA5083B-CC27-4F1C-AD03-E3DBEC1C9E78}"/>
+              </a:ext>
+            </a:extLst>
+          </p:cNvPr>
+          <p:cNvSpPr>
+            <a:spLocks noGrp="1"/>
+          </p:cNvSpPr>
+          <p:nvPr>
+            <p:ph type="title"/>
+          </p:nvPr>
+        </p:nvSpPr>
+        <p:spPr>
+          <a:xfrm>
+            <a:off x="431999" y="413238"/>
+            <a:ext cx="9198117" cy="450762"/>
+          </a:xfrm>
+          <a:prstGeom prst="rect">
+            <a:avLst/>
+          </a:prstGeom>
+        </p:spPr>
+        <p:txBody>
+          <a:bodyPr rtlCol="0" anchor="ctr">
+            <a:normAutofit/>
+          </a:bodyPr>
+          <a:lstStyle/>
+          <a:p>
+            <a:pPr rtl="0"/>
+            <a:r>
+              <a:rPr lang="it-IT" dirty="0"/>
+              <a:t>BUILD UP TO DATE GARSOFT VERSION</a:t>
+            </a:r>
+          </a:p>
+        </p:txBody>
+      </p:sp>
+      <p:sp>
+        <p:nvSpPr>
+          <p:cNvPr id="6" name="Segnaposto numero diapositiva 5">
+            <a:extLst>
+              <a:ext uri="{FF2B5EF4-FFF2-40B4-BE49-F238E27FC236}">
+                <a16:creationId xmlns:a16="http://schemas.microsoft.com/office/drawing/2014/main" id="{46D051DA-5DAD-43A7-A238-51C63BA59FEC}"/>
+              </a:ext>
+            </a:extLst>
+          </p:cNvPr>
+          <p:cNvSpPr>
+            <a:spLocks noGrp="1"/>
+          </p:cNvSpPr>
+          <p:nvPr>
+            <p:ph type="sldNum" sz="quarter" idx="33"/>
+          </p:nvPr>
+        </p:nvSpPr>
+        <p:spPr>
+          <a:xfrm>
+            <a:off x="11772820" y="6401750"/>
+            <a:ext cx="278418" cy="274324"/>
+          </a:xfrm>
+          <a:prstGeom prst="rect">
+            <a:avLst/>
+          </a:prstGeom>
+        </p:spPr>
+        <p:txBody>
+          <a:bodyPr rtlCol="0" anchor="ctr">
+            <a:normAutofit/>
+          </a:bodyPr>
+          <a:lstStyle/>
+          <a:p>
+            <a:pPr rtl="0">
+              <a:spcAft>
+                <a:spcPts val="600"/>
+              </a:spcAft>
+            </a:pPr>
+            <a:fld id="{19B51A1E-902D-48AF-9020-955120F399B6}" type="slidenum">
+              <a:rPr lang="it-IT" smtClean="0"/>
+              <a:pPr rtl="0">
+                <a:spcAft>
+                  <a:spcPts val="600"/>
+                </a:spcAft>
+              </a:pPr>
+              <a:t>9</a:t>
+            </a:fld>
+            <a:endParaRPr lang="it-IT"/>
+          </a:p>
+        </p:txBody>
+      </p:sp>
+      <p:sp>
+        <p:nvSpPr>
+          <p:cNvPr id="7" name="Rectangle 6">
+            <a:extLst>
+              <a:ext uri="{FF2B5EF4-FFF2-40B4-BE49-F238E27FC236}">
+                <a16:creationId xmlns:a16="http://schemas.microsoft.com/office/drawing/2014/main" id="{F8FAEE90-1A39-4F59-9518-7F9257BAB01D}"/>
+              </a:ext>
+            </a:extLst>
+          </p:cNvPr>
+          <p:cNvSpPr/>
+          <p:nvPr/>
+        </p:nvSpPr>
+        <p:spPr>
+          <a:xfrm>
+            <a:off x="431999" y="1280269"/>
+            <a:ext cx="9826285" cy="369332"/>
+          </a:xfrm>
+          <a:prstGeom prst="rect">
+            <a:avLst/>
+          </a:prstGeom>
+        </p:spPr>
+        <p:txBody>
+          <a:bodyPr wrap="square">
+            <a:spAutoFit/>
+          </a:bodyPr>
+          <a:lstStyle/>
+          <a:p>
+            <a:pPr marL="285750" indent="-285750">
+              <a:buFont typeface="Arial" panose="020B0604020202020204" pitchFamily="34" charset="0"/>
+              <a:buChar char="•"/>
+            </a:pPr>
+            <a:r>
+              <a:rPr lang="it-IT" dirty="0"/>
+              <a:t>Tried again (2/09 morning) and got this new error when trying </a:t>
+            </a:r>
             <a:r>
               <a:rPr lang="it-IT" dirty="0">
                 <a:solidFill>
                   <a:srgbClr val="FF0000"/>
                 </a:solidFill>
               </a:rPr>
-              <a:t>MY PLOT</a:t>
-            </a:r>
-            <a:endParaRPr lang="en-US" dirty="0">
-              <a:solidFill>
-                <a:srgbClr val="FF0000"/>
-              </a:solidFill>
-            </a:endParaRPr>
+              <a:t>mrbsetenv</a:t>
+            </a:r>
+          </a:p>
+        </p:txBody>
+      </p:sp>
+      <p:pic>
+        <p:nvPicPr>
+          <p:cNvPr id="3" name="Picture 2">
+            <a:extLst>
+              <a:ext uri="{FF2B5EF4-FFF2-40B4-BE49-F238E27FC236}">
+                <a16:creationId xmlns:a16="http://schemas.microsoft.com/office/drawing/2014/main" id="{D664F338-6C9E-46E5-B720-6E777895F0A3}"/>
+              </a:ext>
+            </a:extLst>
+          </p:cNvPr>
+          <p:cNvPicPr>
+            <a:picLocks noChangeAspect="1"/>
+          </p:cNvPicPr>
+          <p:nvPr/>
+        </p:nvPicPr>
+        <p:blipFill>
+          <a:blip r:embed="rId2"/>
+          <a:stretch>
+            <a:fillRect/>
+          </a:stretch>
+        </p:blipFill>
+        <p:spPr>
+          <a:xfrm>
+            <a:off x="1423987" y="1883784"/>
+            <a:ext cx="9344025" cy="942975"/>
+          </a:xfrm>
+          <a:prstGeom prst="rect">
+            <a:avLst/>
+          </a:prstGeom>
+        </p:spPr>
+      </p:pic>
+      <p:sp>
+        <p:nvSpPr>
+          <p:cNvPr id="5" name="Rectangle 4">
+            <a:extLst>
+              <a:ext uri="{FF2B5EF4-FFF2-40B4-BE49-F238E27FC236}">
+                <a16:creationId xmlns:a16="http://schemas.microsoft.com/office/drawing/2014/main" id="{59D484A3-54B3-43AE-BA2C-CB2781BFA2C7}"/>
+              </a:ext>
+            </a:extLst>
+          </p:cNvPr>
+          <p:cNvSpPr/>
+          <p:nvPr/>
+        </p:nvSpPr>
+        <p:spPr>
+          <a:xfrm>
+            <a:off x="431999" y="3060942"/>
+            <a:ext cx="6096000" cy="369332"/>
+          </a:xfrm>
+          <a:prstGeom prst="rect">
+            <a:avLst/>
+          </a:prstGeom>
+        </p:spPr>
+        <p:txBody>
+          <a:bodyPr>
+            <a:spAutoFit/>
+          </a:bodyPr>
+          <a:lstStyle/>
+          <a:p>
+            <a:pPr marL="285750" indent="-285750">
+              <a:buFont typeface="Arial" panose="020B0604020202020204" pitchFamily="34" charset="0"/>
+              <a:buChar char="•"/>
+            </a:pPr>
+            <a:r>
+              <a:rPr lang="it-IT" dirty="0"/>
+              <a:t>These messages might be related:</a:t>
+            </a:r>
+          </a:p>
+        </p:txBody>
+      </p:sp>
+      <p:pic>
+        <p:nvPicPr>
+          <p:cNvPr id="8" name="Picture 7">
+            <a:extLst>
+              <a:ext uri="{FF2B5EF4-FFF2-40B4-BE49-F238E27FC236}">
+                <a16:creationId xmlns:a16="http://schemas.microsoft.com/office/drawing/2014/main" id="{27B9CAEC-92E2-4871-AE02-AD34491DB92D}"/>
+              </a:ext>
+            </a:extLst>
+          </p:cNvPr>
+          <p:cNvPicPr>
+            <a:picLocks noChangeAspect="1"/>
+          </p:cNvPicPr>
+          <p:nvPr/>
+        </p:nvPicPr>
+        <p:blipFill>
+          <a:blip r:embed="rId3"/>
+          <a:stretch>
+            <a:fillRect/>
+          </a:stretch>
+        </p:blipFill>
+        <p:spPr>
+          <a:xfrm>
+            <a:off x="217178" y="3762228"/>
+            <a:ext cx="6715125" cy="619125"/>
+          </a:xfrm>
+          <a:prstGeom prst="rect">
+            <a:avLst/>
+          </a:prstGeom>
+        </p:spPr>
+      </p:pic>
+      <p:pic>
+        <p:nvPicPr>
+          <p:cNvPr id="10" name="Picture 9">
+            <a:extLst>
+              <a:ext uri="{FF2B5EF4-FFF2-40B4-BE49-F238E27FC236}">
+                <a16:creationId xmlns:a16="http://schemas.microsoft.com/office/drawing/2014/main" id="{46B5F76E-8924-4020-B0A1-BF8125C27BC8}"/>
+              </a:ext>
+            </a:extLst>
+          </p:cNvPr>
+          <p:cNvPicPr>
+            <a:picLocks noChangeAspect="1"/>
+          </p:cNvPicPr>
+          <p:nvPr/>
+        </p:nvPicPr>
+        <p:blipFill>
+          <a:blip r:embed="rId4"/>
+          <a:stretch>
+            <a:fillRect/>
+          </a:stretch>
+        </p:blipFill>
+        <p:spPr>
+          <a:xfrm>
+            <a:off x="158541" y="5019169"/>
+            <a:ext cx="7972425" cy="409575"/>
+          </a:xfrm>
+          <a:prstGeom prst="rect">
+            <a:avLst/>
+          </a:prstGeom>
+        </p:spPr>
+      </p:pic>
+      <p:sp>
+        <p:nvSpPr>
+          <p:cNvPr id="11" name="TextBox 10">
+            <a:extLst>
+              <a:ext uri="{FF2B5EF4-FFF2-40B4-BE49-F238E27FC236}">
+                <a16:creationId xmlns:a16="http://schemas.microsoft.com/office/drawing/2014/main" id="{B8F2264F-8BDA-4F36-A9AA-8AB1FD7B10AF}"/>
+              </a:ext>
+            </a:extLst>
+          </p:cNvPr>
+          <p:cNvSpPr txBox="1"/>
+          <p:nvPr/>
+        </p:nvSpPr>
+        <p:spPr>
+          <a:xfrm>
+            <a:off x="8460239" y="3738854"/>
+            <a:ext cx="3347490" cy="584775"/>
+          </a:xfrm>
+          <a:prstGeom prst="rect">
+            <a:avLst/>
+          </a:prstGeom>
+          <a:solidFill>
+            <a:schemeClr val="accent2">
+              <a:lumMod val="20000"/>
+              <a:lumOff val="80000"/>
+            </a:schemeClr>
+          </a:solidFill>
+        </p:spPr>
+        <p:txBody>
+          <a:bodyPr wrap="square" rtlCol="0">
+            <a:spAutoFit/>
+          </a:bodyPr>
+          <a:lstStyle/>
+          <a:p>
+            <a:r>
+              <a:rPr lang="it-IT" sz="1600" dirty="0"/>
+              <a:t>Obtained after:</a:t>
+            </a:r>
+          </a:p>
+          <a:p>
+            <a:r>
+              <a:rPr lang="it-IT" sz="1600" dirty="0"/>
+              <a:t>mrb newDev -v v3_05_01 -q e19:prof </a:t>
+            </a:r>
+            <a:endParaRPr lang="en-US" sz="1600" dirty="0"/>
+          </a:p>
+        </p:txBody>
+      </p:sp>
+      <p:sp>
+        <p:nvSpPr>
+          <p:cNvPr id="12" name="TextBox 11">
+            <a:extLst>
+              <a:ext uri="{FF2B5EF4-FFF2-40B4-BE49-F238E27FC236}">
+                <a16:creationId xmlns:a16="http://schemas.microsoft.com/office/drawing/2014/main" id="{DC9B5BF4-18DF-4844-A5C8-69BC7891DD3E}"/>
+              </a:ext>
+            </a:extLst>
+          </p:cNvPr>
+          <p:cNvSpPr txBox="1"/>
+          <p:nvPr/>
+        </p:nvSpPr>
+        <p:spPr>
+          <a:xfrm>
+            <a:off x="8460239" y="4843969"/>
+            <a:ext cx="3347490" cy="584775"/>
+          </a:xfrm>
+          <a:prstGeom prst="rect">
+            <a:avLst/>
+          </a:prstGeom>
+          <a:solidFill>
+            <a:schemeClr val="accent2">
+              <a:lumMod val="20000"/>
+              <a:lumOff val="80000"/>
+            </a:schemeClr>
+          </a:solidFill>
+        </p:spPr>
+        <p:txBody>
+          <a:bodyPr wrap="square" rtlCol="0">
+            <a:spAutoFit/>
+          </a:bodyPr>
+          <a:lstStyle/>
+          <a:p>
+            <a:r>
+              <a:rPr lang="it-IT" sz="1600" dirty="0"/>
+              <a:t>Obtained after:</a:t>
+            </a:r>
+          </a:p>
+          <a:p>
+            <a:r>
+              <a:rPr lang="it-IT" sz="1600" dirty="0"/>
+              <a:t> mrb g -d garsoft garsoft-garsoft</a:t>
+            </a:r>
+            <a:endParaRPr lang="en-US" sz="1600" dirty="0"/>
           </a:p>
         </p:txBody>
       </p:sp>
     </p:spTree>
     <p:extLst>
       <p:ext uri="{BB962C8B-B14F-4D97-AF65-F5344CB8AC3E}">
-        <p14:creationId xmlns:p14="http://schemas.microsoft.com/office/powerpoint/2010/main" val="3650376883"/>
+        <p14:creationId xmlns:p14="http://schemas.microsoft.com/office/powerpoint/2010/main" val="961694899"/>
       </p:ext>
     </p:extLst>
   </p:cSld>
@@ -8964,7 +11720,15 @@
 <ds:datastoreItem xmlns:ds="http://schemas.openxmlformats.org/officeDocument/2006/customXml" ds:itemID="{8FB61CFE-D4DA-4753-A9A5-D482B9609A35}">
   <ds:schemaRefs>
     <ds:schemaRef ds:uri="http://schemas.microsoft.com/office/2006/metadata/properties"/>
+    <ds:schemaRef ds:uri="http://www.w3.org/XML/1998/namespace"/>
+    <ds:schemaRef ds:uri="http://purl.org/dc/terms/"/>
+    <ds:schemaRef ds:uri="http://schemas.microsoft.com/office/2006/documentManagement/types"/>
+    <ds:schemaRef ds:uri="http://purl.org/dc/elements/1.1/"/>
+    <ds:schemaRef ds:uri="http://purl.org/dc/dcmitype/"/>
     <ds:schemaRef ds:uri="http://schemas.microsoft.com/office/infopath/2007/PartnerControls"/>
+    <ds:schemaRef ds:uri="http://schemas.openxmlformats.org/package/2006/metadata/core-properties"/>
+    <ds:schemaRef ds:uri="fb0879af-3eba-417a-a55a-ffe6dcd6ca77"/>
+    <ds:schemaRef ds:uri="6dc4bcd6-49db-4c07-9060-8acfc67cef9f"/>
     <ds:schemaRef ds:uri="http://schemas.microsoft.com/sharepoint/v3"/>
   </ds:schemaRefs>
 </ds:datastoreItem>

</xml_diff>

<commit_message>
Energy plots + first edep-sim display
</commit_message>
<xml_diff>
--- a/Simulation Exercise.pptx
+++ b/Simulation Exercise.pptx
@@ -5,10 +5,10 @@
     <p:sldMasterId id="2147483648" r:id="rId3"/>
   </p:sldMasterIdLst>
   <p:notesMasterIdLst>
-    <p:notesMasterId r:id="rId17"/>
+    <p:notesMasterId r:id="rId20"/>
   </p:notesMasterIdLst>
   <p:handoutMasterIdLst>
-    <p:handoutMasterId r:id="rId18"/>
+    <p:handoutMasterId r:id="rId21"/>
   </p:handoutMasterIdLst>
   <p:sldIdLst>
     <p:sldId id="356" r:id="rId4"/>
@@ -24,6 +24,9 @@
     <p:sldId id="379" r:id="rId14"/>
     <p:sldId id="380" r:id="rId15"/>
     <p:sldId id="381" r:id="rId16"/>
+    <p:sldId id="382" r:id="rId17"/>
+    <p:sldId id="383" r:id="rId18"/>
+    <p:sldId id="384" r:id="rId19"/>
   </p:sldIdLst>
   <p:sldSz cx="12192000" cy="6858000"/>
   <p:notesSz cx="6858000" cy="9144000"/>
@@ -246,7 +249,7 @@
             <a:pPr rtl="0"/>
             <a:fld id="{444DDF42-EA81-4D58-9E48-71D338B26FAC}" type="datetime1">
               <a:rPr lang="it-IT" smtClean="0"/>
-              <a:t>06/09/2020</a:t>
+              <a:t>10/09/2020</a:t>
             </a:fld>
             <a:endParaRPr lang="it-IT" dirty="0"/>
           </a:p>
@@ -427,7 +430,7 @@
             <a:fld id="{FABFCAD0-C8D4-46EE-8714-3DAE081602B2}" type="datetime1">
               <a:rPr lang="it-IT" smtClean="0"/>
               <a:pPr/>
-              <a:t>06/09/2020</a:t>
+              <a:t>10/09/2020</a:t>
             </a:fld>
             <a:endParaRPr lang="it-IT" dirty="0"/>
           </a:p>
@@ -6907,7 +6910,7 @@
             <a:pPr rtl="0"/>
             <a:r>
               <a:rPr lang="it-IT" dirty="0"/>
-              <a:t>PLOTS COMPARISON</a:t>
+              <a:t>RESOLUTION (SAMPLE OUTSIDE THE DETECTOR)</a:t>
             </a:r>
           </a:p>
         </p:txBody>
@@ -7218,7 +7221,7 @@
             <a:pPr rtl="0"/>
             <a:r>
               <a:rPr lang="it-IT" dirty="0"/>
-              <a:t>PLOTS COMPARISON</a:t>
+              <a:t>RESOLUTION (SAMPLE INSIDE THE DETECTOR)</a:t>
             </a:r>
           </a:p>
         </p:txBody>
@@ -7382,9 +7385,21 @@
             </a:pPr>
             <a:r>
               <a:rPr lang="it-IT" dirty="0"/>
-              <a:t>To check if the resolution degradation was due to energy loss in calorimeter, I redid the simulation with a new muon sample generated inside the gas detector</a:t>
-            </a:r>
-            <a:endParaRPr lang="en-US" dirty="0"/>
+              <a:t>To check if the resolution degradation was due to energy loss in calorimeter, I redid the simulation with a new </a:t>
+            </a:r>
+            <a:r>
+              <a:rPr lang="it-IT" dirty="0">
+                <a:solidFill>
+                  <a:srgbClr val="FF0000"/>
+                </a:solidFill>
+              </a:rPr>
+              <a:t>muon sample generated inside the gas detector</a:t>
+            </a:r>
+            <a:endParaRPr lang="en-US" dirty="0">
+              <a:solidFill>
+                <a:srgbClr val="FF0000"/>
+              </a:solidFill>
+            </a:endParaRPr>
           </a:p>
         </p:txBody>
       </p:sp>
@@ -7528,7 +7543,7 @@
             <a:pPr rtl="0"/>
             <a:r>
               <a:rPr lang="it-IT" dirty="0"/>
-              <a:t>PLOTS COMPARISON</a:t>
+              <a:t>ENERGY LOSS PLOTS</a:t>
             </a:r>
           </a:p>
         </p:txBody>
@@ -7610,7 +7625,7 @@
         <p:spPr>
           <a:xfrm>
             <a:off x="1354507" y="1554867"/>
-            <a:ext cx="4187277" cy="3247448"/>
+            <a:ext cx="4187277" cy="3247447"/>
           </a:xfrm>
           <a:prstGeom prst="rect">
             <a:avLst/>
@@ -7652,7 +7667,7 @@
           <a:p>
             <a:r>
               <a:rPr lang="it-IT" sz="1600" dirty="0"/>
-              <a:t>Resolution plot produced on garsoft v3 with random low energy muon sample generated upstream inside the detector (z=-190)</a:t>
+              <a:t>Energy loss plot produced on garsoft v3 with random low energy muon sample generated upstream outside the detector (z=-500)</a:t>
             </a:r>
             <a:endParaRPr lang="en-US" sz="1600" dirty="0"/>
           </a:p>
@@ -7692,7 +7707,7 @@
             </a:pPr>
             <a:r>
               <a:rPr lang="it-IT" dirty="0"/>
-              <a:t>I also did graphs of MC momentum at the end of trajectory minus p at the end</a:t>
+              <a:t>Graphs for Energy loss distribution for the sample outside the detector</a:t>
             </a:r>
             <a:endParaRPr lang="en-US" dirty="0"/>
           </a:p>
@@ -7733,7 +7748,7 @@
           <a:p>
             <a:r>
               <a:rPr lang="it-IT" sz="1600" dirty="0"/>
-              <a:t>Resolution plot produced on garsoft v3 with random low energy muon sample generated upstream inside the detector (z=-190)</a:t>
+              <a:t>Energy loss plot produced on garsoft v3 with random high energy muon sample generated upstream outside the detector (z=-500)</a:t>
             </a:r>
             <a:endParaRPr lang="en-US" sz="1600" dirty="0"/>
           </a:p>
@@ -7767,7 +7782,7 @@
         <p:spPr>
           <a:xfrm>
             <a:off x="6577222" y="1554867"/>
-            <a:ext cx="4187277" cy="3247448"/>
+            <a:ext cx="4187277" cy="3247447"/>
           </a:xfrm>
           <a:prstGeom prst="rect">
             <a:avLst/>
@@ -7838,7 +7853,7 @@
             <a:pPr rtl="0"/>
             <a:r>
               <a:rPr lang="it-IT" dirty="0"/>
-              <a:t>PLOTS COMPARISON</a:t>
+              <a:t>Resolution as a function of y</a:t>
             </a:r>
           </a:p>
         </p:txBody>
@@ -7906,8 +7921,8 @@
         </p:nvSpPr>
         <p:spPr>
           <a:xfrm>
-            <a:off x="4186142" y="217669"/>
-            <a:ext cx="7330624" cy="646331"/>
+            <a:off x="431998" y="943533"/>
+            <a:ext cx="10305131" cy="646331"/>
           </a:xfrm>
           <a:prstGeom prst="rect">
             <a:avLst/>
@@ -7926,7 +7941,7 @@
             </a:pPr>
             <a:r>
               <a:rPr lang="it-IT" dirty="0"/>
-              <a:t>Finally I also checked both the resolution and the relative change in momentum as function of y</a:t>
+              <a:t>Plots of resolution as a function of the initial y (vertical) position of the muon ( random upstream samples outside the detector -200 cm &lt; y &lt; 0 cm )</a:t>
             </a:r>
             <a:endParaRPr lang="en-US" dirty="0"/>
           </a:p>
@@ -7934,10 +7949,10 @@
       </p:sp>
       <p:pic>
         <p:nvPicPr>
-          <p:cNvPr id="5" name="Picture 4" descr="A screenshot of a cell phone&#10;&#10;Description automatically generated">
-            <a:extLst>
-              <a:ext uri="{FF2B5EF4-FFF2-40B4-BE49-F238E27FC236}">
-                <a16:creationId xmlns:a16="http://schemas.microsoft.com/office/drawing/2014/main" id="{CEBBE01D-4557-4279-9CFA-4383C287B57D}"/>
+          <p:cNvPr id="7" name="Picture 6" descr="A screenshot of a cell phone&#10;&#10;Description automatically generated">
+            <a:extLst>
+              <a:ext uri="{FF2B5EF4-FFF2-40B4-BE49-F238E27FC236}">
+                <a16:creationId xmlns:a16="http://schemas.microsoft.com/office/drawing/2014/main" id="{CE935489-9F51-498E-9630-FD0ACAA7CB72}"/>
               </a:ext>
             </a:extLst>
           </p:cNvPr>
@@ -7960,8 +7975,8 @@
         </p:blipFill>
         <p:spPr>
           <a:xfrm>
-            <a:off x="6585656" y="3637083"/>
-            <a:ext cx="3620238" cy="2807679"/>
+            <a:off x="6208921" y="1969788"/>
+            <a:ext cx="5021072" cy="3894098"/>
           </a:xfrm>
           <a:prstGeom prst="rect">
             <a:avLst/>
@@ -7970,10 +7985,10 @@
       </p:pic>
       <p:pic>
         <p:nvPicPr>
-          <p:cNvPr id="11" name="Picture 10" descr="A close up of text on a white background&#10;&#10;Description automatically generated">
-            <a:extLst>
-              <a:ext uri="{FF2B5EF4-FFF2-40B4-BE49-F238E27FC236}">
-                <a16:creationId xmlns:a16="http://schemas.microsoft.com/office/drawing/2014/main" id="{186647F3-FFA3-4F41-90F3-AA6285CA6E42}"/>
+          <p:cNvPr id="9" name="Picture 8" descr="A close up of a map&#10;&#10;Description automatically generated">
+            <a:extLst>
+              <a:ext uri="{FF2B5EF4-FFF2-40B4-BE49-F238E27FC236}">
+                <a16:creationId xmlns:a16="http://schemas.microsoft.com/office/drawing/2014/main" id="{7B78FAD7-F201-4AB1-8D75-D233B16BB978}"/>
               </a:ext>
             </a:extLst>
           </p:cNvPr>
@@ -7996,20 +8011,305 @@
         </p:blipFill>
         <p:spPr>
           <a:xfrm>
-            <a:off x="6585656" y="981218"/>
-            <a:ext cx="3620238" cy="2807679"/>
+            <a:off x="875058" y="1969787"/>
+            <a:ext cx="5021073" cy="3894099"/>
           </a:xfrm>
           <a:prstGeom prst="rect">
             <a:avLst/>
           </a:prstGeom>
         </p:spPr>
       </p:pic>
+    </p:spTree>
+    <p:extLst>
+      <p:ext uri="{BB962C8B-B14F-4D97-AF65-F5344CB8AC3E}">
+        <p14:creationId xmlns:p14="http://schemas.microsoft.com/office/powerpoint/2010/main" val="2467546732"/>
+      </p:ext>
+    </p:extLst>
+  </p:cSld>
+  <p:clrMapOvr>
+    <a:masterClrMapping/>
+  </p:clrMapOvr>
+</p:sld>
+</file>
+
+<file path=ppt/slides/slide14.xml><?xml version="1.0" encoding="utf-8"?>
+<p:sld xmlns:a="http://schemas.openxmlformats.org/drawingml/2006/main" xmlns:r="http://schemas.openxmlformats.org/officeDocument/2006/relationships" xmlns:p="http://schemas.openxmlformats.org/presentationml/2006/main">
+  <p:cSld>
+    <p:spTree>
+      <p:nvGrpSpPr>
+        <p:cNvPr id="1" name=""/>
+        <p:cNvGrpSpPr/>
+        <p:nvPr/>
+      </p:nvGrpSpPr>
+      <p:grpSpPr>
+        <a:xfrm>
+          <a:off x="0" y="0"/>
+          <a:ext cx="0" cy="0"/>
+          <a:chOff x="0" y="0"/>
+          <a:chExt cx="0" cy="0"/>
+        </a:xfrm>
+      </p:grpSpPr>
+      <p:sp>
+        <p:nvSpPr>
+          <p:cNvPr id="2" name="Titolo 1">
+            <a:extLst>
+              <a:ext uri="{FF2B5EF4-FFF2-40B4-BE49-F238E27FC236}">
+                <a16:creationId xmlns:a16="http://schemas.microsoft.com/office/drawing/2014/main" id="{AEA5083B-CC27-4F1C-AD03-E3DBEC1C9E78}"/>
+              </a:ext>
+            </a:extLst>
+          </p:cNvPr>
+          <p:cNvSpPr>
+            <a:spLocks noGrp="1"/>
+          </p:cNvSpPr>
+          <p:nvPr>
+            <p:ph type="title"/>
+          </p:nvPr>
+        </p:nvSpPr>
+        <p:spPr>
+          <a:xfrm>
+            <a:off x="431999" y="413238"/>
+            <a:ext cx="9198117" cy="450762"/>
+          </a:xfrm>
+          <a:prstGeom prst="rect">
+            <a:avLst/>
+          </a:prstGeom>
+        </p:spPr>
+        <p:txBody>
+          <a:bodyPr rtlCol="0" anchor="ctr">
+            <a:normAutofit/>
+          </a:bodyPr>
+          <a:lstStyle/>
+          <a:p>
+            <a:pPr rtl="0"/>
+            <a:r>
+              <a:rPr lang="it-IT" dirty="0"/>
+              <a:t>ENERGY LOSS as a function of y</a:t>
+            </a:r>
+          </a:p>
+        </p:txBody>
+      </p:sp>
+      <p:sp>
+        <p:nvSpPr>
+          <p:cNvPr id="6" name="Segnaposto numero diapositiva 5">
+            <a:extLst>
+              <a:ext uri="{FF2B5EF4-FFF2-40B4-BE49-F238E27FC236}">
+                <a16:creationId xmlns:a16="http://schemas.microsoft.com/office/drawing/2014/main" id="{46D051DA-5DAD-43A7-A238-51C63BA59FEC}"/>
+              </a:ext>
+            </a:extLst>
+          </p:cNvPr>
+          <p:cNvSpPr>
+            <a:spLocks noGrp="1"/>
+          </p:cNvSpPr>
+          <p:nvPr>
+            <p:ph type="sldNum" sz="quarter" idx="33"/>
+          </p:nvPr>
+        </p:nvSpPr>
+        <p:spPr>
+          <a:xfrm>
+            <a:off x="11772820" y="6401750"/>
+            <a:ext cx="278418" cy="274324"/>
+          </a:xfrm>
+          <a:prstGeom prst="rect">
+            <a:avLst/>
+          </a:prstGeom>
+        </p:spPr>
+        <p:txBody>
+          <a:bodyPr rtlCol="0" anchor="ctr">
+            <a:normAutofit/>
+          </a:bodyPr>
+          <a:lstStyle/>
+          <a:p>
+            <a:pPr rtl="0">
+              <a:spcAft>
+                <a:spcPts val="600"/>
+              </a:spcAft>
+            </a:pPr>
+            <a:fld id="{19B51A1E-902D-48AF-9020-955120F399B6}" type="slidenum">
+              <a:rPr lang="it-IT" smtClean="0"/>
+              <a:pPr rtl="0">
+                <a:spcAft>
+                  <a:spcPts val="600"/>
+                </a:spcAft>
+              </a:pPr>
+              <a:t>14</a:t>
+            </a:fld>
+            <a:endParaRPr lang="it-IT"/>
+          </a:p>
+        </p:txBody>
+      </p:sp>
+      <mc:AlternateContent xmlns:mc="http://schemas.openxmlformats.org/markup-compatibility/2006">
+        <mc:Choice xmlns:a14="http://schemas.microsoft.com/office/drawing/2010/main" Requires="a14">
+          <p:sp>
+            <p:nvSpPr>
+              <p:cNvPr id="3" name="TextBox 2">
+                <a:extLst>
+                  <a:ext uri="{FF2B5EF4-FFF2-40B4-BE49-F238E27FC236}">
+                    <a16:creationId xmlns:a16="http://schemas.microsoft.com/office/drawing/2014/main" id="{EC437B08-CF6A-46CA-B5D9-F1267286FC73}"/>
+                  </a:ext>
+                </a:extLst>
+              </p:cNvPr>
+              <p:cNvSpPr txBox="1"/>
+              <p:nvPr/>
+            </p:nvSpPr>
+            <p:spPr>
+              <a:xfrm>
+                <a:off x="431998" y="943533"/>
+                <a:ext cx="10305131" cy="646331"/>
+              </a:xfrm>
+              <a:prstGeom prst="rect">
+                <a:avLst/>
+              </a:prstGeom>
+              <a:noFill/>
+            </p:spPr>
+            <p:txBody>
+              <a:bodyPr wrap="square" rtlCol="0">
+                <a:spAutoFit/>
+              </a:bodyPr>
+              <a:lstStyle/>
+              <a:p>
+                <a:pPr marL="285750" indent="-285750">
+                  <a:buFont typeface="Arial" panose="020B0604020202020204" pitchFamily="34" charset="0"/>
+                  <a:buChar char="•"/>
+                </a:pPr>
+                <a:r>
+                  <a:rPr lang="it-IT" dirty="0"/>
+                  <a:t>Plots of energy loss </a:t>
+                </a:r>
+                <a14:m>
+                  <m:oMath xmlns:m="http://schemas.openxmlformats.org/officeDocument/2006/math">
+                    <m:r>
+                      <m:rPr>
+                        <m:sty m:val="p"/>
+                      </m:rPr>
+                      <a:rPr lang="it-IT" b="0" i="0" smtClean="0">
+                        <a:latin typeface="Cambria Math" panose="02040503050406030204" pitchFamily="18" charset="0"/>
+                      </a:rPr>
+                      <m:t>Δ</m:t>
+                    </m:r>
+                    <m:r>
+                      <a:rPr lang="it-IT" b="0" i="1" smtClean="0">
+                        <a:latin typeface="Cambria Math" panose="02040503050406030204" pitchFamily="18" charset="0"/>
+                      </a:rPr>
+                      <m:t>𝐸</m:t>
+                    </m:r>
+                    <m:r>
+                      <a:rPr lang="it-IT" b="0" i="1" smtClean="0">
+                        <a:latin typeface="Cambria Math" panose="02040503050406030204" pitchFamily="18" charset="0"/>
+                      </a:rPr>
+                      <m:t>(</m:t>
+                    </m:r>
+                    <m:r>
+                      <m:rPr>
+                        <m:sty m:val="p"/>
+                      </m:rPr>
+                      <a:rPr lang="it-IT" b="0" i="1" smtClean="0">
+                        <a:latin typeface="Cambria Math" panose="02040503050406030204" pitchFamily="18" charset="0"/>
+                      </a:rPr>
+                      <m:t>GeV</m:t>
+                    </m:r>
+                    <m:r>
+                      <a:rPr lang="it-IT" b="0" i="1" smtClean="0">
+                        <a:latin typeface="Cambria Math" panose="02040503050406030204" pitchFamily="18" charset="0"/>
+                      </a:rPr>
+                      <m:t>)</m:t>
+                    </m:r>
+                  </m:oMath>
+                </a14:m>
+                <a:r>
+                  <a:rPr lang="it-IT" dirty="0"/>
+                  <a:t> as a function of the initial y (vertical) position of the muon ( random upstream samples outside the detector -200 cm &lt; y &lt; 0 cm )</a:t>
+                </a:r>
+                <a:endParaRPr lang="en-US" dirty="0"/>
+              </a:p>
+            </p:txBody>
+          </p:sp>
+        </mc:Choice>
+        <mc:Fallback>
+          <p:sp>
+            <p:nvSpPr>
+              <p:cNvPr id="3" name="TextBox 2">
+                <a:extLst>
+                  <a:ext uri="{FF2B5EF4-FFF2-40B4-BE49-F238E27FC236}">
+                    <a16:creationId xmlns:a16="http://schemas.microsoft.com/office/drawing/2014/main" id="{EC437B08-CF6A-46CA-B5D9-F1267286FC73}"/>
+                  </a:ext>
+                </a:extLst>
+              </p:cNvPr>
+              <p:cNvSpPr txBox="1">
+                <a:spLocks noRot="1" noChangeAspect="1" noMove="1" noResize="1" noEditPoints="1" noAdjustHandles="1" noChangeArrowheads="1" noChangeShapeType="1" noTextEdit="1"/>
+              </p:cNvSpPr>
+              <p:nvPr/>
+            </p:nvSpPr>
+            <p:spPr>
+              <a:xfrm>
+                <a:off x="431998" y="943533"/>
+                <a:ext cx="10305131" cy="646331"/>
+              </a:xfrm>
+              <a:prstGeom prst="rect">
+                <a:avLst/>
+              </a:prstGeom>
+              <a:blipFill>
+                <a:blip r:embed="rId2"/>
+                <a:stretch>
+                  <a:fillRect l="-414" t="-5660" b="-14151"/>
+                </a:stretch>
+              </a:blipFill>
+            </p:spPr>
+            <p:txBody>
+              <a:bodyPr/>
+              <a:lstStyle/>
+              <a:p>
+                <a:r>
+                  <a:rPr lang="en-US">
+                    <a:noFill/>
+                  </a:rPr>
+                  <a:t> </a:t>
+                </a:r>
+              </a:p>
+            </p:txBody>
+          </p:sp>
+        </mc:Fallback>
+      </mc:AlternateContent>
       <p:pic>
         <p:nvPicPr>
-          <p:cNvPr id="13" name="Picture 12" descr="A screenshot of a cell phone&#10;&#10;Description automatically generated">
-            <a:extLst>
-              <a:ext uri="{FF2B5EF4-FFF2-40B4-BE49-F238E27FC236}">
-                <a16:creationId xmlns:a16="http://schemas.microsoft.com/office/drawing/2014/main" id="{96E3CB43-A591-49CD-B1F5-01ABE04A0D87}"/>
+          <p:cNvPr id="7" name="Picture 6">
+            <a:extLst>
+              <a:ext uri="{FF2B5EF4-FFF2-40B4-BE49-F238E27FC236}">
+                <a16:creationId xmlns:a16="http://schemas.microsoft.com/office/drawing/2014/main" id="{CE935489-9F51-498E-9630-FD0ACAA7CB72}"/>
+              </a:ext>
+            </a:extLst>
+          </p:cNvPr>
+          <p:cNvPicPr>
+            <a:picLocks noChangeAspect="1"/>
+          </p:cNvPicPr>
+          <p:nvPr/>
+        </p:nvPicPr>
+        <p:blipFill>
+          <a:blip r:embed="rId3">
+            <a:extLst>
+              <a:ext uri="{28A0092B-C50C-407E-A947-70E740481C1C}">
+                <a14:useLocalDpi xmlns:a14="http://schemas.microsoft.com/office/drawing/2010/main" val="0"/>
+              </a:ext>
+            </a:extLst>
+          </a:blip>
+          <a:srcRect/>
+          <a:stretch/>
+        </p:blipFill>
+        <p:spPr>
+          <a:xfrm>
+            <a:off x="6208921" y="1969788"/>
+            <a:ext cx="5021072" cy="3894097"/>
+          </a:xfrm>
+          <a:prstGeom prst="rect">
+            <a:avLst/>
+          </a:prstGeom>
+        </p:spPr>
+      </p:pic>
+      <p:pic>
+        <p:nvPicPr>
+          <p:cNvPr id="9" name="Picture 8">
+            <a:extLst>
+              <a:ext uri="{FF2B5EF4-FFF2-40B4-BE49-F238E27FC236}">
+                <a16:creationId xmlns:a16="http://schemas.microsoft.com/office/drawing/2014/main" id="{7B78FAD7-F201-4AB1-8D75-D233B16BB978}"/>
               </a:ext>
             </a:extLst>
           </p:cNvPr>
@@ -8026,26 +8326,712 @@
               </a:ext>
             </a:extLst>
           </a:blip>
-          <a:stretch>
-            <a:fillRect/>
-          </a:stretch>
+          <a:srcRect/>
+          <a:stretch/>
         </p:blipFill>
         <p:spPr>
           <a:xfrm>
-            <a:off x="1986106" y="3637082"/>
-            <a:ext cx="3620239" cy="2807680"/>
+            <a:off x="875058" y="1969787"/>
+            <a:ext cx="5021073" cy="3894098"/>
           </a:xfrm>
           <a:prstGeom prst="rect">
             <a:avLst/>
           </a:prstGeom>
         </p:spPr>
       </p:pic>
+    </p:spTree>
+    <p:extLst>
+      <p:ext uri="{BB962C8B-B14F-4D97-AF65-F5344CB8AC3E}">
+        <p14:creationId xmlns:p14="http://schemas.microsoft.com/office/powerpoint/2010/main" val="3479967622"/>
+      </p:ext>
+    </p:extLst>
+  </p:cSld>
+  <p:clrMapOvr>
+    <a:masterClrMapping/>
+  </p:clrMapOvr>
+</p:sld>
+</file>
+
+<file path=ppt/slides/slide15.xml><?xml version="1.0" encoding="utf-8"?>
+<p:sld xmlns:a="http://schemas.openxmlformats.org/drawingml/2006/main" xmlns:r="http://schemas.openxmlformats.org/officeDocument/2006/relationships" xmlns:p="http://schemas.openxmlformats.org/presentationml/2006/main">
+  <p:cSld>
+    <p:spTree>
+      <p:nvGrpSpPr>
+        <p:cNvPr id="1" name=""/>
+        <p:cNvGrpSpPr/>
+        <p:nvPr/>
+      </p:nvGrpSpPr>
+      <p:grpSpPr>
+        <a:xfrm>
+          <a:off x="0" y="0"/>
+          <a:ext cx="0" cy="0"/>
+          <a:chOff x="0" y="0"/>
+          <a:chExt cx="0" cy="0"/>
+        </a:xfrm>
+      </p:grpSpPr>
+      <p:sp>
+        <p:nvSpPr>
+          <p:cNvPr id="2" name="Titolo 1">
+            <a:extLst>
+              <a:ext uri="{FF2B5EF4-FFF2-40B4-BE49-F238E27FC236}">
+                <a16:creationId xmlns:a16="http://schemas.microsoft.com/office/drawing/2014/main" id="{AEA5083B-CC27-4F1C-AD03-E3DBEC1C9E78}"/>
+              </a:ext>
+            </a:extLst>
+          </p:cNvPr>
+          <p:cNvSpPr>
+            <a:spLocks noGrp="1"/>
+          </p:cNvSpPr>
+          <p:nvPr>
+            <p:ph type="title"/>
+          </p:nvPr>
+        </p:nvSpPr>
+        <p:spPr>
+          <a:xfrm>
+            <a:off x="431999" y="413238"/>
+            <a:ext cx="9198117" cy="450762"/>
+          </a:xfrm>
+          <a:prstGeom prst="rect">
+            <a:avLst/>
+          </a:prstGeom>
+        </p:spPr>
+        <p:txBody>
+          <a:bodyPr rtlCol="0" anchor="ctr">
+            <a:normAutofit/>
+          </a:bodyPr>
+          <a:lstStyle/>
+          <a:p>
+            <a:pPr rtl="0"/>
+            <a:r>
+              <a:rPr lang="it-IT" dirty="0"/>
+              <a:t>NEXT step in the simulation</a:t>
+            </a:r>
+          </a:p>
+        </p:txBody>
+      </p:sp>
+      <p:sp>
+        <p:nvSpPr>
+          <p:cNvPr id="6" name="Segnaposto numero diapositiva 5">
+            <a:extLst>
+              <a:ext uri="{FF2B5EF4-FFF2-40B4-BE49-F238E27FC236}">
+                <a16:creationId xmlns:a16="http://schemas.microsoft.com/office/drawing/2014/main" id="{46D051DA-5DAD-43A7-A238-51C63BA59FEC}"/>
+              </a:ext>
+            </a:extLst>
+          </p:cNvPr>
+          <p:cNvSpPr>
+            <a:spLocks noGrp="1"/>
+          </p:cNvSpPr>
+          <p:nvPr>
+            <p:ph type="sldNum" sz="quarter" idx="33"/>
+          </p:nvPr>
+        </p:nvSpPr>
+        <p:spPr>
+          <a:xfrm>
+            <a:off x="11772820" y="6401750"/>
+            <a:ext cx="278418" cy="274324"/>
+          </a:xfrm>
+          <a:prstGeom prst="rect">
+            <a:avLst/>
+          </a:prstGeom>
+        </p:spPr>
+        <p:txBody>
+          <a:bodyPr rtlCol="0" anchor="ctr">
+            <a:normAutofit/>
+          </a:bodyPr>
+          <a:lstStyle/>
+          <a:p>
+            <a:pPr rtl="0">
+              <a:spcAft>
+                <a:spcPts val="600"/>
+              </a:spcAft>
+            </a:pPr>
+            <a:fld id="{19B51A1E-902D-48AF-9020-955120F399B6}" type="slidenum">
+              <a:rPr lang="it-IT" smtClean="0"/>
+              <a:pPr rtl="0">
+                <a:spcAft>
+                  <a:spcPts val="600"/>
+                </a:spcAft>
+              </a:pPr>
+              <a:t>15</a:t>
+            </a:fld>
+            <a:endParaRPr lang="it-IT"/>
+          </a:p>
+        </p:txBody>
+      </p:sp>
+      <mc:AlternateContent xmlns:mc="http://schemas.openxmlformats.org/markup-compatibility/2006">
+        <mc:Choice xmlns:a14="http://schemas.microsoft.com/office/drawing/2010/main" Requires="a14">
+          <p:sp>
+            <p:nvSpPr>
+              <p:cNvPr id="3" name="TextBox 2">
+                <a:extLst>
+                  <a:ext uri="{FF2B5EF4-FFF2-40B4-BE49-F238E27FC236}">
+                    <a16:creationId xmlns:a16="http://schemas.microsoft.com/office/drawing/2014/main" id="{EC437B08-CF6A-46CA-B5D9-F1267286FC73}"/>
+                  </a:ext>
+                </a:extLst>
+              </p:cNvPr>
+              <p:cNvSpPr txBox="1"/>
+              <p:nvPr/>
+            </p:nvSpPr>
+            <p:spPr>
+              <a:xfrm>
+                <a:off x="1204355" y="1709683"/>
+                <a:ext cx="10305131" cy="3438634"/>
+              </a:xfrm>
+              <a:prstGeom prst="rect">
+                <a:avLst/>
+              </a:prstGeom>
+              <a:noFill/>
+            </p:spPr>
+            <p:txBody>
+              <a:bodyPr wrap="square" rtlCol="0">
+                <a:spAutoFit/>
+              </a:bodyPr>
+              <a:lstStyle/>
+              <a:p>
+                <a:pPr marL="285750" indent="-285750">
+                  <a:buFont typeface="Arial" panose="020B0604020202020204" pitchFamily="34" charset="0"/>
+                  <a:buChar char="•"/>
+                </a:pPr>
+                <a:r>
+                  <a:rPr lang="it-IT" dirty="0"/>
+                  <a:t>The next step in the simulation is to produce a sample of muons generated in </a:t>
+                </a:r>
+                <a14:m>
+                  <m:oMath xmlns:m="http://schemas.openxmlformats.org/officeDocument/2006/math">
+                    <m:sSub>
+                      <m:sSubPr>
+                        <m:ctrlPr>
+                          <a:rPr lang="it-IT" b="0" i="1" smtClean="0">
+                            <a:latin typeface="Cambria Math" panose="02040503050406030204" pitchFamily="18" charset="0"/>
+                          </a:rPr>
+                        </m:ctrlPr>
+                      </m:sSubPr>
+                      <m:e>
+                        <m:r>
+                          <a:rPr lang="it-IT" b="0" i="1" smtClean="0">
+                            <a:latin typeface="Cambria Math" panose="02040503050406030204" pitchFamily="18" charset="0"/>
+                          </a:rPr>
+                          <m:t>𝜈</m:t>
+                        </m:r>
+                      </m:e>
+                      <m:sub>
+                        <m:r>
+                          <a:rPr lang="it-IT" b="0" i="1" smtClean="0">
+                            <a:latin typeface="Cambria Math" panose="02040503050406030204" pitchFamily="18" charset="0"/>
+                          </a:rPr>
+                          <m:t>𝜇</m:t>
+                        </m:r>
+                      </m:sub>
+                    </m:sSub>
+                    <m:r>
+                      <a:rPr lang="it-IT" b="0" i="1" smtClean="0">
+                        <a:latin typeface="Cambria Math" panose="02040503050406030204" pitchFamily="18" charset="0"/>
+                      </a:rPr>
+                      <m:t>(</m:t>
+                    </m:r>
+                    <m:r>
+                      <a:rPr lang="it-IT" b="0" i="1" smtClean="0">
+                        <a:latin typeface="Cambria Math" panose="02040503050406030204" pitchFamily="18" charset="0"/>
+                      </a:rPr>
+                      <m:t>𝐶𝐶</m:t>
+                    </m:r>
+                    <m:r>
+                      <a:rPr lang="it-IT" b="0" i="1" smtClean="0">
+                        <a:latin typeface="Cambria Math" panose="02040503050406030204" pitchFamily="18" charset="0"/>
+                      </a:rPr>
+                      <m:t>)</m:t>
+                    </m:r>
+                  </m:oMath>
+                </a14:m>
+                <a:r>
+                  <a:rPr lang="en-US" dirty="0"/>
+                  <a:t> interactions in </a:t>
+                </a:r>
+                <a:r>
+                  <a:rPr lang="en-US" dirty="0" err="1"/>
+                  <a:t>ArgonCube</a:t>
+                </a:r>
+                <a:r>
+                  <a:rPr lang="en-US" dirty="0"/>
+                  <a:t> that have a trajectory such as they enter </a:t>
+                </a:r>
+                <a:r>
+                  <a:rPr lang="en-US" dirty="0" err="1"/>
+                  <a:t>HPgTPC</a:t>
+                </a:r>
+                <a:endParaRPr lang="en-US" dirty="0"/>
+              </a:p>
+              <a:p>
+                <a:endParaRPr lang="en-US" dirty="0"/>
+              </a:p>
+              <a:p>
+                <a:pPr marL="285750" indent="-285750">
+                  <a:buFont typeface="Arial" panose="020B0604020202020204" pitchFamily="34" charset="0"/>
+                  <a:buChar char="•"/>
+                </a:pPr>
+                <a:r>
+                  <a:rPr lang="en-US" dirty="0"/>
+                  <a:t>ND simulation chain:</a:t>
+                </a:r>
+              </a:p>
+              <a:p>
+                <a:pPr marL="800100" lvl="1" indent="-342900">
+                  <a:buFont typeface="+mj-lt"/>
+                  <a:buAutoNum type="arabicPeriod"/>
+                </a:pPr>
+                <a:r>
+                  <a:rPr lang="en-US" dirty="0"/>
+                  <a:t>Simulate neutrino interactions with </a:t>
+                </a:r>
+                <a:r>
+                  <a:rPr lang="en-US" dirty="0">
+                    <a:solidFill>
+                      <a:srgbClr val="FF0000"/>
+                    </a:solidFill>
+                  </a:rPr>
+                  <a:t>GENIE </a:t>
+                </a:r>
+                <a:r>
+                  <a:rPr lang="en-US" dirty="0"/>
+                  <a:t>in a ND hall geometry file containing only the liquid Argon detector</a:t>
+                </a:r>
+              </a:p>
+              <a:p>
+                <a:pPr marL="800100" lvl="1" indent="-342900">
+                  <a:buFont typeface="+mj-lt"/>
+                  <a:buAutoNum type="arabicPeriod"/>
+                </a:pPr>
+                <a:r>
+                  <a:rPr lang="en-US" dirty="0"/>
+                  <a:t>Propagate particles using </a:t>
+                </a:r>
+                <a:r>
+                  <a:rPr lang="en-US" dirty="0" err="1">
+                    <a:solidFill>
+                      <a:srgbClr val="FF0000"/>
+                    </a:solidFill>
+                  </a:rPr>
+                  <a:t>edep</a:t>
+                </a:r>
+                <a:r>
+                  <a:rPr lang="en-US" dirty="0">
+                    <a:solidFill>
+                      <a:srgbClr val="FF0000"/>
+                    </a:solidFill>
+                  </a:rPr>
+                  <a:t>-sim</a:t>
+                </a:r>
+                <a:r>
+                  <a:rPr lang="en-US" dirty="0"/>
+                  <a:t> in a ND hall geometry file containing both </a:t>
+                </a:r>
+                <a:r>
+                  <a:rPr lang="en-US" dirty="0" err="1"/>
+                  <a:t>ArgonCube</a:t>
+                </a:r>
+                <a:r>
+                  <a:rPr lang="en-US" dirty="0"/>
+                  <a:t> and </a:t>
+                </a:r>
+                <a:r>
+                  <a:rPr lang="en-US" dirty="0" err="1"/>
+                  <a:t>HPgTPC</a:t>
+                </a:r>
+                <a:endParaRPr lang="en-US" dirty="0"/>
+              </a:p>
+              <a:p>
+                <a:pPr marL="800100" lvl="1" indent="-342900">
+                  <a:buFont typeface="+mj-lt"/>
+                  <a:buAutoNum type="arabicPeriod"/>
+                </a:pPr>
+                <a:r>
+                  <a:rPr lang="en-US" dirty="0"/>
+                  <a:t>Convert </a:t>
+                </a:r>
+                <a:r>
+                  <a:rPr lang="en-US" dirty="0" err="1"/>
+                  <a:t>edep</a:t>
+                </a:r>
+                <a:r>
+                  <a:rPr lang="en-US" dirty="0"/>
+                  <a:t>-sim file to root file readable by </a:t>
+                </a:r>
+                <a:r>
+                  <a:rPr lang="en-US" dirty="0" err="1">
+                    <a:solidFill>
+                      <a:srgbClr val="FF0000"/>
+                    </a:solidFill>
+                  </a:rPr>
+                  <a:t>GarSoft</a:t>
+                </a:r>
+                <a:endParaRPr lang="en-US" dirty="0">
+                  <a:solidFill>
+                    <a:srgbClr val="FF0000"/>
+                  </a:solidFill>
+                </a:endParaRPr>
+              </a:p>
+              <a:p>
+                <a:pPr marL="800100" lvl="1" indent="-342900">
+                  <a:buFont typeface="+mj-lt"/>
+                  <a:buAutoNum type="arabicPeriod"/>
+                </a:pPr>
+                <a:r>
+                  <a:rPr lang="en-US" dirty="0"/>
+                  <a:t>Follow the </a:t>
+                </a:r>
+                <a:r>
+                  <a:rPr lang="en-US" dirty="0" err="1"/>
+                  <a:t>Garsoft</a:t>
+                </a:r>
+                <a:r>
+                  <a:rPr lang="en-US" dirty="0"/>
+                  <a:t> reconstruction chain</a:t>
+                </a:r>
+              </a:p>
+              <a:p>
+                <a:pPr lvl="1"/>
+                <a:endParaRPr lang="en-US" dirty="0"/>
+              </a:p>
+              <a:p>
+                <a:pPr marL="285750" indent="-285750">
+                  <a:buFont typeface="Arial" panose="020B0604020202020204" pitchFamily="34" charset="0"/>
+                  <a:buChar char="•"/>
+                </a:pPr>
+                <a:r>
+                  <a:rPr lang="en-US" dirty="0"/>
+                  <a:t>So far have reached point 3, having problems with point 4</a:t>
+                </a:r>
+              </a:p>
+            </p:txBody>
+          </p:sp>
+        </mc:Choice>
+        <mc:Fallback>
+          <p:sp>
+            <p:nvSpPr>
+              <p:cNvPr id="3" name="TextBox 2">
+                <a:extLst>
+                  <a:ext uri="{FF2B5EF4-FFF2-40B4-BE49-F238E27FC236}">
+                    <a16:creationId xmlns:a16="http://schemas.microsoft.com/office/drawing/2014/main" id="{EC437B08-CF6A-46CA-B5D9-F1267286FC73}"/>
+                  </a:ext>
+                </a:extLst>
+              </p:cNvPr>
+              <p:cNvSpPr txBox="1">
+                <a:spLocks noRot="1" noChangeAspect="1" noMove="1" noResize="1" noEditPoints="1" noAdjustHandles="1" noChangeArrowheads="1" noChangeShapeType="1" noTextEdit="1"/>
+              </p:cNvSpPr>
+              <p:nvPr/>
+            </p:nvSpPr>
+            <p:spPr>
+              <a:xfrm>
+                <a:off x="1204355" y="1709683"/>
+                <a:ext cx="10305131" cy="3438634"/>
+              </a:xfrm>
+              <a:prstGeom prst="rect">
+                <a:avLst/>
+              </a:prstGeom>
+              <a:blipFill>
+                <a:blip r:embed="rId2"/>
+                <a:stretch>
+                  <a:fillRect l="-414" t="-885" b="-1770"/>
+                </a:stretch>
+              </a:blipFill>
+            </p:spPr>
+            <p:txBody>
+              <a:bodyPr/>
+              <a:lstStyle/>
+              <a:p>
+                <a:r>
+                  <a:rPr lang="en-US">
+                    <a:noFill/>
+                  </a:rPr>
+                  <a:t> </a:t>
+                </a:r>
+              </a:p>
+            </p:txBody>
+          </p:sp>
+        </mc:Fallback>
+      </mc:AlternateContent>
+    </p:spTree>
+    <p:extLst>
+      <p:ext uri="{BB962C8B-B14F-4D97-AF65-F5344CB8AC3E}">
+        <p14:creationId xmlns:p14="http://schemas.microsoft.com/office/powerpoint/2010/main" val="2035801391"/>
+      </p:ext>
+    </p:extLst>
+  </p:cSld>
+  <p:clrMapOvr>
+    <a:masterClrMapping/>
+  </p:clrMapOvr>
+</p:sld>
+</file>
+
+<file path=ppt/slides/slide16.xml><?xml version="1.0" encoding="utf-8"?>
+<p:sld xmlns:a="http://schemas.openxmlformats.org/drawingml/2006/main" xmlns:r="http://schemas.openxmlformats.org/officeDocument/2006/relationships" xmlns:p="http://schemas.openxmlformats.org/presentationml/2006/main">
+  <p:cSld>
+    <p:spTree>
+      <p:nvGrpSpPr>
+        <p:cNvPr id="1" name=""/>
+        <p:cNvGrpSpPr/>
+        <p:nvPr/>
+      </p:nvGrpSpPr>
+      <p:grpSpPr>
+        <a:xfrm>
+          <a:off x="0" y="0"/>
+          <a:ext cx="0" cy="0"/>
+          <a:chOff x="0" y="0"/>
+          <a:chExt cx="0" cy="0"/>
+        </a:xfrm>
+      </p:grpSpPr>
+      <p:sp>
+        <p:nvSpPr>
+          <p:cNvPr id="2" name="Titolo 1">
+            <a:extLst>
+              <a:ext uri="{FF2B5EF4-FFF2-40B4-BE49-F238E27FC236}">
+                <a16:creationId xmlns:a16="http://schemas.microsoft.com/office/drawing/2014/main" id="{AEA5083B-CC27-4F1C-AD03-E3DBEC1C9E78}"/>
+              </a:ext>
+            </a:extLst>
+          </p:cNvPr>
+          <p:cNvSpPr>
+            <a:spLocks noGrp="1"/>
+          </p:cNvSpPr>
+          <p:nvPr>
+            <p:ph type="title"/>
+          </p:nvPr>
+        </p:nvSpPr>
+        <p:spPr>
+          <a:xfrm>
+            <a:off x="431999" y="413238"/>
+            <a:ext cx="9198117" cy="450762"/>
+          </a:xfrm>
+          <a:prstGeom prst="rect">
+            <a:avLst/>
+          </a:prstGeom>
+        </p:spPr>
+        <p:txBody>
+          <a:bodyPr rtlCol="0" anchor="ctr">
+            <a:normAutofit/>
+          </a:bodyPr>
+          <a:lstStyle/>
+          <a:p>
+            <a:pPr rtl="0"/>
+            <a:r>
+              <a:rPr lang="it-IT" dirty="0"/>
+              <a:t>Edep-display examples</a:t>
+            </a:r>
+          </a:p>
+        </p:txBody>
+      </p:sp>
+      <p:sp>
+        <p:nvSpPr>
+          <p:cNvPr id="6" name="Segnaposto numero diapositiva 5">
+            <a:extLst>
+              <a:ext uri="{FF2B5EF4-FFF2-40B4-BE49-F238E27FC236}">
+                <a16:creationId xmlns:a16="http://schemas.microsoft.com/office/drawing/2014/main" id="{46D051DA-5DAD-43A7-A238-51C63BA59FEC}"/>
+              </a:ext>
+            </a:extLst>
+          </p:cNvPr>
+          <p:cNvSpPr>
+            <a:spLocks noGrp="1"/>
+          </p:cNvSpPr>
+          <p:nvPr>
+            <p:ph type="sldNum" sz="quarter" idx="33"/>
+          </p:nvPr>
+        </p:nvSpPr>
+        <p:spPr>
+          <a:xfrm>
+            <a:off x="11772820" y="6401750"/>
+            <a:ext cx="278418" cy="274324"/>
+          </a:xfrm>
+          <a:prstGeom prst="rect">
+            <a:avLst/>
+          </a:prstGeom>
+        </p:spPr>
+        <p:txBody>
+          <a:bodyPr rtlCol="0" anchor="ctr">
+            <a:normAutofit/>
+          </a:bodyPr>
+          <a:lstStyle/>
+          <a:p>
+            <a:pPr rtl="0">
+              <a:spcAft>
+                <a:spcPts val="600"/>
+              </a:spcAft>
+            </a:pPr>
+            <a:fld id="{19B51A1E-902D-48AF-9020-955120F399B6}" type="slidenum">
+              <a:rPr lang="it-IT" smtClean="0"/>
+              <a:pPr rtl="0">
+                <a:spcAft>
+                  <a:spcPts val="600"/>
+                </a:spcAft>
+              </a:pPr>
+              <a:t>16</a:t>
+            </a:fld>
+            <a:endParaRPr lang="it-IT"/>
+          </a:p>
+        </p:txBody>
+      </p:sp>
+      <mc:AlternateContent xmlns:mc="http://schemas.openxmlformats.org/markup-compatibility/2006">
+        <mc:Choice xmlns:a14="http://schemas.microsoft.com/office/drawing/2010/main" Requires="a14">
+          <p:sp>
+            <p:nvSpPr>
+              <p:cNvPr id="3" name="TextBox 2">
+                <a:extLst>
+                  <a:ext uri="{FF2B5EF4-FFF2-40B4-BE49-F238E27FC236}">
+                    <a16:creationId xmlns:a16="http://schemas.microsoft.com/office/drawing/2014/main" id="{EC437B08-CF6A-46CA-B5D9-F1267286FC73}"/>
+                  </a:ext>
+                </a:extLst>
+              </p:cNvPr>
+              <p:cNvSpPr txBox="1"/>
+              <p:nvPr/>
+            </p:nvSpPr>
+            <p:spPr>
+              <a:xfrm>
+                <a:off x="431998" y="943533"/>
+                <a:ext cx="10305131" cy="668645"/>
+              </a:xfrm>
+              <a:prstGeom prst="rect">
+                <a:avLst/>
+              </a:prstGeom>
+              <a:noFill/>
+            </p:spPr>
+            <p:txBody>
+              <a:bodyPr wrap="square" rtlCol="0">
+                <a:spAutoFit/>
+              </a:bodyPr>
+              <a:lstStyle/>
+              <a:p>
+                <a:pPr marL="285750" indent="-285750">
+                  <a:buFont typeface="Arial" panose="020B0604020202020204" pitchFamily="34" charset="0"/>
+                  <a:buChar char="•"/>
+                </a:pPr>
+                <a:r>
+                  <a:rPr lang="it-IT" dirty="0"/>
+                  <a:t>Two graphical representations of </a:t>
+                </a:r>
+                <a14:m>
+                  <m:oMath xmlns:m="http://schemas.openxmlformats.org/officeDocument/2006/math">
+                    <m:sSub>
+                      <m:sSubPr>
+                        <m:ctrlPr>
+                          <a:rPr lang="it-IT" i="1">
+                            <a:latin typeface="Cambria Math" panose="02040503050406030204" pitchFamily="18" charset="0"/>
+                          </a:rPr>
+                        </m:ctrlPr>
+                      </m:sSubPr>
+                      <m:e>
+                        <m:r>
+                          <a:rPr lang="it-IT" i="1">
+                            <a:latin typeface="Cambria Math" panose="02040503050406030204" pitchFamily="18" charset="0"/>
+                          </a:rPr>
+                          <m:t>𝜈</m:t>
+                        </m:r>
+                      </m:e>
+                      <m:sub>
+                        <m:r>
+                          <a:rPr lang="it-IT" i="1">
+                            <a:latin typeface="Cambria Math" panose="02040503050406030204" pitchFamily="18" charset="0"/>
+                          </a:rPr>
+                          <m:t>𝜇</m:t>
+                        </m:r>
+                      </m:sub>
+                    </m:sSub>
+                    <m:r>
+                      <a:rPr lang="it-IT" i="1">
+                        <a:latin typeface="Cambria Math" panose="02040503050406030204" pitchFamily="18" charset="0"/>
+                      </a:rPr>
+                      <m:t>(</m:t>
+                    </m:r>
+                    <m:r>
+                      <a:rPr lang="it-IT" i="1">
+                        <a:latin typeface="Cambria Math" panose="02040503050406030204" pitchFamily="18" charset="0"/>
+                      </a:rPr>
+                      <m:t>𝐶𝐶</m:t>
+                    </m:r>
+                    <m:r>
+                      <a:rPr lang="it-IT" i="1">
+                        <a:latin typeface="Cambria Math" panose="02040503050406030204" pitchFamily="18" charset="0"/>
+                      </a:rPr>
+                      <m:t>)</m:t>
+                    </m:r>
+                  </m:oMath>
+                </a14:m>
+                <a:r>
+                  <a:rPr lang="en-US" dirty="0"/>
+                  <a:t> interactions in </a:t>
+                </a:r>
+                <a:r>
+                  <a:rPr lang="en-US" dirty="0" err="1"/>
+                  <a:t>ArgonCube</a:t>
+                </a:r>
+                <a:r>
+                  <a:rPr lang="en-US" dirty="0"/>
+                  <a:t> made with </a:t>
+                </a:r>
+                <a:r>
+                  <a:rPr lang="en-US" dirty="0" err="1"/>
+                  <a:t>edep</a:t>
+                </a:r>
+                <a:r>
+                  <a:rPr lang="en-US" dirty="0"/>
+                  <a:t>-sim event display. In one the muon enters the gas TPC, in the other it does not</a:t>
+                </a:r>
+                <a:r>
+                  <a:rPr lang="it-IT" dirty="0"/>
+                  <a:t> </a:t>
+                </a:r>
+                <a:endParaRPr lang="en-US" dirty="0"/>
+              </a:p>
+            </p:txBody>
+          </p:sp>
+        </mc:Choice>
+        <mc:Fallback>
+          <p:sp>
+            <p:nvSpPr>
+              <p:cNvPr id="3" name="TextBox 2">
+                <a:extLst>
+                  <a:ext uri="{FF2B5EF4-FFF2-40B4-BE49-F238E27FC236}">
+                    <a16:creationId xmlns:a16="http://schemas.microsoft.com/office/drawing/2014/main" id="{EC437B08-CF6A-46CA-B5D9-F1267286FC73}"/>
+                  </a:ext>
+                </a:extLst>
+              </p:cNvPr>
+              <p:cNvSpPr txBox="1">
+                <a:spLocks noRot="1" noChangeAspect="1" noMove="1" noResize="1" noEditPoints="1" noAdjustHandles="1" noChangeArrowheads="1" noChangeShapeType="1" noTextEdit="1"/>
+              </p:cNvSpPr>
+              <p:nvPr/>
+            </p:nvSpPr>
+            <p:spPr>
+              <a:xfrm>
+                <a:off x="431998" y="943533"/>
+                <a:ext cx="10305131" cy="668645"/>
+              </a:xfrm>
+              <a:prstGeom prst="rect">
+                <a:avLst/>
+              </a:prstGeom>
+              <a:blipFill>
+                <a:blip r:embed="rId2"/>
+                <a:stretch>
+                  <a:fillRect l="-414" t="-5505" b="-14679"/>
+                </a:stretch>
+              </a:blipFill>
+            </p:spPr>
+            <p:txBody>
+              <a:bodyPr/>
+              <a:lstStyle/>
+              <a:p>
+                <a:r>
+                  <a:rPr lang="en-US">
+                    <a:noFill/>
+                  </a:rPr>
+                  <a:t> </a:t>
+                </a:r>
+              </a:p>
+            </p:txBody>
+          </p:sp>
+        </mc:Fallback>
+      </mc:AlternateContent>
       <p:pic>
         <p:nvPicPr>
-          <p:cNvPr id="16" name="Picture 15" descr="A close up of a map&#10;&#10;Description automatically generated">
-            <a:extLst>
-              <a:ext uri="{FF2B5EF4-FFF2-40B4-BE49-F238E27FC236}">
-                <a16:creationId xmlns:a16="http://schemas.microsoft.com/office/drawing/2014/main" id="{B9197756-FF1A-41F1-99A9-A1D63191DA18}"/>
+          <p:cNvPr id="5" name="Picture 4" descr="A picture containing object, sitting, light, person&#10;&#10;Description automatically generated">
+            <a:extLst>
+              <a:ext uri="{FF2B5EF4-FFF2-40B4-BE49-F238E27FC236}">
+                <a16:creationId xmlns:a16="http://schemas.microsoft.com/office/drawing/2014/main" id="{6374BE85-41C1-480E-B413-D61916022C73}"/>
               </a:ext>
             </a:extLst>
           </p:cNvPr>
@@ -8055,7 +9041,7 @@
           <p:nvPr/>
         </p:nvPicPr>
         <p:blipFill>
-          <a:blip r:embed="rId5">
+          <a:blip r:embed="rId3">
             <a:extLst>
               <a:ext uri="{28A0092B-C50C-407E-A947-70E740481C1C}">
                 <a14:useLocalDpi xmlns:a14="http://schemas.microsoft.com/office/drawing/2010/main" val="0"/>
@@ -8068,18 +9054,141 @@
         </p:blipFill>
         <p:spPr>
           <a:xfrm>
-            <a:off x="1968801" y="981217"/>
-            <a:ext cx="3620238" cy="2807679"/>
+            <a:off x="6270062" y="2021471"/>
+            <a:ext cx="5502758" cy="3464930"/>
           </a:xfrm>
           <a:prstGeom prst="rect">
             <a:avLst/>
           </a:prstGeom>
         </p:spPr>
       </p:pic>
+      <p:pic>
+        <p:nvPicPr>
+          <p:cNvPr id="10" name="Picture 9" descr="A picture containing object, clock, light, green&#10;&#10;Description automatically generated">
+            <a:extLst>
+              <a:ext uri="{FF2B5EF4-FFF2-40B4-BE49-F238E27FC236}">
+                <a16:creationId xmlns:a16="http://schemas.microsoft.com/office/drawing/2014/main" id="{9C88D39E-8A5F-49EA-9D23-AA5E5F456D9F}"/>
+              </a:ext>
+            </a:extLst>
+          </p:cNvPr>
+          <p:cNvPicPr>
+            <a:picLocks noChangeAspect="1"/>
+          </p:cNvPicPr>
+          <p:nvPr/>
+        </p:nvPicPr>
+        <p:blipFill rotWithShape="1">
+          <a:blip r:embed="rId4">
+            <a:extLst>
+              <a:ext uri="{28A0092B-C50C-407E-A947-70E740481C1C}">
+                <a14:useLocalDpi xmlns:a14="http://schemas.microsoft.com/office/drawing/2010/main" val="0"/>
+              </a:ext>
+            </a:extLst>
+          </a:blip>
+          <a:srcRect l="4746" t="3744" b="3744"/>
+          <a:stretch/>
+        </p:blipFill>
+        <p:spPr>
+          <a:xfrm>
+            <a:off x="431998" y="2021471"/>
+            <a:ext cx="5502758" cy="3464930"/>
+          </a:xfrm>
+          <a:prstGeom prst="rect">
+            <a:avLst/>
+          </a:prstGeom>
+        </p:spPr>
+      </p:pic>
+      <p:sp>
+        <p:nvSpPr>
+          <p:cNvPr id="11" name="TextBox 10">
+            <a:extLst>
+              <a:ext uri="{FF2B5EF4-FFF2-40B4-BE49-F238E27FC236}">
+                <a16:creationId xmlns:a16="http://schemas.microsoft.com/office/drawing/2014/main" id="{993F5FD4-FC1B-418F-9E8D-65FAFC2D5AB2}"/>
+              </a:ext>
+            </a:extLst>
+          </p:cNvPr>
+          <p:cNvSpPr txBox="1"/>
+          <p:nvPr/>
+        </p:nvSpPr>
+        <p:spPr>
+          <a:xfrm>
+            <a:off x="2192784" y="5656840"/>
+            <a:ext cx="4003829" cy="369332"/>
+          </a:xfrm>
+          <a:prstGeom prst="rect">
+            <a:avLst/>
+          </a:prstGeom>
+          <a:noFill/>
+        </p:spPr>
+        <p:txBody>
+          <a:bodyPr wrap="square" rtlCol="0">
+            <a:spAutoFit/>
+          </a:bodyPr>
+          <a:lstStyle/>
+          <a:p>
+            <a:r>
+              <a:rPr lang="it-IT" dirty="0">
+                <a:solidFill>
+                  <a:srgbClr val="FF0000"/>
+                </a:solidFill>
+              </a:rPr>
+              <a:t>PASSING MUON</a:t>
+            </a:r>
+            <a:endParaRPr lang="en-US" dirty="0">
+              <a:solidFill>
+                <a:srgbClr val="FF0000"/>
+              </a:solidFill>
+            </a:endParaRPr>
+          </a:p>
+        </p:txBody>
+      </p:sp>
+      <p:sp>
+        <p:nvSpPr>
+          <p:cNvPr id="12" name="TextBox 11">
+            <a:extLst>
+              <a:ext uri="{FF2B5EF4-FFF2-40B4-BE49-F238E27FC236}">
+                <a16:creationId xmlns:a16="http://schemas.microsoft.com/office/drawing/2014/main" id="{78B8AA3A-50B7-4961-8341-C395755B0438}"/>
+              </a:ext>
+            </a:extLst>
+          </p:cNvPr>
+          <p:cNvSpPr txBox="1"/>
+          <p:nvPr/>
+        </p:nvSpPr>
+        <p:spPr>
+          <a:xfrm>
+            <a:off x="7908200" y="5574743"/>
+            <a:ext cx="4003829" cy="369332"/>
+          </a:xfrm>
+          <a:prstGeom prst="rect">
+            <a:avLst/>
+          </a:prstGeom>
+          <a:noFill/>
+        </p:spPr>
+        <p:txBody>
+          <a:bodyPr wrap="square" rtlCol="0">
+            <a:spAutoFit/>
+          </a:bodyPr>
+          <a:lstStyle/>
+          <a:p>
+            <a:r>
+              <a:rPr lang="it-IT" dirty="0">
+                <a:solidFill>
+                  <a:srgbClr val="FF0000"/>
+                </a:solidFill>
+              </a:rPr>
+              <a:t>NON-PASSING MUON</a:t>
+            </a:r>
+            <a:endParaRPr lang="en-US" dirty="0">
+              <a:solidFill>
+                <a:srgbClr val="FF0000"/>
+              </a:solidFill>
+            </a:endParaRPr>
+          </a:p>
+        </p:txBody>
+      </p:sp>
     </p:spTree>
     <p:extLst>
       <p:ext uri="{BB962C8B-B14F-4D97-AF65-F5344CB8AC3E}">
-        <p14:creationId xmlns:p14="http://schemas.microsoft.com/office/powerpoint/2010/main" val="2467546732"/>
+        <p14:creationId xmlns:p14="http://schemas.microsoft.com/office/powerpoint/2010/main" val="2099147399"/>
       </p:ext>
     </p:extLst>
   </p:cSld>
@@ -11486,6 +12595,15 @@
 </file>
 
 <file path=customXml/item1.xml><?xml version="1.0" encoding="utf-8"?>
+<p:properties xmlns:p="http://schemas.microsoft.com/office/2006/metadata/properties" xmlns:xsi="http://www.w3.org/2001/XMLSchema-instance" xmlns:pc="http://schemas.microsoft.com/office/infopath/2007/PartnerControls">
+  <documentManagement>
+    <_ip_UnifiedCompliancePolicyUIAction xmlns="http://schemas.microsoft.com/sharepoint/v3" xsi:nil="true"/>
+    <_ip_UnifiedCompliancePolicyProperties xmlns="http://schemas.microsoft.com/sharepoint/v3" xsi:nil="true"/>
+  </documentManagement>
+</p:properties>
+</file>
+
+<file path=customXml/item2.xml><?xml version="1.0" encoding="utf-8"?>
 <ct:contentTypeSchema xmlns:ct="http://schemas.microsoft.com/office/2006/metadata/contentType" xmlns:ma="http://schemas.microsoft.com/office/2006/metadata/properties/metaAttributes" ct:_="" ma:_="" ma:contentTypeName="Document" ma:contentTypeID="0x010100DEEA25CC0A0AC24199CDC46C25B8B0BC" ma:contentTypeVersion="9" ma:contentTypeDescription="Create a new document." ma:contentTypeScope="" ma:versionID="76e25e1730b4532ab1d5e5b131a96a5a">
   <xsd:schema xmlns:xsd="http://www.w3.org/2001/XMLSchema" xmlns:xs="http://www.w3.org/2001/XMLSchema" xmlns:p="http://schemas.microsoft.com/office/2006/metadata/properties" xmlns:ns1="http://schemas.microsoft.com/sharepoint/v3" xmlns:ns2="6dc4bcd6-49db-4c07-9060-8acfc67cef9f" xmlns:ns3="fb0879af-3eba-417a-a55a-ffe6dcd6ca77" targetNamespace="http://schemas.microsoft.com/office/2006/metadata/properties" ma:root="true" ma:fieldsID="ad1e9281a84c4949647088091c718de3" ns1:_="" ns2:_="" ns3:_="">
     <xsd:import namespace="http://schemas.microsoft.com/sharepoint/v3"/>
@@ -11687,16 +12805,25 @@
 </ct:contentTypeSchema>
 </file>
 
-<file path=customXml/item2.xml><?xml version="1.0" encoding="utf-8"?>
-<p:properties xmlns:p="http://schemas.microsoft.com/office/2006/metadata/properties" xmlns:xsi="http://www.w3.org/2001/XMLSchema-instance" xmlns:pc="http://schemas.microsoft.com/office/infopath/2007/PartnerControls">
-  <documentManagement>
-    <_ip_UnifiedCompliancePolicyUIAction xmlns="http://schemas.microsoft.com/sharepoint/v3" xsi:nil="true"/>
-    <_ip_UnifiedCompliancePolicyProperties xmlns="http://schemas.microsoft.com/sharepoint/v3" xsi:nil="true"/>
-  </documentManagement>
-</p:properties>
+<file path=customXml/itemProps1.xml><?xml version="1.0" encoding="utf-8"?>
+<ds:datastoreItem xmlns:ds="http://schemas.openxmlformats.org/officeDocument/2006/customXml" ds:itemID="{8FB61CFE-D4DA-4753-A9A5-D482B9609A35}">
+  <ds:schemaRefs>
+    <ds:schemaRef ds:uri="http://schemas.microsoft.com/office/2006/metadata/properties"/>
+    <ds:schemaRef ds:uri="http://www.w3.org/XML/1998/namespace"/>
+    <ds:schemaRef ds:uri="http://purl.org/dc/terms/"/>
+    <ds:schemaRef ds:uri="http://schemas.microsoft.com/office/2006/documentManagement/types"/>
+    <ds:schemaRef ds:uri="http://purl.org/dc/elements/1.1/"/>
+    <ds:schemaRef ds:uri="http://purl.org/dc/dcmitype/"/>
+    <ds:schemaRef ds:uri="http://schemas.microsoft.com/office/infopath/2007/PartnerControls"/>
+    <ds:schemaRef ds:uri="http://schemas.openxmlformats.org/package/2006/metadata/core-properties"/>
+    <ds:schemaRef ds:uri="fb0879af-3eba-417a-a55a-ffe6dcd6ca77"/>
+    <ds:schemaRef ds:uri="6dc4bcd6-49db-4c07-9060-8acfc67cef9f"/>
+    <ds:schemaRef ds:uri="http://schemas.microsoft.com/sharepoint/v3"/>
+  </ds:schemaRefs>
+</ds:datastoreItem>
 </file>
 
-<file path=customXml/itemProps1.xml><?xml version="1.0" encoding="utf-8"?>
+<file path=customXml/itemProps2.xml><?xml version="1.0" encoding="utf-8"?>
 <ds:datastoreItem xmlns:ds="http://schemas.openxmlformats.org/officeDocument/2006/customXml" ds:itemID="{58A784AD-7888-482C-A72A-80D3063962ED}">
   <ds:schemaRefs>
     <ds:schemaRef ds:uri="http://schemas.microsoft.com/office/2006/metadata/contentType"/>
@@ -11714,22 +12841,4 @@
     <ds:schemaRef ds:uri="http://schemas.microsoft.com/internal/obd"/>
   </ds:schemaRefs>
 </ds:datastoreItem>
-</file>
-
-<file path=customXml/itemProps2.xml><?xml version="1.0" encoding="utf-8"?>
-<ds:datastoreItem xmlns:ds="http://schemas.openxmlformats.org/officeDocument/2006/customXml" ds:itemID="{8FB61CFE-D4DA-4753-A9A5-D482B9609A35}">
-  <ds:schemaRefs>
-    <ds:schemaRef ds:uri="http://schemas.microsoft.com/office/2006/metadata/properties"/>
-    <ds:schemaRef ds:uri="http://www.w3.org/XML/1998/namespace"/>
-    <ds:schemaRef ds:uri="http://purl.org/dc/terms/"/>
-    <ds:schemaRef ds:uri="http://schemas.microsoft.com/office/2006/documentManagement/types"/>
-    <ds:schemaRef ds:uri="http://purl.org/dc/elements/1.1/"/>
-    <ds:schemaRef ds:uri="http://purl.org/dc/dcmitype/"/>
-    <ds:schemaRef ds:uri="http://schemas.microsoft.com/office/infopath/2007/PartnerControls"/>
-    <ds:schemaRef ds:uri="http://schemas.openxmlformats.org/package/2006/metadata/core-properties"/>
-    <ds:schemaRef ds:uri="fb0879af-3eba-417a-a55a-ffe6dcd6ca77"/>
-    <ds:schemaRef ds:uri="6dc4bcd6-49db-4c07-9060-8acfc67cef9f"/>
-    <ds:schemaRef ds:uri="http://schemas.microsoft.com/sharepoint/v3"/>
-  </ds:schemaRefs>
-</ds:datastoreItem>
 </file>
</xml_diff>

<commit_message>
Energy loss as function of energy and angle
</commit_message>
<xml_diff>
--- a/Simulation Exercise.pptx
+++ b/Simulation Exercise.pptx
@@ -249,7 +249,7 @@
             <a:pPr rtl="0"/>
             <a:fld id="{444DDF42-EA81-4D58-9E48-71D338B26FAC}" type="datetime1">
               <a:rPr lang="it-IT" smtClean="0"/>
-              <a:t>10/09/2020</a:t>
+              <a:t>14/09/2020</a:t>
             </a:fld>
             <a:endParaRPr lang="it-IT" dirty="0"/>
           </a:p>
@@ -430,7 +430,7 @@
             <a:fld id="{FABFCAD0-C8D4-46EE-8714-3DAE081602B2}" type="datetime1">
               <a:rPr lang="it-IT" smtClean="0"/>
               <a:pPr/>
-              <a:t>10/09/2020</a:t>
+              <a:t>14/09/2020</a:t>
             </a:fld>
             <a:endParaRPr lang="it-IT" dirty="0"/>
           </a:p>
@@ -7789,6 +7789,183 @@
           </a:prstGeom>
         </p:spPr>
       </p:pic>
+      <p:sp>
+        <p:nvSpPr>
+          <p:cNvPr id="4" name="Rectangle 3">
+            <a:extLst>
+              <a:ext uri="{FF2B5EF4-FFF2-40B4-BE49-F238E27FC236}">
+                <a16:creationId xmlns:a16="http://schemas.microsoft.com/office/drawing/2014/main" id="{2DD040CC-92C0-455B-B5AF-AD38A13FCD1D}"/>
+              </a:ext>
+            </a:extLst>
+          </p:cNvPr>
+          <p:cNvSpPr/>
+          <p:nvPr/>
+        </p:nvSpPr>
+        <p:spPr>
+          <a:xfrm>
+            <a:off x="3764132" y="4589755"/>
+            <a:ext cx="1420427" cy="133165"/>
+          </a:xfrm>
+          <a:prstGeom prst="rect">
+            <a:avLst/>
+          </a:prstGeom>
+          <a:solidFill>
+            <a:schemeClr val="bg1"/>
+          </a:solidFill>
+          <a:ln>
+            <a:noFill/>
+          </a:ln>
+        </p:spPr>
+        <p:style>
+          <a:lnRef idx="2">
+            <a:schemeClr val="accent1">
+              <a:shade val="50000"/>
+            </a:schemeClr>
+          </a:lnRef>
+          <a:fillRef idx="1">
+            <a:schemeClr val="accent1"/>
+          </a:fillRef>
+          <a:effectRef idx="0">
+            <a:schemeClr val="accent1"/>
+          </a:effectRef>
+          <a:fontRef idx="minor">
+            <a:schemeClr val="lt1"/>
+          </a:fontRef>
+        </p:style>
+        <p:txBody>
+          <a:bodyPr rtlCol="0" anchor="ctr"/>
+          <a:lstStyle/>
+          <a:p>
+            <a:pPr algn="ctr"/>
+            <a:endParaRPr lang="en-US"/>
+          </a:p>
+        </p:txBody>
+      </p:sp>
+      <mc:AlternateContent xmlns:mc="http://schemas.openxmlformats.org/markup-compatibility/2006">
+        <mc:Choice xmlns:a14="http://schemas.microsoft.com/office/drawing/2010/main" Requires="a14">
+          <p:sp>
+            <p:nvSpPr>
+              <p:cNvPr id="5" name="TextBox 4">
+                <a:extLst>
+                  <a:ext uri="{FF2B5EF4-FFF2-40B4-BE49-F238E27FC236}">
+                    <a16:creationId xmlns:a16="http://schemas.microsoft.com/office/drawing/2014/main" id="{E50C664D-279E-4108-86E4-2106CCA9D394}"/>
+                  </a:ext>
+                </a:extLst>
+              </p:cNvPr>
+              <p:cNvSpPr txBox="1"/>
+              <p:nvPr/>
+            </p:nvSpPr>
+            <p:spPr>
+              <a:xfrm>
+                <a:off x="4666597" y="4585316"/>
+                <a:ext cx="517962" cy="153888"/>
+              </a:xfrm>
+              <a:prstGeom prst="rect">
+                <a:avLst/>
+              </a:prstGeom>
+              <a:noFill/>
+            </p:spPr>
+            <p:txBody>
+              <a:bodyPr wrap="none" lIns="0" tIns="0" rIns="0" bIns="0" rtlCol="0">
+                <a:spAutoFit/>
+              </a:bodyPr>
+              <a:lstStyle/>
+              <a:p>
+                <a14:m>
+                  <m:oMathPara xmlns:m="http://schemas.openxmlformats.org/officeDocument/2006/math">
+                    <m:oMathParaPr>
+                      <m:jc m:val="centerGroup"/>
+                    </m:oMathParaPr>
+                    <m:oMath xmlns:m="http://schemas.openxmlformats.org/officeDocument/2006/math">
+                      <m:r>
+                        <m:rPr>
+                          <m:sty m:val="p"/>
+                        </m:rPr>
+                        <a:rPr lang="it-IT" sz="1000" b="0" i="0" smtClean="0">
+                          <a:latin typeface="Cambria Math" panose="02040503050406030204" pitchFamily="18" charset="0"/>
+                        </a:rPr>
+                        <m:t>Δ</m:t>
+                      </m:r>
+                      <m:r>
+                        <a:rPr lang="it-IT" sz="1000" b="0" i="1" smtClean="0">
+                          <a:latin typeface="Cambria Math" panose="02040503050406030204" pitchFamily="18" charset="0"/>
+                        </a:rPr>
+                        <m:t>𝐸</m:t>
+                      </m:r>
+                      <m:r>
+                        <a:rPr lang="it-IT" sz="1000" b="0" i="1" smtClean="0">
+                          <a:latin typeface="Cambria Math" panose="02040503050406030204" pitchFamily="18" charset="0"/>
+                        </a:rPr>
+                        <m:t>(</m:t>
+                      </m:r>
+                      <m:r>
+                        <m:rPr>
+                          <m:sty m:val="p"/>
+                        </m:rPr>
+                        <a:rPr lang="it-IT" sz="1000" b="0" i="1" smtClean="0">
+                          <a:latin typeface="Cambria Math" panose="02040503050406030204" pitchFamily="18" charset="0"/>
+                        </a:rPr>
+                        <m:t>GeV</m:t>
+                      </m:r>
+                      <m:r>
+                        <a:rPr lang="it-IT" sz="1000" b="0" i="1" smtClean="0">
+                          <a:latin typeface="Cambria Math" panose="02040503050406030204" pitchFamily="18" charset="0"/>
+                        </a:rPr>
+                        <m:t>)</m:t>
+                      </m:r>
+                    </m:oMath>
+                  </m:oMathPara>
+                </a14:m>
+                <a:endParaRPr lang="en-US" sz="1000" dirty="0"/>
+              </a:p>
+            </p:txBody>
+          </p:sp>
+        </mc:Choice>
+        <mc:Fallback>
+          <p:sp>
+            <p:nvSpPr>
+              <p:cNvPr id="5" name="TextBox 4">
+                <a:extLst>
+                  <a:ext uri="{FF2B5EF4-FFF2-40B4-BE49-F238E27FC236}">
+                    <a16:creationId xmlns:a16="http://schemas.microsoft.com/office/drawing/2014/main" id="{E50C664D-279E-4108-86E4-2106CCA9D394}"/>
+                  </a:ext>
+                </a:extLst>
+              </p:cNvPr>
+              <p:cNvSpPr txBox="1">
+                <a:spLocks noRot="1" noChangeAspect="1" noMove="1" noResize="1" noEditPoints="1" noAdjustHandles="1" noChangeArrowheads="1" noChangeShapeType="1" noTextEdit="1"/>
+              </p:cNvSpPr>
+              <p:nvPr/>
+            </p:nvSpPr>
+            <p:spPr>
+              <a:xfrm>
+                <a:off x="4666597" y="4585316"/>
+                <a:ext cx="517962" cy="153888"/>
+              </a:xfrm>
+              <a:prstGeom prst="rect">
+                <a:avLst/>
+              </a:prstGeom>
+              <a:blipFill>
+                <a:blip r:embed="rId4"/>
+                <a:stretch>
+                  <a:fillRect l="-5952" r="-10714" b="-44000"/>
+                </a:stretch>
+              </a:blipFill>
+            </p:spPr>
+            <p:txBody>
+              <a:bodyPr/>
+              <a:lstStyle/>
+              <a:p>
+                <a:r>
+                  <a:rPr lang="en-US">
+                    <a:noFill/>
+                  </a:rPr>
+                  <a:t> </a:t>
+                </a:r>
+              </a:p>
+            </p:txBody>
+          </p:sp>
+        </mc:Fallback>
+      </mc:AlternateContent>
     </p:spTree>
     <p:extLst>
       <p:ext uri="{BB962C8B-B14F-4D97-AF65-F5344CB8AC3E}">
@@ -8137,8 +8314,8 @@
           </a:p>
         </p:txBody>
       </p:sp>
-      <mc:AlternateContent xmlns:mc="http://schemas.openxmlformats.org/markup-compatibility/2006">
-        <mc:Choice xmlns:a14="http://schemas.microsoft.com/office/drawing/2010/main" Requires="a14">
+      <mc:AlternateContent xmlns:mc="http://schemas.openxmlformats.org/markup-compatibility/2006" xmlns:a14="http://schemas.microsoft.com/office/drawing/2010/main">
+        <mc:Choice Requires="a14">
           <p:sp>
             <p:nvSpPr>
               <p:cNvPr id="3" name="TextBox 2">
@@ -8224,7 +8401,7 @@
             </p:txBody>
           </p:sp>
         </mc:Choice>
-        <mc:Fallback>
+        <mc:Fallback xmlns="">
           <p:sp>
             <p:nvSpPr>
               <p:cNvPr id="3" name="TextBox 2">
@@ -8457,8 +8634,8 @@
           </a:p>
         </p:txBody>
       </p:sp>
-      <mc:AlternateContent xmlns:mc="http://schemas.openxmlformats.org/markup-compatibility/2006">
-        <mc:Choice xmlns:a14="http://schemas.microsoft.com/office/drawing/2010/main" Requires="a14">
+      <mc:AlternateContent xmlns:mc="http://schemas.openxmlformats.org/markup-compatibility/2006" xmlns:a14="http://schemas.microsoft.com/office/drawing/2010/main">
+        <mc:Choice Requires="a14">
           <p:sp>
             <p:nvSpPr>
               <p:cNvPr id="3" name="TextBox 2">
@@ -8704,7 +8881,7 @@
             </p:txBody>
           </p:sp>
         </mc:Choice>
-        <mc:Fallback>
+        <mc:Fallback xmlns="">
           <p:sp>
             <p:nvSpPr>
               <p:cNvPr id="3" name="TextBox 2">
@@ -8867,8 +9044,8 @@
           </a:p>
         </p:txBody>
       </p:sp>
-      <mc:AlternateContent xmlns:mc="http://schemas.openxmlformats.org/markup-compatibility/2006">
-        <mc:Choice xmlns:a14="http://schemas.microsoft.com/office/drawing/2010/main" Requires="a14">
+      <mc:AlternateContent xmlns:mc="http://schemas.openxmlformats.org/markup-compatibility/2006" xmlns:a14="http://schemas.microsoft.com/office/drawing/2010/main">
+        <mc:Choice Requires="a14">
           <p:sp>
             <p:nvSpPr>
               <p:cNvPr id="3" name="TextBox 2">
@@ -8981,7 +9158,7 @@
             </p:txBody>
           </p:sp>
         </mc:Choice>
-        <mc:Fallback>
+        <mc:Fallback xmlns="">
           <p:sp>
             <p:nvSpPr>
               <p:cNvPr id="3" name="TextBox 2">
@@ -12595,15 +12772,6 @@
 </file>
 
 <file path=customXml/item1.xml><?xml version="1.0" encoding="utf-8"?>
-<p:properties xmlns:p="http://schemas.microsoft.com/office/2006/metadata/properties" xmlns:xsi="http://www.w3.org/2001/XMLSchema-instance" xmlns:pc="http://schemas.microsoft.com/office/infopath/2007/PartnerControls">
-  <documentManagement>
-    <_ip_UnifiedCompliancePolicyUIAction xmlns="http://schemas.microsoft.com/sharepoint/v3" xsi:nil="true"/>
-    <_ip_UnifiedCompliancePolicyProperties xmlns="http://schemas.microsoft.com/sharepoint/v3" xsi:nil="true"/>
-  </documentManagement>
-</p:properties>
-</file>
-
-<file path=customXml/item2.xml><?xml version="1.0" encoding="utf-8"?>
 <ct:contentTypeSchema xmlns:ct="http://schemas.microsoft.com/office/2006/metadata/contentType" xmlns:ma="http://schemas.microsoft.com/office/2006/metadata/properties/metaAttributes" ct:_="" ma:_="" ma:contentTypeName="Document" ma:contentTypeID="0x010100DEEA25CC0A0AC24199CDC46C25B8B0BC" ma:contentTypeVersion="9" ma:contentTypeDescription="Create a new document." ma:contentTypeScope="" ma:versionID="76e25e1730b4532ab1d5e5b131a96a5a">
   <xsd:schema xmlns:xsd="http://www.w3.org/2001/XMLSchema" xmlns:xs="http://www.w3.org/2001/XMLSchema" xmlns:p="http://schemas.microsoft.com/office/2006/metadata/properties" xmlns:ns1="http://schemas.microsoft.com/sharepoint/v3" xmlns:ns2="6dc4bcd6-49db-4c07-9060-8acfc67cef9f" xmlns:ns3="fb0879af-3eba-417a-a55a-ffe6dcd6ca77" targetNamespace="http://schemas.microsoft.com/office/2006/metadata/properties" ma:root="true" ma:fieldsID="ad1e9281a84c4949647088091c718de3" ns1:_="" ns2:_="" ns3:_="">
     <xsd:import namespace="http://schemas.microsoft.com/sharepoint/v3"/>
@@ -12805,25 +12973,16 @@
 </ct:contentTypeSchema>
 </file>
 
-<file path=customXml/itemProps1.xml><?xml version="1.0" encoding="utf-8"?>
-<ds:datastoreItem xmlns:ds="http://schemas.openxmlformats.org/officeDocument/2006/customXml" ds:itemID="{8FB61CFE-D4DA-4753-A9A5-D482B9609A35}">
-  <ds:schemaRefs>
-    <ds:schemaRef ds:uri="http://schemas.microsoft.com/office/2006/metadata/properties"/>
-    <ds:schemaRef ds:uri="http://www.w3.org/XML/1998/namespace"/>
-    <ds:schemaRef ds:uri="http://purl.org/dc/terms/"/>
-    <ds:schemaRef ds:uri="http://schemas.microsoft.com/office/2006/documentManagement/types"/>
-    <ds:schemaRef ds:uri="http://purl.org/dc/elements/1.1/"/>
-    <ds:schemaRef ds:uri="http://purl.org/dc/dcmitype/"/>
-    <ds:schemaRef ds:uri="http://schemas.microsoft.com/office/infopath/2007/PartnerControls"/>
-    <ds:schemaRef ds:uri="http://schemas.openxmlformats.org/package/2006/metadata/core-properties"/>
-    <ds:schemaRef ds:uri="fb0879af-3eba-417a-a55a-ffe6dcd6ca77"/>
-    <ds:schemaRef ds:uri="6dc4bcd6-49db-4c07-9060-8acfc67cef9f"/>
-    <ds:schemaRef ds:uri="http://schemas.microsoft.com/sharepoint/v3"/>
-  </ds:schemaRefs>
-</ds:datastoreItem>
+<file path=customXml/item2.xml><?xml version="1.0" encoding="utf-8"?>
+<p:properties xmlns:p="http://schemas.microsoft.com/office/2006/metadata/properties" xmlns:xsi="http://www.w3.org/2001/XMLSchema-instance" xmlns:pc="http://schemas.microsoft.com/office/infopath/2007/PartnerControls">
+  <documentManagement>
+    <_ip_UnifiedCompliancePolicyUIAction xmlns="http://schemas.microsoft.com/sharepoint/v3" xsi:nil="true"/>
+    <_ip_UnifiedCompliancePolicyProperties xmlns="http://schemas.microsoft.com/sharepoint/v3" xsi:nil="true"/>
+  </documentManagement>
+</p:properties>
 </file>
 
-<file path=customXml/itemProps2.xml><?xml version="1.0" encoding="utf-8"?>
+<file path=customXml/itemProps1.xml><?xml version="1.0" encoding="utf-8"?>
 <ds:datastoreItem xmlns:ds="http://schemas.openxmlformats.org/officeDocument/2006/customXml" ds:itemID="{58A784AD-7888-482C-A72A-80D3063962ED}">
   <ds:schemaRefs>
     <ds:schemaRef ds:uri="http://schemas.microsoft.com/office/2006/metadata/contentType"/>
@@ -12841,4 +13000,22 @@
     <ds:schemaRef ds:uri="http://schemas.microsoft.com/internal/obd"/>
   </ds:schemaRefs>
 </ds:datastoreItem>
+</file>
+
+<file path=customXml/itemProps2.xml><?xml version="1.0" encoding="utf-8"?>
+<ds:datastoreItem xmlns:ds="http://schemas.openxmlformats.org/officeDocument/2006/customXml" ds:itemID="{8FB61CFE-D4DA-4753-A9A5-D482B9609A35}">
+  <ds:schemaRefs>
+    <ds:schemaRef ds:uri="http://schemas.microsoft.com/office/2006/metadata/properties"/>
+    <ds:schemaRef ds:uri="http://www.w3.org/XML/1998/namespace"/>
+    <ds:schemaRef ds:uri="http://purl.org/dc/terms/"/>
+    <ds:schemaRef ds:uri="http://schemas.microsoft.com/office/2006/documentManagement/types"/>
+    <ds:schemaRef ds:uri="http://purl.org/dc/elements/1.1/"/>
+    <ds:schemaRef ds:uri="http://purl.org/dc/dcmitype/"/>
+    <ds:schemaRef ds:uri="http://schemas.microsoft.com/office/infopath/2007/PartnerControls"/>
+    <ds:schemaRef ds:uri="http://schemas.openxmlformats.org/package/2006/metadata/core-properties"/>
+    <ds:schemaRef ds:uri="fb0879af-3eba-417a-a55a-ffe6dcd6ca77"/>
+    <ds:schemaRef ds:uri="6dc4bcd6-49db-4c07-9060-8acfc67cef9f"/>
+    <ds:schemaRef ds:uri="http://schemas.microsoft.com/sharepoint/v3"/>
+  </ds:schemaRefs>
+</ds:datastoreItem>
 </file>
</xml_diff>